<commit_message>
Updated Agenda and added communities
</commit_message>
<xml_diff>
--- a/Presentation.pptx
+++ b/Presentation.pptx
@@ -5,7 +5,7 @@
     <p:sldMasterId id="2147483648" r:id="rId1"/>
   </p:sldMasterIdLst>
   <p:notesMasterIdLst>
-    <p:notesMasterId r:id="rId11"/>
+    <p:notesMasterId r:id="rId14"/>
   </p:notesMasterIdLst>
   <p:sldIdLst>
     <p:sldId id="256" r:id="rId2"/>
@@ -17,6 +17,9 @@
     <p:sldId id="269" r:id="rId8"/>
     <p:sldId id="270" r:id="rId9"/>
     <p:sldId id="272" r:id="rId10"/>
+    <p:sldId id="275" r:id="rId11"/>
+    <p:sldId id="273" r:id="rId12"/>
+    <p:sldId id="274" r:id="rId13"/>
   </p:sldIdLst>
   <p:sldSz cx="12192000" cy="6858000"/>
   <p:notesSz cx="6858000" cy="9144000"/>
@@ -115,6 +118,11 @@
       </a:defRPr>
     </a:lvl9pPr>
   </p:defaultTextStyle>
+  <p:extLst>
+    <p:ext uri="{EFAFB233-063F-42B5-8137-9DF3F51BA10A}">
+      <p15:sldGuideLst xmlns:p15="http://schemas.microsoft.com/office/powerpoint/2012/main"/>
+    </p:ext>
+  </p:extLst>
 </p:presentation>
 </file>
 
@@ -200,7 +208,7 @@
           <a:p>
             <a:fld id="{2C16F43F-A232-7540-B88F-9CA4DAB800EC}" type="datetimeFigureOut">
               <a:rPr lang="en-US" smtClean="0"/>
-              <a:t>12/12/16</a:t>
+              <a:t>12/14/16</a:t>
             </a:fld>
             <a:endParaRPr lang="en-US"/>
           </a:p>
@@ -804,6 +812,90 @@
 </p:notes>
 </file>
 
+<file path=ppt/notesSlides/notesSlide5.xml><?xml version="1.0" encoding="utf-8"?>
+<p:notes xmlns:a="http://schemas.openxmlformats.org/drawingml/2006/main" xmlns:r="http://schemas.openxmlformats.org/officeDocument/2006/relationships" xmlns:p="http://schemas.openxmlformats.org/presentationml/2006/main">
+  <p:cSld>
+    <p:spTree>
+      <p:nvGrpSpPr>
+        <p:cNvPr id="1" name=""/>
+        <p:cNvGrpSpPr/>
+        <p:nvPr/>
+      </p:nvGrpSpPr>
+      <p:grpSpPr>
+        <a:xfrm>
+          <a:off x="0" y="0"/>
+          <a:ext cx="0" cy="0"/>
+          <a:chOff x="0" y="0"/>
+          <a:chExt cx="0" cy="0"/>
+        </a:xfrm>
+      </p:grpSpPr>
+      <p:sp>
+        <p:nvSpPr>
+          <p:cNvPr id="2" name="Slide Image Placeholder 1"/>
+          <p:cNvSpPr>
+            <a:spLocks noGrp="1" noRot="1" noChangeAspect="1"/>
+          </p:cNvSpPr>
+          <p:nvPr>
+            <p:ph type="sldImg"/>
+          </p:nvPr>
+        </p:nvSpPr>
+        <p:spPr/>
+      </p:sp>
+      <p:sp>
+        <p:nvSpPr>
+          <p:cNvPr id="3" name="Notes Placeholder 2"/>
+          <p:cNvSpPr>
+            <a:spLocks noGrp="1"/>
+          </p:cNvSpPr>
+          <p:nvPr>
+            <p:ph type="body" idx="1"/>
+          </p:nvPr>
+        </p:nvSpPr>
+        <p:spPr/>
+        <p:txBody>
+          <a:bodyPr/>
+          <a:lstStyle/>
+          <a:p>
+            <a:endParaRPr lang="en-US" dirty="0"/>
+          </a:p>
+        </p:txBody>
+      </p:sp>
+      <p:sp>
+        <p:nvSpPr>
+          <p:cNvPr id="4" name="Slide Number Placeholder 3"/>
+          <p:cNvSpPr>
+            <a:spLocks noGrp="1"/>
+          </p:cNvSpPr>
+          <p:nvPr>
+            <p:ph type="sldNum" sz="quarter" idx="10"/>
+          </p:nvPr>
+        </p:nvSpPr>
+        <p:spPr/>
+        <p:txBody>
+          <a:bodyPr/>
+          <a:lstStyle/>
+          <a:p>
+            <a:fld id="{ABE0B4DF-EF78-C641-9F01-3822F88552DE}" type="slidenum">
+              <a:rPr lang="en-US" smtClean="0"/>
+              <a:t>11</a:t>
+            </a:fld>
+            <a:endParaRPr lang="en-US"/>
+          </a:p>
+        </p:txBody>
+      </p:sp>
+    </p:spTree>
+    <p:extLst>
+      <p:ext uri="{BB962C8B-B14F-4D97-AF65-F5344CB8AC3E}">
+        <p14:creationId xmlns:p14="http://schemas.microsoft.com/office/powerpoint/2010/main" val="1197226166"/>
+      </p:ext>
+    </p:extLst>
+  </p:cSld>
+  <p:clrMapOvr>
+    <a:masterClrMapping/>
+  </p:clrMapOvr>
+</p:notes>
+</file>
+
 <file path=ppt/slideLayouts/slideLayout1.xml><?xml version="1.0" encoding="utf-8"?>
 <p:sldLayout xmlns:a="http://schemas.openxmlformats.org/drawingml/2006/main" xmlns:r="http://schemas.openxmlformats.org/officeDocument/2006/relationships" xmlns:p="http://schemas.openxmlformats.org/presentationml/2006/main" type="title" preserve="1">
   <p:cSld name="Title Slide">
@@ -935,7 +1027,7 @@
           <a:p>
             <a:fld id="{2F3CF11A-FE28-0C42-AC11-F7529E06F69C}" type="datetime1">
               <a:rPr lang="en-US" smtClean="0"/>
-              <a:t>12/12/16</a:t>
+              <a:t>12/14/16</a:t>
             </a:fld>
             <a:endParaRPr lang="en-US"/>
           </a:p>
@@ -1105,7 +1197,7 @@
           <a:p>
             <a:fld id="{920AC30F-B8A3-D443-9F88-68E39F28DBA9}" type="datetime1">
               <a:rPr lang="en-US" smtClean="0"/>
-              <a:t>12/12/16</a:t>
+              <a:t>12/14/16</a:t>
             </a:fld>
             <a:endParaRPr lang="en-US"/>
           </a:p>
@@ -1285,7 +1377,7 @@
           <a:p>
             <a:fld id="{6B15ECE9-C01D-4F44-B80B-97B159B6322F}" type="datetime1">
               <a:rPr lang="en-US" smtClean="0"/>
-              <a:t>12/12/16</a:t>
+              <a:t>12/14/16</a:t>
             </a:fld>
             <a:endParaRPr lang="en-US"/>
           </a:p>
@@ -1455,7 +1547,7 @@
           <a:p>
             <a:fld id="{9260ED66-CB6E-764E-B99F-286F24E58047}" type="datetime1">
               <a:rPr lang="en-US" smtClean="0"/>
-              <a:t>12/12/16</a:t>
+              <a:t>12/14/16</a:t>
             </a:fld>
             <a:endParaRPr lang="en-US"/>
           </a:p>
@@ -1701,7 +1793,7 @@
           <a:p>
             <a:fld id="{FA97A8ED-728D-3C46-843C-871788054D9F}" type="datetime1">
               <a:rPr lang="en-US" smtClean="0"/>
-              <a:t>12/12/16</a:t>
+              <a:t>12/14/16</a:t>
             </a:fld>
             <a:endParaRPr lang="en-US"/>
           </a:p>
@@ -1933,7 +2025,7 @@
           <a:p>
             <a:fld id="{4AB6FFF2-B645-0047-9D5E-8FE97DC12A3B}" type="datetime1">
               <a:rPr lang="en-US" smtClean="0"/>
-              <a:t>12/12/16</a:t>
+              <a:t>12/14/16</a:t>
             </a:fld>
             <a:endParaRPr lang="en-US"/>
           </a:p>
@@ -2300,7 +2392,7 @@
           <a:p>
             <a:fld id="{A0F96C2D-3AA6-0E48-A18F-1E5B36E7CD98}" type="datetime1">
               <a:rPr lang="en-US" smtClean="0"/>
-              <a:t>12/12/16</a:t>
+              <a:t>12/14/16</a:t>
             </a:fld>
             <a:endParaRPr lang="en-US"/>
           </a:p>
@@ -2418,7 +2510,7 @@
           <a:p>
             <a:fld id="{E9C4F00E-3322-9B4A-BCEE-370ED3483BEE}" type="datetime1">
               <a:rPr lang="en-US" smtClean="0"/>
-              <a:t>12/12/16</a:t>
+              <a:t>12/14/16</a:t>
             </a:fld>
             <a:endParaRPr lang="en-US"/>
           </a:p>
@@ -2513,7 +2605,7 @@
           <a:p>
             <a:fld id="{4BFAB9DE-DD3A-5C41-9E1E-AEFA73512B80}" type="datetime1">
               <a:rPr lang="en-US" smtClean="0"/>
-              <a:t>12/12/16</a:t>
+              <a:t>12/14/16</a:t>
             </a:fld>
             <a:endParaRPr lang="en-US"/>
           </a:p>
@@ -2790,7 +2882,7 @@
           <a:p>
             <a:fld id="{C7871526-BE77-A44F-802D-D8AC625E7977}" type="datetime1">
               <a:rPr lang="en-US" smtClean="0"/>
-              <a:t>12/12/16</a:t>
+              <a:t>12/14/16</a:t>
             </a:fld>
             <a:endParaRPr lang="en-US"/>
           </a:p>
@@ -3043,7 +3135,7 @@
           <a:p>
             <a:fld id="{954A7052-351E-A74C-B714-0114291906FF}" type="datetime1">
               <a:rPr lang="en-US" smtClean="0"/>
-              <a:t>12/12/16</a:t>
+              <a:t>12/14/16</a:t>
             </a:fld>
             <a:endParaRPr lang="en-US"/>
           </a:p>
@@ -3256,7 +3348,7 @@
           <a:p>
             <a:fld id="{B5E5682C-B4C2-6440-A12C-AE13AC8BCA64}" type="datetime1">
               <a:rPr lang="en-US" smtClean="0"/>
-              <a:t>12/12/16</a:t>
+              <a:t>12/14/16</a:t>
             </a:fld>
             <a:endParaRPr lang="en-US"/>
           </a:p>
@@ -3832,7 +3924,104 @@
 </p:sld>
 </file>
 
-<file path=ppt/slides/slide2.xml><?xml version="1.0" encoding="utf-8"?>
+<file path=ppt/slides/slide10.xml><?xml version="1.0" encoding="utf-8"?>
+<p:sld xmlns:a="http://schemas.openxmlformats.org/drawingml/2006/main" xmlns:r="http://schemas.openxmlformats.org/officeDocument/2006/relationships" xmlns:p="http://schemas.openxmlformats.org/presentationml/2006/main">
+  <p:cSld>
+    <p:bg>
+      <p:bgPr>
+        <a:solidFill>
+          <a:srgbClr val="37BDA7"/>
+        </a:solidFill>
+        <a:effectLst/>
+      </p:bgPr>
+    </p:bg>
+    <p:spTree>
+      <p:nvGrpSpPr>
+        <p:cNvPr id="1" name=""/>
+        <p:cNvGrpSpPr/>
+        <p:nvPr/>
+      </p:nvGrpSpPr>
+      <p:grpSpPr>
+        <a:xfrm>
+          <a:off x="0" y="0"/>
+          <a:ext cx="0" cy="0"/>
+          <a:chOff x="0" y="0"/>
+          <a:chExt cx="0" cy="0"/>
+        </a:xfrm>
+      </p:grpSpPr>
+      <p:sp>
+        <p:nvSpPr>
+          <p:cNvPr id="2" name="Title 1"/>
+          <p:cNvSpPr>
+            <a:spLocks noGrp="1"/>
+          </p:cNvSpPr>
+          <p:nvPr>
+            <p:ph type="title"/>
+          </p:nvPr>
+        </p:nvSpPr>
+        <p:spPr>
+          <a:xfrm>
+            <a:off x="9136811" y="4471299"/>
+            <a:ext cx="3055189" cy="1325563"/>
+          </a:xfrm>
+        </p:spPr>
+        <p:txBody>
+          <a:bodyPr/>
+          <a:lstStyle/>
+          <a:p>
+            <a:r>
+              <a:rPr lang="en-US" smtClean="0">
+                <a:solidFill>
+                  <a:schemeClr val="bg1"/>
+                </a:solidFill>
+              </a:rPr>
+              <a:t>End.</a:t>
+            </a:r>
+            <a:endParaRPr lang="en-US" dirty="0">
+              <a:solidFill>
+                <a:schemeClr val="bg1"/>
+              </a:solidFill>
+            </a:endParaRPr>
+          </a:p>
+        </p:txBody>
+      </p:sp>
+      <p:sp>
+        <p:nvSpPr>
+          <p:cNvPr id="4" name="Slide Number Placeholder 3"/>
+          <p:cNvSpPr>
+            <a:spLocks noGrp="1"/>
+          </p:cNvSpPr>
+          <p:nvPr>
+            <p:ph type="sldNum" sz="quarter" idx="12"/>
+          </p:nvPr>
+        </p:nvSpPr>
+        <p:spPr/>
+        <p:txBody>
+          <a:bodyPr/>
+          <a:lstStyle/>
+          <a:p>
+            <a:fld id="{9E487D81-23A7-E743-A35A-AC6109D8EDF6}" type="slidenum">
+              <a:rPr lang="en-US" smtClean="0"/>
+              <a:t>9</a:t>
+            </a:fld>
+            <a:endParaRPr lang="en-US"/>
+          </a:p>
+        </p:txBody>
+      </p:sp>
+    </p:spTree>
+    <p:extLst>
+      <p:ext uri="{BB962C8B-B14F-4D97-AF65-F5344CB8AC3E}">
+        <p14:creationId xmlns:p14="http://schemas.microsoft.com/office/powerpoint/2010/main" val="1680971127"/>
+      </p:ext>
+    </p:extLst>
+  </p:cSld>
+  <p:clrMapOvr>
+    <a:masterClrMapping/>
+  </p:clrMapOvr>
+</p:sld>
+</file>
+
+<file path=ppt/slides/slide11.xml><?xml version="1.0" encoding="utf-8"?>
 <p:sld xmlns:a="http://schemas.openxmlformats.org/drawingml/2006/main" xmlns:r="http://schemas.openxmlformats.org/officeDocument/2006/relationships" xmlns:p="http://schemas.openxmlformats.org/presentationml/2006/main">
   <p:cSld>
     <p:spTree>
@@ -3866,6 +4055,101 @@
           <a:p>
             <a:r>
               <a:rPr lang="en-US" dirty="0" smtClean="0"/>
+              <a:t>Appendix / Old Slides</a:t>
+            </a:r>
+            <a:endParaRPr lang="en-US" dirty="0"/>
+          </a:p>
+        </p:txBody>
+      </p:sp>
+      <p:sp>
+        <p:nvSpPr>
+          <p:cNvPr id="3" name="Content Placeholder 2"/>
+          <p:cNvSpPr>
+            <a:spLocks noGrp="1"/>
+          </p:cNvSpPr>
+          <p:nvPr>
+            <p:ph idx="1"/>
+          </p:nvPr>
+        </p:nvSpPr>
+        <p:spPr/>
+        <p:txBody>
+          <a:bodyPr/>
+          <a:lstStyle/>
+          <a:p>
+            <a:endParaRPr lang="en-US"/>
+          </a:p>
+        </p:txBody>
+      </p:sp>
+      <p:sp>
+        <p:nvSpPr>
+          <p:cNvPr id="4" name="Slide Number Placeholder 3"/>
+          <p:cNvSpPr>
+            <a:spLocks noGrp="1"/>
+          </p:cNvSpPr>
+          <p:nvPr>
+            <p:ph type="sldNum" sz="quarter" idx="12"/>
+          </p:nvPr>
+        </p:nvSpPr>
+        <p:spPr/>
+        <p:txBody>
+          <a:bodyPr/>
+          <a:lstStyle/>
+          <a:p>
+            <a:fld id="{9E487D81-23A7-E743-A35A-AC6109D8EDF6}" type="slidenum">
+              <a:rPr lang="en-US" smtClean="0"/>
+              <a:t>10</a:t>
+            </a:fld>
+            <a:endParaRPr lang="en-US"/>
+          </a:p>
+        </p:txBody>
+      </p:sp>
+    </p:spTree>
+    <p:extLst>
+      <p:ext uri="{BB962C8B-B14F-4D97-AF65-F5344CB8AC3E}">
+        <p14:creationId xmlns:p14="http://schemas.microsoft.com/office/powerpoint/2010/main" val="1677023034"/>
+      </p:ext>
+    </p:extLst>
+  </p:cSld>
+  <p:clrMapOvr>
+    <a:masterClrMapping/>
+  </p:clrMapOvr>
+</p:sld>
+</file>
+
+<file path=ppt/slides/slide12.xml><?xml version="1.0" encoding="utf-8"?>
+<p:sld xmlns:a="http://schemas.openxmlformats.org/drawingml/2006/main" xmlns:r="http://schemas.openxmlformats.org/officeDocument/2006/relationships" xmlns:p="http://schemas.openxmlformats.org/presentationml/2006/main">
+  <p:cSld>
+    <p:spTree>
+      <p:nvGrpSpPr>
+        <p:cNvPr id="1" name=""/>
+        <p:cNvGrpSpPr/>
+        <p:nvPr/>
+      </p:nvGrpSpPr>
+      <p:grpSpPr>
+        <a:xfrm>
+          <a:off x="0" y="0"/>
+          <a:ext cx="0" cy="0"/>
+          <a:chOff x="0" y="0"/>
+          <a:chExt cx="0" cy="0"/>
+        </a:xfrm>
+      </p:grpSpPr>
+      <p:sp>
+        <p:nvSpPr>
+          <p:cNvPr id="2" name="Title 1"/>
+          <p:cNvSpPr>
+            <a:spLocks noGrp="1"/>
+          </p:cNvSpPr>
+          <p:nvPr>
+            <p:ph type="title"/>
+          </p:nvPr>
+        </p:nvSpPr>
+        <p:spPr/>
+        <p:txBody>
+          <a:bodyPr/>
+          <a:lstStyle/>
+          <a:p>
+            <a:r>
+              <a:rPr lang="en-US" dirty="0" smtClean="0"/>
               <a:t>Agenda</a:t>
             </a:r>
             <a:endParaRPr lang="en-US" dirty="0"/>
@@ -3973,7 +4257,7 @@
           <a:p>
             <a:fld id="{9E487D81-23A7-E743-A35A-AC6109D8EDF6}" type="slidenum">
               <a:rPr lang="en-US" smtClean="0"/>
-              <a:t>1</a:t>
+              <a:t>11</a:t>
             </a:fld>
             <a:endParaRPr lang="en-US"/>
           </a:p>
@@ -4009,6 +4293,1831 @@
           </a:prstGeom>
         </p:spPr>
       </p:pic>
+    </p:spTree>
+    <p:extLst>
+      <p:ext uri="{BB962C8B-B14F-4D97-AF65-F5344CB8AC3E}">
+        <p14:creationId xmlns:p14="http://schemas.microsoft.com/office/powerpoint/2010/main" val="3265563"/>
+      </p:ext>
+    </p:extLst>
+  </p:cSld>
+  <p:clrMapOvr>
+    <a:masterClrMapping/>
+  </p:clrMapOvr>
+  <p:timing>
+    <p:tnLst>
+      <p:par>
+        <p:cTn id="1" dur="indefinite" restart="never" nodeType="tmRoot"/>
+      </p:par>
+    </p:tnLst>
+  </p:timing>
+</p:sld>
+</file>
+
+<file path=ppt/slides/slide2.xml><?xml version="1.0" encoding="utf-8"?>
+<p:sld xmlns:a="http://schemas.openxmlformats.org/drawingml/2006/main" xmlns:r="http://schemas.openxmlformats.org/officeDocument/2006/relationships" xmlns:p="http://schemas.openxmlformats.org/presentationml/2006/main">
+  <p:cSld>
+    <p:spTree>
+      <p:nvGrpSpPr>
+        <p:cNvPr id="1" name=""/>
+        <p:cNvGrpSpPr/>
+        <p:nvPr/>
+      </p:nvGrpSpPr>
+      <p:grpSpPr>
+        <a:xfrm>
+          <a:off x="0" y="0"/>
+          <a:ext cx="0" cy="0"/>
+          <a:chOff x="0" y="0"/>
+          <a:chExt cx="0" cy="0"/>
+        </a:xfrm>
+      </p:grpSpPr>
+      <p:sp>
+        <p:nvSpPr>
+          <p:cNvPr id="2" name="Title 1"/>
+          <p:cNvSpPr>
+            <a:spLocks noGrp="1"/>
+          </p:cNvSpPr>
+          <p:nvPr>
+            <p:ph type="title"/>
+          </p:nvPr>
+        </p:nvSpPr>
+        <p:spPr/>
+        <p:txBody>
+          <a:bodyPr/>
+          <a:lstStyle/>
+          <a:p>
+            <a:r>
+              <a:rPr lang="en-US" dirty="0" smtClean="0"/>
+              <a:t>Agenda</a:t>
+            </a:r>
+            <a:endParaRPr lang="en-US" dirty="0"/>
+          </a:p>
+        </p:txBody>
+      </p:sp>
+      <p:sp>
+        <p:nvSpPr>
+          <p:cNvPr id="3" name="Content Placeholder 2"/>
+          <p:cNvSpPr>
+            <a:spLocks noGrp="1"/>
+          </p:cNvSpPr>
+          <p:nvPr>
+            <p:ph idx="1"/>
+          </p:nvPr>
+        </p:nvSpPr>
+        <p:spPr>
+          <a:xfrm>
+            <a:off x="233171" y="3123350"/>
+            <a:ext cx="1396918" cy="1117750"/>
+          </a:xfrm>
+        </p:spPr>
+        <p:txBody>
+          <a:bodyPr vert="horz" lIns="91440" tIns="45720" rIns="91440" bIns="45720" rtlCol="0">
+            <a:normAutofit/>
+          </a:bodyPr>
+          <a:lstStyle/>
+          <a:p>
+            <a:pPr marL="0" indent="0" algn="ctr">
+              <a:buNone/>
+            </a:pPr>
+            <a:r>
+              <a:rPr lang="en-US" sz="2400" dirty="0" smtClean="0"/>
+              <a:t>Optimal </a:t>
+            </a:r>
+            <a:r>
+              <a:rPr lang="en-US" sz="2400" dirty="0"/>
+              <a:t>Leaders</a:t>
+            </a:r>
+          </a:p>
+        </p:txBody>
+      </p:sp>
+      <p:sp>
+        <p:nvSpPr>
+          <p:cNvPr id="5" name="Slide Number Placeholder 4"/>
+          <p:cNvSpPr>
+            <a:spLocks noGrp="1"/>
+          </p:cNvSpPr>
+          <p:nvPr>
+            <p:ph type="sldNum" sz="quarter" idx="12"/>
+          </p:nvPr>
+        </p:nvSpPr>
+        <p:spPr/>
+        <p:txBody>
+          <a:bodyPr/>
+          <a:lstStyle/>
+          <a:p>
+            <a:fld id="{9E487D81-23A7-E743-A35A-AC6109D8EDF6}" type="slidenum">
+              <a:rPr lang="en-US" smtClean="0"/>
+              <a:t>1</a:t>
+            </a:fld>
+            <a:endParaRPr lang="en-US"/>
+          </a:p>
+        </p:txBody>
+      </p:sp>
+      <p:pic>
+        <p:nvPicPr>
+          <p:cNvPr id="7" name="Picture 6"/>
+          <p:cNvPicPr>
+            <a:picLocks noChangeAspect="1"/>
+          </p:cNvPicPr>
+          <p:nvPr/>
+        </p:nvPicPr>
+        <p:blipFill>
+          <a:blip r:embed="rId3">
+            <a:extLst>
+              <a:ext uri="{28A0092B-C50C-407E-A947-70E740481C1C}">
+                <a14:useLocalDpi xmlns:a14="http://schemas.microsoft.com/office/drawing/2010/main" val="0"/>
+              </a:ext>
+            </a:extLst>
+          </a:blip>
+          <a:stretch>
+            <a:fillRect/>
+          </a:stretch>
+        </p:blipFill>
+        <p:spPr>
+          <a:xfrm>
+            <a:off x="267676" y="6101861"/>
+            <a:ext cx="1857239" cy="518746"/>
+          </a:xfrm>
+          <a:prstGeom prst="rect">
+            <a:avLst/>
+          </a:prstGeom>
+        </p:spPr>
+      </p:pic>
+      <p:sp>
+        <p:nvSpPr>
+          <p:cNvPr id="4" name="Chevron 3"/>
+          <p:cNvSpPr/>
+          <p:nvPr/>
+        </p:nvSpPr>
+        <p:spPr>
+          <a:xfrm>
+            <a:off x="1519917" y="3211722"/>
+            <a:ext cx="358367" cy="579228"/>
+          </a:xfrm>
+          <a:prstGeom prst="chevron">
+            <a:avLst/>
+          </a:prstGeom>
+          <a:solidFill>
+            <a:srgbClr val="37BDA7"/>
+          </a:solidFill>
+          <a:ln>
+            <a:noFill/>
+          </a:ln>
+        </p:spPr>
+        <p:style>
+          <a:lnRef idx="2">
+            <a:schemeClr val="accent1">
+              <a:shade val="50000"/>
+            </a:schemeClr>
+          </a:lnRef>
+          <a:fillRef idx="1">
+            <a:schemeClr val="accent1"/>
+          </a:fillRef>
+          <a:effectRef idx="0">
+            <a:schemeClr val="accent1"/>
+          </a:effectRef>
+          <a:fontRef idx="minor">
+            <a:schemeClr val="lt1"/>
+          </a:fontRef>
+        </p:style>
+        <p:txBody>
+          <a:bodyPr rtlCol="0" anchor="ctr"/>
+          <a:lstStyle/>
+          <a:p>
+            <a:pPr algn="ctr"/>
+            <a:endParaRPr lang="en-US" sz="2400">
+              <a:solidFill>
+                <a:schemeClr val="tx1"/>
+              </a:solidFill>
+            </a:endParaRPr>
+          </a:p>
+        </p:txBody>
+      </p:sp>
+      <p:sp>
+        <p:nvSpPr>
+          <p:cNvPr id="8" name="Content Placeholder 2"/>
+          <p:cNvSpPr txBox="1">
+            <a:spLocks/>
+          </p:cNvSpPr>
+          <p:nvPr/>
+        </p:nvSpPr>
+        <p:spPr>
+          <a:xfrm>
+            <a:off x="1903095" y="3123350"/>
+            <a:ext cx="1405382" cy="1117750"/>
+          </a:xfrm>
+          <a:prstGeom prst="rect">
+            <a:avLst/>
+          </a:prstGeom>
+        </p:spPr>
+        <p:txBody>
+          <a:bodyPr vert="horz" lIns="91440" tIns="45720" rIns="91440" bIns="45720" rtlCol="0">
+            <a:normAutofit/>
+          </a:bodyPr>
+          <a:lstStyle>
+            <a:lvl1pPr marL="228600" indent="-228600" algn="l" defTabSz="914400" rtl="0" eaLnBrk="1" latinLnBrk="0" hangingPunct="1">
+              <a:lnSpc>
+                <a:spcPct val="90000"/>
+              </a:lnSpc>
+              <a:spcBef>
+                <a:spcPts val="1000"/>
+              </a:spcBef>
+              <a:buFont typeface="Arial"/>
+              <a:buChar char="•"/>
+              <a:defRPr sz="2800" kern="1200">
+                <a:solidFill>
+                  <a:schemeClr val="tx1"/>
+                </a:solidFill>
+                <a:latin typeface="+mn-lt"/>
+                <a:ea typeface="+mn-ea"/>
+                <a:cs typeface="+mn-cs"/>
+              </a:defRPr>
+            </a:lvl1pPr>
+            <a:lvl2pPr marL="685800" indent="-228600" algn="l" defTabSz="914400" rtl="0" eaLnBrk="1" latinLnBrk="0" hangingPunct="1">
+              <a:lnSpc>
+                <a:spcPct val="90000"/>
+              </a:lnSpc>
+              <a:spcBef>
+                <a:spcPts val="500"/>
+              </a:spcBef>
+              <a:buFont typeface="Arial"/>
+              <a:buChar char="•"/>
+              <a:defRPr sz="2400" kern="1200">
+                <a:solidFill>
+                  <a:schemeClr val="tx1"/>
+                </a:solidFill>
+                <a:latin typeface="+mn-lt"/>
+                <a:ea typeface="+mn-ea"/>
+                <a:cs typeface="+mn-cs"/>
+              </a:defRPr>
+            </a:lvl2pPr>
+            <a:lvl3pPr marL="1143000" indent="-228600" algn="l" defTabSz="914400" rtl="0" eaLnBrk="1" latinLnBrk="0" hangingPunct="1">
+              <a:lnSpc>
+                <a:spcPct val="90000"/>
+              </a:lnSpc>
+              <a:spcBef>
+                <a:spcPts val="500"/>
+              </a:spcBef>
+              <a:buFont typeface="Arial"/>
+              <a:buChar char="•"/>
+              <a:defRPr sz="2000" kern="1200">
+                <a:solidFill>
+                  <a:schemeClr val="tx1"/>
+                </a:solidFill>
+                <a:latin typeface="+mn-lt"/>
+                <a:ea typeface="+mn-ea"/>
+                <a:cs typeface="+mn-cs"/>
+              </a:defRPr>
+            </a:lvl3pPr>
+            <a:lvl4pPr marL="1600200" indent="-228600" algn="l" defTabSz="914400" rtl="0" eaLnBrk="1" latinLnBrk="0" hangingPunct="1">
+              <a:lnSpc>
+                <a:spcPct val="90000"/>
+              </a:lnSpc>
+              <a:spcBef>
+                <a:spcPts val="500"/>
+              </a:spcBef>
+              <a:buFont typeface="Arial"/>
+              <a:buChar char="•"/>
+              <a:defRPr sz="1800" kern="1200">
+                <a:solidFill>
+                  <a:schemeClr val="tx1"/>
+                </a:solidFill>
+                <a:latin typeface="+mn-lt"/>
+                <a:ea typeface="+mn-ea"/>
+                <a:cs typeface="+mn-cs"/>
+              </a:defRPr>
+            </a:lvl4pPr>
+            <a:lvl5pPr marL="2057400" indent="-228600" algn="l" defTabSz="914400" rtl="0" eaLnBrk="1" latinLnBrk="0" hangingPunct="1">
+              <a:lnSpc>
+                <a:spcPct val="90000"/>
+              </a:lnSpc>
+              <a:spcBef>
+                <a:spcPts val="500"/>
+              </a:spcBef>
+              <a:buFont typeface="Arial"/>
+              <a:buChar char="•"/>
+              <a:defRPr sz="1800" kern="1200">
+                <a:solidFill>
+                  <a:schemeClr val="tx1"/>
+                </a:solidFill>
+                <a:latin typeface="+mn-lt"/>
+                <a:ea typeface="+mn-ea"/>
+                <a:cs typeface="+mn-cs"/>
+              </a:defRPr>
+            </a:lvl5pPr>
+            <a:lvl6pPr marL="2514600" indent="-228600" algn="l" defTabSz="914400" rtl="0" eaLnBrk="1" latinLnBrk="0" hangingPunct="1">
+              <a:lnSpc>
+                <a:spcPct val="90000"/>
+              </a:lnSpc>
+              <a:spcBef>
+                <a:spcPts val="500"/>
+              </a:spcBef>
+              <a:buFont typeface="Arial"/>
+              <a:buChar char="•"/>
+              <a:defRPr sz="1800" kern="1200">
+                <a:solidFill>
+                  <a:schemeClr val="tx1"/>
+                </a:solidFill>
+                <a:latin typeface="+mn-lt"/>
+                <a:ea typeface="+mn-ea"/>
+                <a:cs typeface="+mn-cs"/>
+              </a:defRPr>
+            </a:lvl6pPr>
+            <a:lvl7pPr marL="2971800" indent="-228600" algn="l" defTabSz="914400" rtl="0" eaLnBrk="1" latinLnBrk="0" hangingPunct="1">
+              <a:lnSpc>
+                <a:spcPct val="90000"/>
+              </a:lnSpc>
+              <a:spcBef>
+                <a:spcPts val="500"/>
+              </a:spcBef>
+              <a:buFont typeface="Arial"/>
+              <a:buChar char="•"/>
+              <a:defRPr sz="1800" kern="1200">
+                <a:solidFill>
+                  <a:schemeClr val="tx1"/>
+                </a:solidFill>
+                <a:latin typeface="+mn-lt"/>
+                <a:ea typeface="+mn-ea"/>
+                <a:cs typeface="+mn-cs"/>
+              </a:defRPr>
+            </a:lvl7pPr>
+            <a:lvl8pPr marL="3429000" indent="-228600" algn="l" defTabSz="914400" rtl="0" eaLnBrk="1" latinLnBrk="0" hangingPunct="1">
+              <a:lnSpc>
+                <a:spcPct val="90000"/>
+              </a:lnSpc>
+              <a:spcBef>
+                <a:spcPts val="500"/>
+              </a:spcBef>
+              <a:buFont typeface="Arial"/>
+              <a:buChar char="•"/>
+              <a:defRPr sz="1800" kern="1200">
+                <a:solidFill>
+                  <a:schemeClr val="tx1"/>
+                </a:solidFill>
+                <a:latin typeface="+mn-lt"/>
+                <a:ea typeface="+mn-ea"/>
+                <a:cs typeface="+mn-cs"/>
+              </a:defRPr>
+            </a:lvl8pPr>
+            <a:lvl9pPr marL="3886200" indent="-228600" algn="l" defTabSz="914400" rtl="0" eaLnBrk="1" latinLnBrk="0" hangingPunct="1">
+              <a:lnSpc>
+                <a:spcPct val="90000"/>
+              </a:lnSpc>
+              <a:spcBef>
+                <a:spcPts val="500"/>
+              </a:spcBef>
+              <a:buFont typeface="Arial"/>
+              <a:buChar char="•"/>
+              <a:defRPr sz="1800" kern="1200">
+                <a:solidFill>
+                  <a:schemeClr val="tx1"/>
+                </a:solidFill>
+                <a:latin typeface="+mn-lt"/>
+                <a:ea typeface="+mn-ea"/>
+                <a:cs typeface="+mn-cs"/>
+              </a:defRPr>
+            </a:lvl9pPr>
+          </a:lstStyle>
+          <a:p>
+            <a:pPr marL="0" indent="0" algn="ctr">
+              <a:buFont typeface="Arial"/>
+              <a:buNone/>
+            </a:pPr>
+            <a:r>
+              <a:rPr lang="en-US" sz="2400" dirty="0" smtClean="0"/>
+              <a:t>Optimal Members</a:t>
+            </a:r>
+            <a:endParaRPr lang="en-US" sz="2400" dirty="0" smtClean="0"/>
+          </a:p>
+        </p:txBody>
+      </p:sp>
+      <p:sp>
+        <p:nvSpPr>
+          <p:cNvPr id="9" name="Content Placeholder 2"/>
+          <p:cNvSpPr txBox="1">
+            <a:spLocks/>
+          </p:cNvSpPr>
+          <p:nvPr/>
+        </p:nvSpPr>
+        <p:spPr>
+          <a:xfrm>
+            <a:off x="3702254" y="3123350"/>
+            <a:ext cx="1376936" cy="1117750"/>
+          </a:xfrm>
+          <a:prstGeom prst="rect">
+            <a:avLst/>
+          </a:prstGeom>
+        </p:spPr>
+        <p:txBody>
+          <a:bodyPr vert="horz" lIns="91440" tIns="45720" rIns="91440" bIns="45720" rtlCol="0">
+            <a:normAutofit/>
+          </a:bodyPr>
+          <a:lstStyle>
+            <a:lvl1pPr marL="228600" indent="-228600" algn="l" defTabSz="914400" rtl="0" eaLnBrk="1" latinLnBrk="0" hangingPunct="1">
+              <a:lnSpc>
+                <a:spcPct val="90000"/>
+              </a:lnSpc>
+              <a:spcBef>
+                <a:spcPts val="1000"/>
+              </a:spcBef>
+              <a:buFont typeface="Arial"/>
+              <a:buChar char="•"/>
+              <a:defRPr sz="2800" kern="1200">
+                <a:solidFill>
+                  <a:schemeClr val="tx1"/>
+                </a:solidFill>
+                <a:latin typeface="+mn-lt"/>
+                <a:ea typeface="+mn-ea"/>
+                <a:cs typeface="+mn-cs"/>
+              </a:defRPr>
+            </a:lvl1pPr>
+            <a:lvl2pPr marL="685800" indent="-228600" algn="l" defTabSz="914400" rtl="0" eaLnBrk="1" latinLnBrk="0" hangingPunct="1">
+              <a:lnSpc>
+                <a:spcPct val="90000"/>
+              </a:lnSpc>
+              <a:spcBef>
+                <a:spcPts val="500"/>
+              </a:spcBef>
+              <a:buFont typeface="Arial"/>
+              <a:buChar char="•"/>
+              <a:defRPr sz="2400" kern="1200">
+                <a:solidFill>
+                  <a:schemeClr val="tx1"/>
+                </a:solidFill>
+                <a:latin typeface="+mn-lt"/>
+                <a:ea typeface="+mn-ea"/>
+                <a:cs typeface="+mn-cs"/>
+              </a:defRPr>
+            </a:lvl2pPr>
+            <a:lvl3pPr marL="1143000" indent="-228600" algn="l" defTabSz="914400" rtl="0" eaLnBrk="1" latinLnBrk="0" hangingPunct="1">
+              <a:lnSpc>
+                <a:spcPct val="90000"/>
+              </a:lnSpc>
+              <a:spcBef>
+                <a:spcPts val="500"/>
+              </a:spcBef>
+              <a:buFont typeface="Arial"/>
+              <a:buChar char="•"/>
+              <a:defRPr sz="2000" kern="1200">
+                <a:solidFill>
+                  <a:schemeClr val="tx1"/>
+                </a:solidFill>
+                <a:latin typeface="+mn-lt"/>
+                <a:ea typeface="+mn-ea"/>
+                <a:cs typeface="+mn-cs"/>
+              </a:defRPr>
+            </a:lvl3pPr>
+            <a:lvl4pPr marL="1600200" indent="-228600" algn="l" defTabSz="914400" rtl="0" eaLnBrk="1" latinLnBrk="0" hangingPunct="1">
+              <a:lnSpc>
+                <a:spcPct val="90000"/>
+              </a:lnSpc>
+              <a:spcBef>
+                <a:spcPts val="500"/>
+              </a:spcBef>
+              <a:buFont typeface="Arial"/>
+              <a:buChar char="•"/>
+              <a:defRPr sz="1800" kern="1200">
+                <a:solidFill>
+                  <a:schemeClr val="tx1"/>
+                </a:solidFill>
+                <a:latin typeface="+mn-lt"/>
+                <a:ea typeface="+mn-ea"/>
+                <a:cs typeface="+mn-cs"/>
+              </a:defRPr>
+            </a:lvl4pPr>
+            <a:lvl5pPr marL="2057400" indent="-228600" algn="l" defTabSz="914400" rtl="0" eaLnBrk="1" latinLnBrk="0" hangingPunct="1">
+              <a:lnSpc>
+                <a:spcPct val="90000"/>
+              </a:lnSpc>
+              <a:spcBef>
+                <a:spcPts val="500"/>
+              </a:spcBef>
+              <a:buFont typeface="Arial"/>
+              <a:buChar char="•"/>
+              <a:defRPr sz="1800" kern="1200">
+                <a:solidFill>
+                  <a:schemeClr val="tx1"/>
+                </a:solidFill>
+                <a:latin typeface="+mn-lt"/>
+                <a:ea typeface="+mn-ea"/>
+                <a:cs typeface="+mn-cs"/>
+              </a:defRPr>
+            </a:lvl5pPr>
+            <a:lvl6pPr marL="2514600" indent="-228600" algn="l" defTabSz="914400" rtl="0" eaLnBrk="1" latinLnBrk="0" hangingPunct="1">
+              <a:lnSpc>
+                <a:spcPct val="90000"/>
+              </a:lnSpc>
+              <a:spcBef>
+                <a:spcPts val="500"/>
+              </a:spcBef>
+              <a:buFont typeface="Arial"/>
+              <a:buChar char="•"/>
+              <a:defRPr sz="1800" kern="1200">
+                <a:solidFill>
+                  <a:schemeClr val="tx1"/>
+                </a:solidFill>
+                <a:latin typeface="+mn-lt"/>
+                <a:ea typeface="+mn-ea"/>
+                <a:cs typeface="+mn-cs"/>
+              </a:defRPr>
+            </a:lvl6pPr>
+            <a:lvl7pPr marL="2971800" indent="-228600" algn="l" defTabSz="914400" rtl="0" eaLnBrk="1" latinLnBrk="0" hangingPunct="1">
+              <a:lnSpc>
+                <a:spcPct val="90000"/>
+              </a:lnSpc>
+              <a:spcBef>
+                <a:spcPts val="500"/>
+              </a:spcBef>
+              <a:buFont typeface="Arial"/>
+              <a:buChar char="•"/>
+              <a:defRPr sz="1800" kern="1200">
+                <a:solidFill>
+                  <a:schemeClr val="tx1"/>
+                </a:solidFill>
+                <a:latin typeface="+mn-lt"/>
+                <a:ea typeface="+mn-ea"/>
+                <a:cs typeface="+mn-cs"/>
+              </a:defRPr>
+            </a:lvl7pPr>
+            <a:lvl8pPr marL="3429000" indent="-228600" algn="l" defTabSz="914400" rtl="0" eaLnBrk="1" latinLnBrk="0" hangingPunct="1">
+              <a:lnSpc>
+                <a:spcPct val="90000"/>
+              </a:lnSpc>
+              <a:spcBef>
+                <a:spcPts val="500"/>
+              </a:spcBef>
+              <a:buFont typeface="Arial"/>
+              <a:buChar char="•"/>
+              <a:defRPr sz="1800" kern="1200">
+                <a:solidFill>
+                  <a:schemeClr val="tx1"/>
+                </a:solidFill>
+                <a:latin typeface="+mn-lt"/>
+                <a:ea typeface="+mn-ea"/>
+                <a:cs typeface="+mn-cs"/>
+              </a:defRPr>
+            </a:lvl8pPr>
+            <a:lvl9pPr marL="3886200" indent="-228600" algn="l" defTabSz="914400" rtl="0" eaLnBrk="1" latinLnBrk="0" hangingPunct="1">
+              <a:lnSpc>
+                <a:spcPct val="90000"/>
+              </a:lnSpc>
+              <a:spcBef>
+                <a:spcPts val="500"/>
+              </a:spcBef>
+              <a:buFont typeface="Arial"/>
+              <a:buChar char="•"/>
+              <a:defRPr sz="1800" kern="1200">
+                <a:solidFill>
+                  <a:schemeClr val="tx1"/>
+                </a:solidFill>
+                <a:latin typeface="+mn-lt"/>
+                <a:ea typeface="+mn-ea"/>
+                <a:cs typeface="+mn-cs"/>
+              </a:defRPr>
+            </a:lvl9pPr>
+          </a:lstStyle>
+          <a:p>
+            <a:pPr marL="0" indent="0" algn="ctr">
+              <a:buFont typeface="Arial"/>
+              <a:buNone/>
+            </a:pPr>
+            <a:r>
+              <a:rPr lang="en-US" sz="2400" dirty="0" smtClean="0"/>
+              <a:t>Optimal Teams</a:t>
+            </a:r>
+            <a:endParaRPr lang="en-US" sz="2400" dirty="0" smtClean="0"/>
+          </a:p>
+        </p:txBody>
+      </p:sp>
+      <p:sp>
+        <p:nvSpPr>
+          <p:cNvPr id="11" name="Content Placeholder 2"/>
+          <p:cNvSpPr txBox="1">
+            <a:spLocks/>
+          </p:cNvSpPr>
+          <p:nvPr/>
+        </p:nvSpPr>
+        <p:spPr>
+          <a:xfrm>
+            <a:off x="5403955" y="3123350"/>
+            <a:ext cx="1410348" cy="1117750"/>
+          </a:xfrm>
+          <a:prstGeom prst="rect">
+            <a:avLst/>
+          </a:prstGeom>
+        </p:spPr>
+        <p:txBody>
+          <a:bodyPr vert="horz" lIns="91440" tIns="45720" rIns="91440" bIns="45720" rtlCol="0">
+            <a:normAutofit/>
+          </a:bodyPr>
+          <a:lstStyle>
+            <a:lvl1pPr marL="228600" indent="-228600" algn="l" defTabSz="914400" rtl="0" eaLnBrk="1" latinLnBrk="0" hangingPunct="1">
+              <a:lnSpc>
+                <a:spcPct val="90000"/>
+              </a:lnSpc>
+              <a:spcBef>
+                <a:spcPts val="1000"/>
+              </a:spcBef>
+              <a:buFont typeface="Arial"/>
+              <a:buChar char="•"/>
+              <a:defRPr sz="2800" kern="1200">
+                <a:solidFill>
+                  <a:schemeClr val="tx1"/>
+                </a:solidFill>
+                <a:latin typeface="+mn-lt"/>
+                <a:ea typeface="+mn-ea"/>
+                <a:cs typeface="+mn-cs"/>
+              </a:defRPr>
+            </a:lvl1pPr>
+            <a:lvl2pPr marL="685800" indent="-228600" algn="l" defTabSz="914400" rtl="0" eaLnBrk="1" latinLnBrk="0" hangingPunct="1">
+              <a:lnSpc>
+                <a:spcPct val="90000"/>
+              </a:lnSpc>
+              <a:spcBef>
+                <a:spcPts val="500"/>
+              </a:spcBef>
+              <a:buFont typeface="Arial"/>
+              <a:buChar char="•"/>
+              <a:defRPr sz="2400" kern="1200">
+                <a:solidFill>
+                  <a:schemeClr val="tx1"/>
+                </a:solidFill>
+                <a:latin typeface="+mn-lt"/>
+                <a:ea typeface="+mn-ea"/>
+                <a:cs typeface="+mn-cs"/>
+              </a:defRPr>
+            </a:lvl2pPr>
+            <a:lvl3pPr marL="1143000" indent="-228600" algn="l" defTabSz="914400" rtl="0" eaLnBrk="1" latinLnBrk="0" hangingPunct="1">
+              <a:lnSpc>
+                <a:spcPct val="90000"/>
+              </a:lnSpc>
+              <a:spcBef>
+                <a:spcPts val="500"/>
+              </a:spcBef>
+              <a:buFont typeface="Arial"/>
+              <a:buChar char="•"/>
+              <a:defRPr sz="2000" kern="1200">
+                <a:solidFill>
+                  <a:schemeClr val="tx1"/>
+                </a:solidFill>
+                <a:latin typeface="+mn-lt"/>
+                <a:ea typeface="+mn-ea"/>
+                <a:cs typeface="+mn-cs"/>
+              </a:defRPr>
+            </a:lvl3pPr>
+            <a:lvl4pPr marL="1600200" indent="-228600" algn="l" defTabSz="914400" rtl="0" eaLnBrk="1" latinLnBrk="0" hangingPunct="1">
+              <a:lnSpc>
+                <a:spcPct val="90000"/>
+              </a:lnSpc>
+              <a:spcBef>
+                <a:spcPts val="500"/>
+              </a:spcBef>
+              <a:buFont typeface="Arial"/>
+              <a:buChar char="•"/>
+              <a:defRPr sz="1800" kern="1200">
+                <a:solidFill>
+                  <a:schemeClr val="tx1"/>
+                </a:solidFill>
+                <a:latin typeface="+mn-lt"/>
+                <a:ea typeface="+mn-ea"/>
+                <a:cs typeface="+mn-cs"/>
+              </a:defRPr>
+            </a:lvl4pPr>
+            <a:lvl5pPr marL="2057400" indent="-228600" algn="l" defTabSz="914400" rtl="0" eaLnBrk="1" latinLnBrk="0" hangingPunct="1">
+              <a:lnSpc>
+                <a:spcPct val="90000"/>
+              </a:lnSpc>
+              <a:spcBef>
+                <a:spcPts val="500"/>
+              </a:spcBef>
+              <a:buFont typeface="Arial"/>
+              <a:buChar char="•"/>
+              <a:defRPr sz="1800" kern="1200">
+                <a:solidFill>
+                  <a:schemeClr val="tx1"/>
+                </a:solidFill>
+                <a:latin typeface="+mn-lt"/>
+                <a:ea typeface="+mn-ea"/>
+                <a:cs typeface="+mn-cs"/>
+              </a:defRPr>
+            </a:lvl5pPr>
+            <a:lvl6pPr marL="2514600" indent="-228600" algn="l" defTabSz="914400" rtl="0" eaLnBrk="1" latinLnBrk="0" hangingPunct="1">
+              <a:lnSpc>
+                <a:spcPct val="90000"/>
+              </a:lnSpc>
+              <a:spcBef>
+                <a:spcPts val="500"/>
+              </a:spcBef>
+              <a:buFont typeface="Arial"/>
+              <a:buChar char="•"/>
+              <a:defRPr sz="1800" kern="1200">
+                <a:solidFill>
+                  <a:schemeClr val="tx1"/>
+                </a:solidFill>
+                <a:latin typeface="+mn-lt"/>
+                <a:ea typeface="+mn-ea"/>
+                <a:cs typeface="+mn-cs"/>
+              </a:defRPr>
+            </a:lvl6pPr>
+            <a:lvl7pPr marL="2971800" indent="-228600" algn="l" defTabSz="914400" rtl="0" eaLnBrk="1" latinLnBrk="0" hangingPunct="1">
+              <a:lnSpc>
+                <a:spcPct val="90000"/>
+              </a:lnSpc>
+              <a:spcBef>
+                <a:spcPts val="500"/>
+              </a:spcBef>
+              <a:buFont typeface="Arial"/>
+              <a:buChar char="•"/>
+              <a:defRPr sz="1800" kern="1200">
+                <a:solidFill>
+                  <a:schemeClr val="tx1"/>
+                </a:solidFill>
+                <a:latin typeface="+mn-lt"/>
+                <a:ea typeface="+mn-ea"/>
+                <a:cs typeface="+mn-cs"/>
+              </a:defRPr>
+            </a:lvl7pPr>
+            <a:lvl8pPr marL="3429000" indent="-228600" algn="l" defTabSz="914400" rtl="0" eaLnBrk="1" latinLnBrk="0" hangingPunct="1">
+              <a:lnSpc>
+                <a:spcPct val="90000"/>
+              </a:lnSpc>
+              <a:spcBef>
+                <a:spcPts val="500"/>
+              </a:spcBef>
+              <a:buFont typeface="Arial"/>
+              <a:buChar char="•"/>
+              <a:defRPr sz="1800" kern="1200">
+                <a:solidFill>
+                  <a:schemeClr val="tx1"/>
+                </a:solidFill>
+                <a:latin typeface="+mn-lt"/>
+                <a:ea typeface="+mn-ea"/>
+                <a:cs typeface="+mn-cs"/>
+              </a:defRPr>
+            </a:lvl8pPr>
+            <a:lvl9pPr marL="3886200" indent="-228600" algn="l" defTabSz="914400" rtl="0" eaLnBrk="1" latinLnBrk="0" hangingPunct="1">
+              <a:lnSpc>
+                <a:spcPct val="90000"/>
+              </a:lnSpc>
+              <a:spcBef>
+                <a:spcPts val="500"/>
+              </a:spcBef>
+              <a:buFont typeface="Arial"/>
+              <a:buChar char="•"/>
+              <a:defRPr sz="1800" kern="1200">
+                <a:solidFill>
+                  <a:schemeClr val="tx1"/>
+                </a:solidFill>
+                <a:latin typeface="+mn-lt"/>
+                <a:ea typeface="+mn-ea"/>
+                <a:cs typeface="+mn-cs"/>
+              </a:defRPr>
+            </a:lvl9pPr>
+          </a:lstStyle>
+          <a:p>
+            <a:pPr marL="0" indent="0" algn="ctr">
+              <a:buFont typeface="Arial"/>
+              <a:buNone/>
+            </a:pPr>
+            <a:r>
+              <a:rPr lang="en-US" sz="2400" smtClean="0"/>
+              <a:t>Design Team</a:t>
+            </a:r>
+            <a:endParaRPr lang="en-US" sz="2400" dirty="0" smtClean="0"/>
+          </a:p>
+        </p:txBody>
+      </p:sp>
+      <p:sp>
+        <p:nvSpPr>
+          <p:cNvPr id="12" name="Content Placeholder 2"/>
+          <p:cNvSpPr txBox="1">
+            <a:spLocks/>
+          </p:cNvSpPr>
+          <p:nvPr/>
+        </p:nvSpPr>
+        <p:spPr>
+          <a:xfrm>
+            <a:off x="7070056" y="3137504"/>
+            <a:ext cx="1410348" cy="1117750"/>
+          </a:xfrm>
+          <a:prstGeom prst="rect">
+            <a:avLst/>
+          </a:prstGeom>
+        </p:spPr>
+        <p:txBody>
+          <a:bodyPr vert="horz" lIns="91440" tIns="45720" rIns="91440" bIns="45720" rtlCol="0">
+            <a:normAutofit/>
+          </a:bodyPr>
+          <a:lstStyle>
+            <a:lvl1pPr marL="228600" indent="-228600" algn="l" defTabSz="914400" rtl="0" eaLnBrk="1" latinLnBrk="0" hangingPunct="1">
+              <a:lnSpc>
+                <a:spcPct val="90000"/>
+              </a:lnSpc>
+              <a:spcBef>
+                <a:spcPts val="1000"/>
+              </a:spcBef>
+              <a:buFont typeface="Arial"/>
+              <a:buChar char="•"/>
+              <a:defRPr sz="2800" kern="1200">
+                <a:solidFill>
+                  <a:schemeClr val="tx1"/>
+                </a:solidFill>
+                <a:latin typeface="+mn-lt"/>
+                <a:ea typeface="+mn-ea"/>
+                <a:cs typeface="+mn-cs"/>
+              </a:defRPr>
+            </a:lvl1pPr>
+            <a:lvl2pPr marL="685800" indent="-228600" algn="l" defTabSz="914400" rtl="0" eaLnBrk="1" latinLnBrk="0" hangingPunct="1">
+              <a:lnSpc>
+                <a:spcPct val="90000"/>
+              </a:lnSpc>
+              <a:spcBef>
+                <a:spcPts val="500"/>
+              </a:spcBef>
+              <a:buFont typeface="Arial"/>
+              <a:buChar char="•"/>
+              <a:defRPr sz="2400" kern="1200">
+                <a:solidFill>
+                  <a:schemeClr val="tx1"/>
+                </a:solidFill>
+                <a:latin typeface="+mn-lt"/>
+                <a:ea typeface="+mn-ea"/>
+                <a:cs typeface="+mn-cs"/>
+              </a:defRPr>
+            </a:lvl2pPr>
+            <a:lvl3pPr marL="1143000" indent="-228600" algn="l" defTabSz="914400" rtl="0" eaLnBrk="1" latinLnBrk="0" hangingPunct="1">
+              <a:lnSpc>
+                <a:spcPct val="90000"/>
+              </a:lnSpc>
+              <a:spcBef>
+                <a:spcPts val="500"/>
+              </a:spcBef>
+              <a:buFont typeface="Arial"/>
+              <a:buChar char="•"/>
+              <a:defRPr sz="2000" kern="1200">
+                <a:solidFill>
+                  <a:schemeClr val="tx1"/>
+                </a:solidFill>
+                <a:latin typeface="+mn-lt"/>
+                <a:ea typeface="+mn-ea"/>
+                <a:cs typeface="+mn-cs"/>
+              </a:defRPr>
+            </a:lvl3pPr>
+            <a:lvl4pPr marL="1600200" indent="-228600" algn="l" defTabSz="914400" rtl="0" eaLnBrk="1" latinLnBrk="0" hangingPunct="1">
+              <a:lnSpc>
+                <a:spcPct val="90000"/>
+              </a:lnSpc>
+              <a:spcBef>
+                <a:spcPts val="500"/>
+              </a:spcBef>
+              <a:buFont typeface="Arial"/>
+              <a:buChar char="•"/>
+              <a:defRPr sz="1800" kern="1200">
+                <a:solidFill>
+                  <a:schemeClr val="tx1"/>
+                </a:solidFill>
+                <a:latin typeface="+mn-lt"/>
+                <a:ea typeface="+mn-ea"/>
+                <a:cs typeface="+mn-cs"/>
+              </a:defRPr>
+            </a:lvl4pPr>
+            <a:lvl5pPr marL="2057400" indent="-228600" algn="l" defTabSz="914400" rtl="0" eaLnBrk="1" latinLnBrk="0" hangingPunct="1">
+              <a:lnSpc>
+                <a:spcPct val="90000"/>
+              </a:lnSpc>
+              <a:spcBef>
+                <a:spcPts val="500"/>
+              </a:spcBef>
+              <a:buFont typeface="Arial"/>
+              <a:buChar char="•"/>
+              <a:defRPr sz="1800" kern="1200">
+                <a:solidFill>
+                  <a:schemeClr val="tx1"/>
+                </a:solidFill>
+                <a:latin typeface="+mn-lt"/>
+                <a:ea typeface="+mn-ea"/>
+                <a:cs typeface="+mn-cs"/>
+              </a:defRPr>
+            </a:lvl5pPr>
+            <a:lvl6pPr marL="2514600" indent="-228600" algn="l" defTabSz="914400" rtl="0" eaLnBrk="1" latinLnBrk="0" hangingPunct="1">
+              <a:lnSpc>
+                <a:spcPct val="90000"/>
+              </a:lnSpc>
+              <a:spcBef>
+                <a:spcPts val="500"/>
+              </a:spcBef>
+              <a:buFont typeface="Arial"/>
+              <a:buChar char="•"/>
+              <a:defRPr sz="1800" kern="1200">
+                <a:solidFill>
+                  <a:schemeClr val="tx1"/>
+                </a:solidFill>
+                <a:latin typeface="+mn-lt"/>
+                <a:ea typeface="+mn-ea"/>
+                <a:cs typeface="+mn-cs"/>
+              </a:defRPr>
+            </a:lvl6pPr>
+            <a:lvl7pPr marL="2971800" indent="-228600" algn="l" defTabSz="914400" rtl="0" eaLnBrk="1" latinLnBrk="0" hangingPunct="1">
+              <a:lnSpc>
+                <a:spcPct val="90000"/>
+              </a:lnSpc>
+              <a:spcBef>
+                <a:spcPts val="500"/>
+              </a:spcBef>
+              <a:buFont typeface="Arial"/>
+              <a:buChar char="•"/>
+              <a:defRPr sz="1800" kern="1200">
+                <a:solidFill>
+                  <a:schemeClr val="tx1"/>
+                </a:solidFill>
+                <a:latin typeface="+mn-lt"/>
+                <a:ea typeface="+mn-ea"/>
+                <a:cs typeface="+mn-cs"/>
+              </a:defRPr>
+            </a:lvl7pPr>
+            <a:lvl8pPr marL="3429000" indent="-228600" algn="l" defTabSz="914400" rtl="0" eaLnBrk="1" latinLnBrk="0" hangingPunct="1">
+              <a:lnSpc>
+                <a:spcPct val="90000"/>
+              </a:lnSpc>
+              <a:spcBef>
+                <a:spcPts val="500"/>
+              </a:spcBef>
+              <a:buFont typeface="Arial"/>
+              <a:buChar char="•"/>
+              <a:defRPr sz="1800" kern="1200">
+                <a:solidFill>
+                  <a:schemeClr val="tx1"/>
+                </a:solidFill>
+                <a:latin typeface="+mn-lt"/>
+                <a:ea typeface="+mn-ea"/>
+                <a:cs typeface="+mn-cs"/>
+              </a:defRPr>
+            </a:lvl8pPr>
+            <a:lvl9pPr marL="3886200" indent="-228600" algn="l" defTabSz="914400" rtl="0" eaLnBrk="1" latinLnBrk="0" hangingPunct="1">
+              <a:lnSpc>
+                <a:spcPct val="90000"/>
+              </a:lnSpc>
+              <a:spcBef>
+                <a:spcPts val="500"/>
+              </a:spcBef>
+              <a:buFont typeface="Arial"/>
+              <a:buChar char="•"/>
+              <a:defRPr sz="1800" kern="1200">
+                <a:solidFill>
+                  <a:schemeClr val="tx1"/>
+                </a:solidFill>
+                <a:latin typeface="+mn-lt"/>
+                <a:ea typeface="+mn-ea"/>
+                <a:cs typeface="+mn-cs"/>
+              </a:defRPr>
+            </a:lvl9pPr>
+          </a:lstStyle>
+          <a:p>
+            <a:pPr marL="0" indent="0" algn="ctr">
+              <a:buFont typeface="Arial"/>
+              <a:buNone/>
+            </a:pPr>
+            <a:r>
+              <a:rPr lang="en-US" sz="2400" dirty="0" smtClean="0"/>
+              <a:t>Lobby Team</a:t>
+            </a:r>
+            <a:endParaRPr lang="en-US" sz="2400" dirty="0" smtClean="0"/>
+          </a:p>
+        </p:txBody>
+      </p:sp>
+      <p:sp>
+        <p:nvSpPr>
+          <p:cNvPr id="13" name="Content Placeholder 2"/>
+          <p:cNvSpPr txBox="1">
+            <a:spLocks/>
+          </p:cNvSpPr>
+          <p:nvPr/>
+        </p:nvSpPr>
+        <p:spPr>
+          <a:xfrm>
+            <a:off x="8736157" y="3123350"/>
+            <a:ext cx="1542505" cy="1117750"/>
+          </a:xfrm>
+          <a:prstGeom prst="rect">
+            <a:avLst/>
+          </a:prstGeom>
+        </p:spPr>
+        <p:txBody>
+          <a:bodyPr vert="horz" lIns="91440" tIns="45720" rIns="91440" bIns="45720" rtlCol="0">
+            <a:noAutofit/>
+          </a:bodyPr>
+          <a:lstStyle>
+            <a:lvl1pPr marL="228600" indent="-228600" algn="l" defTabSz="914400" rtl="0" eaLnBrk="1" latinLnBrk="0" hangingPunct="1">
+              <a:lnSpc>
+                <a:spcPct val="90000"/>
+              </a:lnSpc>
+              <a:spcBef>
+                <a:spcPts val="1000"/>
+              </a:spcBef>
+              <a:buFont typeface="Arial"/>
+              <a:buChar char="•"/>
+              <a:defRPr sz="2800" kern="1200">
+                <a:solidFill>
+                  <a:schemeClr val="tx1"/>
+                </a:solidFill>
+                <a:latin typeface="+mn-lt"/>
+                <a:ea typeface="+mn-ea"/>
+                <a:cs typeface="+mn-cs"/>
+              </a:defRPr>
+            </a:lvl1pPr>
+            <a:lvl2pPr marL="685800" indent="-228600" algn="l" defTabSz="914400" rtl="0" eaLnBrk="1" latinLnBrk="0" hangingPunct="1">
+              <a:lnSpc>
+                <a:spcPct val="90000"/>
+              </a:lnSpc>
+              <a:spcBef>
+                <a:spcPts val="500"/>
+              </a:spcBef>
+              <a:buFont typeface="Arial"/>
+              <a:buChar char="•"/>
+              <a:defRPr sz="2400" kern="1200">
+                <a:solidFill>
+                  <a:schemeClr val="tx1"/>
+                </a:solidFill>
+                <a:latin typeface="+mn-lt"/>
+                <a:ea typeface="+mn-ea"/>
+                <a:cs typeface="+mn-cs"/>
+              </a:defRPr>
+            </a:lvl2pPr>
+            <a:lvl3pPr marL="1143000" indent="-228600" algn="l" defTabSz="914400" rtl="0" eaLnBrk="1" latinLnBrk="0" hangingPunct="1">
+              <a:lnSpc>
+                <a:spcPct val="90000"/>
+              </a:lnSpc>
+              <a:spcBef>
+                <a:spcPts val="500"/>
+              </a:spcBef>
+              <a:buFont typeface="Arial"/>
+              <a:buChar char="•"/>
+              <a:defRPr sz="2000" kern="1200">
+                <a:solidFill>
+                  <a:schemeClr val="tx1"/>
+                </a:solidFill>
+                <a:latin typeface="+mn-lt"/>
+                <a:ea typeface="+mn-ea"/>
+                <a:cs typeface="+mn-cs"/>
+              </a:defRPr>
+            </a:lvl3pPr>
+            <a:lvl4pPr marL="1600200" indent="-228600" algn="l" defTabSz="914400" rtl="0" eaLnBrk="1" latinLnBrk="0" hangingPunct="1">
+              <a:lnSpc>
+                <a:spcPct val="90000"/>
+              </a:lnSpc>
+              <a:spcBef>
+                <a:spcPts val="500"/>
+              </a:spcBef>
+              <a:buFont typeface="Arial"/>
+              <a:buChar char="•"/>
+              <a:defRPr sz="1800" kern="1200">
+                <a:solidFill>
+                  <a:schemeClr val="tx1"/>
+                </a:solidFill>
+                <a:latin typeface="+mn-lt"/>
+                <a:ea typeface="+mn-ea"/>
+                <a:cs typeface="+mn-cs"/>
+              </a:defRPr>
+            </a:lvl4pPr>
+            <a:lvl5pPr marL="2057400" indent="-228600" algn="l" defTabSz="914400" rtl="0" eaLnBrk="1" latinLnBrk="0" hangingPunct="1">
+              <a:lnSpc>
+                <a:spcPct val="90000"/>
+              </a:lnSpc>
+              <a:spcBef>
+                <a:spcPts val="500"/>
+              </a:spcBef>
+              <a:buFont typeface="Arial"/>
+              <a:buChar char="•"/>
+              <a:defRPr sz="1800" kern="1200">
+                <a:solidFill>
+                  <a:schemeClr val="tx1"/>
+                </a:solidFill>
+                <a:latin typeface="+mn-lt"/>
+                <a:ea typeface="+mn-ea"/>
+                <a:cs typeface="+mn-cs"/>
+              </a:defRPr>
+            </a:lvl5pPr>
+            <a:lvl6pPr marL="2514600" indent="-228600" algn="l" defTabSz="914400" rtl="0" eaLnBrk="1" latinLnBrk="0" hangingPunct="1">
+              <a:lnSpc>
+                <a:spcPct val="90000"/>
+              </a:lnSpc>
+              <a:spcBef>
+                <a:spcPts val="500"/>
+              </a:spcBef>
+              <a:buFont typeface="Arial"/>
+              <a:buChar char="•"/>
+              <a:defRPr sz="1800" kern="1200">
+                <a:solidFill>
+                  <a:schemeClr val="tx1"/>
+                </a:solidFill>
+                <a:latin typeface="+mn-lt"/>
+                <a:ea typeface="+mn-ea"/>
+                <a:cs typeface="+mn-cs"/>
+              </a:defRPr>
+            </a:lvl6pPr>
+            <a:lvl7pPr marL="2971800" indent="-228600" algn="l" defTabSz="914400" rtl="0" eaLnBrk="1" latinLnBrk="0" hangingPunct="1">
+              <a:lnSpc>
+                <a:spcPct val="90000"/>
+              </a:lnSpc>
+              <a:spcBef>
+                <a:spcPts val="500"/>
+              </a:spcBef>
+              <a:buFont typeface="Arial"/>
+              <a:buChar char="•"/>
+              <a:defRPr sz="1800" kern="1200">
+                <a:solidFill>
+                  <a:schemeClr val="tx1"/>
+                </a:solidFill>
+                <a:latin typeface="+mn-lt"/>
+                <a:ea typeface="+mn-ea"/>
+                <a:cs typeface="+mn-cs"/>
+              </a:defRPr>
+            </a:lvl7pPr>
+            <a:lvl8pPr marL="3429000" indent="-228600" algn="l" defTabSz="914400" rtl="0" eaLnBrk="1" latinLnBrk="0" hangingPunct="1">
+              <a:lnSpc>
+                <a:spcPct val="90000"/>
+              </a:lnSpc>
+              <a:spcBef>
+                <a:spcPts val="500"/>
+              </a:spcBef>
+              <a:buFont typeface="Arial"/>
+              <a:buChar char="•"/>
+              <a:defRPr sz="1800" kern="1200">
+                <a:solidFill>
+                  <a:schemeClr val="tx1"/>
+                </a:solidFill>
+                <a:latin typeface="+mn-lt"/>
+                <a:ea typeface="+mn-ea"/>
+                <a:cs typeface="+mn-cs"/>
+              </a:defRPr>
+            </a:lvl8pPr>
+            <a:lvl9pPr marL="3886200" indent="-228600" algn="l" defTabSz="914400" rtl="0" eaLnBrk="1" latinLnBrk="0" hangingPunct="1">
+              <a:lnSpc>
+                <a:spcPct val="90000"/>
+              </a:lnSpc>
+              <a:spcBef>
+                <a:spcPts val="500"/>
+              </a:spcBef>
+              <a:buFont typeface="Arial"/>
+              <a:buChar char="•"/>
+              <a:defRPr sz="1800" kern="1200">
+                <a:solidFill>
+                  <a:schemeClr val="tx1"/>
+                </a:solidFill>
+                <a:latin typeface="+mn-lt"/>
+                <a:ea typeface="+mn-ea"/>
+                <a:cs typeface="+mn-cs"/>
+              </a:defRPr>
+            </a:lvl9pPr>
+          </a:lstStyle>
+          <a:p>
+            <a:pPr marL="0" indent="0" algn="ctr">
+              <a:buFont typeface="Arial"/>
+              <a:buNone/>
+            </a:pPr>
+            <a:r>
+              <a:rPr lang="en-US" sz="2400" dirty="0" smtClean="0"/>
+              <a:t>Planning Team</a:t>
+            </a:r>
+            <a:endParaRPr lang="en-US" sz="2400" dirty="0" smtClean="0"/>
+          </a:p>
+        </p:txBody>
+      </p:sp>
+      <p:sp>
+        <p:nvSpPr>
+          <p:cNvPr id="14" name="Chevron 13"/>
+          <p:cNvSpPr/>
+          <p:nvPr/>
+        </p:nvSpPr>
+        <p:spPr>
+          <a:xfrm>
+            <a:off x="5108416" y="3211722"/>
+            <a:ext cx="358367" cy="579228"/>
+          </a:xfrm>
+          <a:prstGeom prst="chevron">
+            <a:avLst/>
+          </a:prstGeom>
+          <a:solidFill>
+            <a:srgbClr val="37BDA7"/>
+          </a:solidFill>
+          <a:ln>
+            <a:noFill/>
+          </a:ln>
+        </p:spPr>
+        <p:style>
+          <a:lnRef idx="2">
+            <a:schemeClr val="accent1">
+              <a:shade val="50000"/>
+            </a:schemeClr>
+          </a:lnRef>
+          <a:fillRef idx="1">
+            <a:schemeClr val="accent1"/>
+          </a:fillRef>
+          <a:effectRef idx="0">
+            <a:schemeClr val="accent1"/>
+          </a:effectRef>
+          <a:fontRef idx="minor">
+            <a:schemeClr val="lt1"/>
+          </a:fontRef>
+        </p:style>
+        <p:txBody>
+          <a:bodyPr rtlCol="0" anchor="ctr"/>
+          <a:lstStyle/>
+          <a:p>
+            <a:pPr algn="ctr"/>
+            <a:endParaRPr lang="en-US" sz="2400">
+              <a:solidFill>
+                <a:schemeClr val="tx1"/>
+              </a:solidFill>
+            </a:endParaRPr>
+          </a:p>
+        </p:txBody>
+      </p:sp>
+      <p:sp>
+        <p:nvSpPr>
+          <p:cNvPr id="15" name="Chevron 14"/>
+          <p:cNvSpPr/>
+          <p:nvPr/>
+        </p:nvSpPr>
+        <p:spPr>
+          <a:xfrm>
+            <a:off x="6842280" y="3211722"/>
+            <a:ext cx="358367" cy="579228"/>
+          </a:xfrm>
+          <a:prstGeom prst="chevron">
+            <a:avLst/>
+          </a:prstGeom>
+          <a:solidFill>
+            <a:srgbClr val="2DA5DB"/>
+          </a:solidFill>
+          <a:ln>
+            <a:noFill/>
+          </a:ln>
+        </p:spPr>
+        <p:style>
+          <a:lnRef idx="2">
+            <a:schemeClr val="accent1">
+              <a:shade val="50000"/>
+            </a:schemeClr>
+          </a:lnRef>
+          <a:fillRef idx="1">
+            <a:schemeClr val="accent1"/>
+          </a:fillRef>
+          <a:effectRef idx="0">
+            <a:schemeClr val="accent1"/>
+          </a:effectRef>
+          <a:fontRef idx="minor">
+            <a:schemeClr val="lt1"/>
+          </a:fontRef>
+        </p:style>
+        <p:txBody>
+          <a:bodyPr rtlCol="0" anchor="ctr"/>
+          <a:lstStyle/>
+          <a:p>
+            <a:pPr algn="ctr"/>
+            <a:endParaRPr lang="en-US" sz="2400">
+              <a:solidFill>
+                <a:schemeClr val="bg1"/>
+              </a:solidFill>
+            </a:endParaRPr>
+          </a:p>
+        </p:txBody>
+      </p:sp>
+      <p:sp>
+        <p:nvSpPr>
+          <p:cNvPr id="16" name="Chevron 15"/>
+          <p:cNvSpPr/>
+          <p:nvPr/>
+        </p:nvSpPr>
+        <p:spPr>
+          <a:xfrm>
+            <a:off x="3340046" y="3211722"/>
+            <a:ext cx="358367" cy="579228"/>
+          </a:xfrm>
+          <a:prstGeom prst="chevron">
+            <a:avLst/>
+          </a:prstGeom>
+          <a:solidFill>
+            <a:srgbClr val="37BDA7"/>
+          </a:solidFill>
+          <a:ln>
+            <a:noFill/>
+          </a:ln>
+        </p:spPr>
+        <p:style>
+          <a:lnRef idx="2">
+            <a:schemeClr val="accent1">
+              <a:shade val="50000"/>
+            </a:schemeClr>
+          </a:lnRef>
+          <a:fillRef idx="1">
+            <a:schemeClr val="accent1"/>
+          </a:fillRef>
+          <a:effectRef idx="0">
+            <a:schemeClr val="accent1"/>
+          </a:effectRef>
+          <a:fontRef idx="minor">
+            <a:schemeClr val="lt1"/>
+          </a:fontRef>
+        </p:style>
+        <p:txBody>
+          <a:bodyPr rtlCol="0" anchor="ctr"/>
+          <a:lstStyle/>
+          <a:p>
+            <a:pPr algn="ctr"/>
+            <a:endParaRPr lang="en-US" sz="2400">
+              <a:solidFill>
+                <a:schemeClr val="tx1"/>
+              </a:solidFill>
+            </a:endParaRPr>
+          </a:p>
+        </p:txBody>
+      </p:sp>
+      <p:sp>
+        <p:nvSpPr>
+          <p:cNvPr id="17" name="Chevron 16"/>
+          <p:cNvSpPr/>
+          <p:nvPr/>
+        </p:nvSpPr>
+        <p:spPr>
+          <a:xfrm>
+            <a:off x="10240995" y="3211722"/>
+            <a:ext cx="358367" cy="579228"/>
+          </a:xfrm>
+          <a:prstGeom prst="chevron">
+            <a:avLst/>
+          </a:prstGeom>
+          <a:solidFill>
+            <a:srgbClr val="2DA5DB"/>
+          </a:solidFill>
+          <a:ln>
+            <a:noFill/>
+          </a:ln>
+        </p:spPr>
+        <p:style>
+          <a:lnRef idx="2">
+            <a:schemeClr val="accent1">
+              <a:shade val="50000"/>
+            </a:schemeClr>
+          </a:lnRef>
+          <a:fillRef idx="1">
+            <a:schemeClr val="accent1"/>
+          </a:fillRef>
+          <a:effectRef idx="0">
+            <a:schemeClr val="accent1"/>
+          </a:effectRef>
+          <a:fontRef idx="minor">
+            <a:schemeClr val="lt1"/>
+          </a:fontRef>
+        </p:style>
+        <p:txBody>
+          <a:bodyPr rtlCol="0" anchor="ctr"/>
+          <a:lstStyle/>
+          <a:p>
+            <a:pPr algn="ctr"/>
+            <a:endParaRPr lang="en-US" sz="2400">
+              <a:solidFill>
+                <a:schemeClr val="bg1"/>
+              </a:solidFill>
+            </a:endParaRPr>
+          </a:p>
+        </p:txBody>
+      </p:sp>
+      <p:sp>
+        <p:nvSpPr>
+          <p:cNvPr id="18" name="Content Placeholder 2"/>
+          <p:cNvSpPr txBox="1">
+            <a:spLocks/>
+          </p:cNvSpPr>
+          <p:nvPr/>
+        </p:nvSpPr>
+        <p:spPr>
+          <a:xfrm>
+            <a:off x="10534416" y="3123350"/>
+            <a:ext cx="1542505" cy="1117750"/>
+          </a:xfrm>
+          <a:prstGeom prst="rect">
+            <a:avLst/>
+          </a:prstGeom>
+        </p:spPr>
+        <p:txBody>
+          <a:bodyPr vert="horz" lIns="91440" tIns="45720" rIns="91440" bIns="45720" rtlCol="0">
+            <a:noAutofit/>
+          </a:bodyPr>
+          <a:lstStyle>
+            <a:lvl1pPr marL="228600" indent="-228600" algn="l" defTabSz="914400" rtl="0" eaLnBrk="1" latinLnBrk="0" hangingPunct="1">
+              <a:lnSpc>
+                <a:spcPct val="90000"/>
+              </a:lnSpc>
+              <a:spcBef>
+                <a:spcPts val="1000"/>
+              </a:spcBef>
+              <a:buFont typeface="Arial"/>
+              <a:buChar char="•"/>
+              <a:defRPr sz="2800" kern="1200">
+                <a:solidFill>
+                  <a:schemeClr val="tx1"/>
+                </a:solidFill>
+                <a:latin typeface="+mn-lt"/>
+                <a:ea typeface="+mn-ea"/>
+                <a:cs typeface="+mn-cs"/>
+              </a:defRPr>
+            </a:lvl1pPr>
+            <a:lvl2pPr marL="685800" indent="-228600" algn="l" defTabSz="914400" rtl="0" eaLnBrk="1" latinLnBrk="0" hangingPunct="1">
+              <a:lnSpc>
+                <a:spcPct val="90000"/>
+              </a:lnSpc>
+              <a:spcBef>
+                <a:spcPts val="500"/>
+              </a:spcBef>
+              <a:buFont typeface="Arial"/>
+              <a:buChar char="•"/>
+              <a:defRPr sz="2400" kern="1200">
+                <a:solidFill>
+                  <a:schemeClr val="tx1"/>
+                </a:solidFill>
+                <a:latin typeface="+mn-lt"/>
+                <a:ea typeface="+mn-ea"/>
+                <a:cs typeface="+mn-cs"/>
+              </a:defRPr>
+            </a:lvl2pPr>
+            <a:lvl3pPr marL="1143000" indent="-228600" algn="l" defTabSz="914400" rtl="0" eaLnBrk="1" latinLnBrk="0" hangingPunct="1">
+              <a:lnSpc>
+                <a:spcPct val="90000"/>
+              </a:lnSpc>
+              <a:spcBef>
+                <a:spcPts val="500"/>
+              </a:spcBef>
+              <a:buFont typeface="Arial"/>
+              <a:buChar char="•"/>
+              <a:defRPr sz="2000" kern="1200">
+                <a:solidFill>
+                  <a:schemeClr val="tx1"/>
+                </a:solidFill>
+                <a:latin typeface="+mn-lt"/>
+                <a:ea typeface="+mn-ea"/>
+                <a:cs typeface="+mn-cs"/>
+              </a:defRPr>
+            </a:lvl3pPr>
+            <a:lvl4pPr marL="1600200" indent="-228600" algn="l" defTabSz="914400" rtl="0" eaLnBrk="1" latinLnBrk="0" hangingPunct="1">
+              <a:lnSpc>
+                <a:spcPct val="90000"/>
+              </a:lnSpc>
+              <a:spcBef>
+                <a:spcPts val="500"/>
+              </a:spcBef>
+              <a:buFont typeface="Arial"/>
+              <a:buChar char="•"/>
+              <a:defRPr sz="1800" kern="1200">
+                <a:solidFill>
+                  <a:schemeClr val="tx1"/>
+                </a:solidFill>
+                <a:latin typeface="+mn-lt"/>
+                <a:ea typeface="+mn-ea"/>
+                <a:cs typeface="+mn-cs"/>
+              </a:defRPr>
+            </a:lvl4pPr>
+            <a:lvl5pPr marL="2057400" indent="-228600" algn="l" defTabSz="914400" rtl="0" eaLnBrk="1" latinLnBrk="0" hangingPunct="1">
+              <a:lnSpc>
+                <a:spcPct val="90000"/>
+              </a:lnSpc>
+              <a:spcBef>
+                <a:spcPts val="500"/>
+              </a:spcBef>
+              <a:buFont typeface="Arial"/>
+              <a:buChar char="•"/>
+              <a:defRPr sz="1800" kern="1200">
+                <a:solidFill>
+                  <a:schemeClr val="tx1"/>
+                </a:solidFill>
+                <a:latin typeface="+mn-lt"/>
+                <a:ea typeface="+mn-ea"/>
+                <a:cs typeface="+mn-cs"/>
+              </a:defRPr>
+            </a:lvl5pPr>
+            <a:lvl6pPr marL="2514600" indent="-228600" algn="l" defTabSz="914400" rtl="0" eaLnBrk="1" latinLnBrk="0" hangingPunct="1">
+              <a:lnSpc>
+                <a:spcPct val="90000"/>
+              </a:lnSpc>
+              <a:spcBef>
+                <a:spcPts val="500"/>
+              </a:spcBef>
+              <a:buFont typeface="Arial"/>
+              <a:buChar char="•"/>
+              <a:defRPr sz="1800" kern="1200">
+                <a:solidFill>
+                  <a:schemeClr val="tx1"/>
+                </a:solidFill>
+                <a:latin typeface="+mn-lt"/>
+                <a:ea typeface="+mn-ea"/>
+                <a:cs typeface="+mn-cs"/>
+              </a:defRPr>
+            </a:lvl6pPr>
+            <a:lvl7pPr marL="2971800" indent="-228600" algn="l" defTabSz="914400" rtl="0" eaLnBrk="1" latinLnBrk="0" hangingPunct="1">
+              <a:lnSpc>
+                <a:spcPct val="90000"/>
+              </a:lnSpc>
+              <a:spcBef>
+                <a:spcPts val="500"/>
+              </a:spcBef>
+              <a:buFont typeface="Arial"/>
+              <a:buChar char="•"/>
+              <a:defRPr sz="1800" kern="1200">
+                <a:solidFill>
+                  <a:schemeClr val="tx1"/>
+                </a:solidFill>
+                <a:latin typeface="+mn-lt"/>
+                <a:ea typeface="+mn-ea"/>
+                <a:cs typeface="+mn-cs"/>
+              </a:defRPr>
+            </a:lvl7pPr>
+            <a:lvl8pPr marL="3429000" indent="-228600" algn="l" defTabSz="914400" rtl="0" eaLnBrk="1" latinLnBrk="0" hangingPunct="1">
+              <a:lnSpc>
+                <a:spcPct val="90000"/>
+              </a:lnSpc>
+              <a:spcBef>
+                <a:spcPts val="500"/>
+              </a:spcBef>
+              <a:buFont typeface="Arial"/>
+              <a:buChar char="•"/>
+              <a:defRPr sz="1800" kern="1200">
+                <a:solidFill>
+                  <a:schemeClr val="tx1"/>
+                </a:solidFill>
+                <a:latin typeface="+mn-lt"/>
+                <a:ea typeface="+mn-ea"/>
+                <a:cs typeface="+mn-cs"/>
+              </a:defRPr>
+            </a:lvl8pPr>
+            <a:lvl9pPr marL="3886200" indent="-228600" algn="l" defTabSz="914400" rtl="0" eaLnBrk="1" latinLnBrk="0" hangingPunct="1">
+              <a:lnSpc>
+                <a:spcPct val="90000"/>
+              </a:lnSpc>
+              <a:spcBef>
+                <a:spcPts val="500"/>
+              </a:spcBef>
+              <a:buFont typeface="Arial"/>
+              <a:buChar char="•"/>
+              <a:defRPr sz="1800" kern="1200">
+                <a:solidFill>
+                  <a:schemeClr val="tx1"/>
+                </a:solidFill>
+                <a:latin typeface="+mn-lt"/>
+                <a:ea typeface="+mn-ea"/>
+                <a:cs typeface="+mn-cs"/>
+              </a:defRPr>
+            </a:lvl9pPr>
+          </a:lstStyle>
+          <a:p>
+            <a:pPr marL="0" indent="0" algn="ctr">
+              <a:buFont typeface="Arial"/>
+              <a:buNone/>
+            </a:pPr>
+            <a:r>
+              <a:rPr lang="en-US" sz="2400" dirty="0" smtClean="0"/>
+              <a:t>Team Overview</a:t>
+            </a:r>
+            <a:endParaRPr lang="en-US" sz="2400" dirty="0" smtClean="0"/>
+          </a:p>
+        </p:txBody>
+      </p:sp>
+      <p:sp>
+        <p:nvSpPr>
+          <p:cNvPr id="19" name="Chevron 18"/>
+          <p:cNvSpPr/>
+          <p:nvPr/>
+        </p:nvSpPr>
+        <p:spPr>
+          <a:xfrm>
+            <a:off x="8541638" y="3211722"/>
+            <a:ext cx="358367" cy="579228"/>
+          </a:xfrm>
+          <a:prstGeom prst="chevron">
+            <a:avLst/>
+          </a:prstGeom>
+          <a:solidFill>
+            <a:srgbClr val="2DA5DB"/>
+          </a:solidFill>
+          <a:ln>
+            <a:noFill/>
+          </a:ln>
+        </p:spPr>
+        <p:style>
+          <a:lnRef idx="2">
+            <a:schemeClr val="accent1">
+              <a:shade val="50000"/>
+            </a:schemeClr>
+          </a:lnRef>
+          <a:fillRef idx="1">
+            <a:schemeClr val="accent1"/>
+          </a:fillRef>
+          <a:effectRef idx="0">
+            <a:schemeClr val="accent1"/>
+          </a:effectRef>
+          <a:fontRef idx="minor">
+            <a:schemeClr val="lt1"/>
+          </a:fontRef>
+        </p:style>
+        <p:txBody>
+          <a:bodyPr rtlCol="0" anchor="ctr"/>
+          <a:lstStyle/>
+          <a:p>
+            <a:pPr algn="ctr"/>
+            <a:endParaRPr lang="en-US" sz="2400">
+              <a:solidFill>
+                <a:schemeClr val="bg1"/>
+              </a:solidFill>
+            </a:endParaRPr>
+          </a:p>
+        </p:txBody>
+      </p:sp>
+      <p:sp>
+        <p:nvSpPr>
+          <p:cNvPr id="20" name="Content Placeholder 2"/>
+          <p:cNvSpPr txBox="1">
+            <a:spLocks/>
+          </p:cNvSpPr>
+          <p:nvPr/>
+        </p:nvSpPr>
+        <p:spPr>
+          <a:xfrm>
+            <a:off x="233170" y="2194062"/>
+            <a:ext cx="5233613" cy="603572"/>
+          </a:xfrm>
+          <a:prstGeom prst="rect">
+            <a:avLst/>
+          </a:prstGeom>
+          <a:solidFill>
+            <a:srgbClr val="37BDA7"/>
+          </a:solidFill>
+          <a:ln>
+            <a:noFill/>
+          </a:ln>
+        </p:spPr>
+        <p:style>
+          <a:lnRef idx="2">
+            <a:schemeClr val="accent1">
+              <a:shade val="50000"/>
+            </a:schemeClr>
+          </a:lnRef>
+          <a:fillRef idx="1">
+            <a:schemeClr val="accent1"/>
+          </a:fillRef>
+          <a:effectRef idx="0">
+            <a:schemeClr val="accent1"/>
+          </a:effectRef>
+          <a:fontRef idx="minor">
+            <a:schemeClr val="lt1"/>
+          </a:fontRef>
+        </p:style>
+        <p:txBody>
+          <a:bodyPr rot="0" spcFirstLastPara="0" vertOverflow="overflow" horzOverflow="overflow" vert="horz" wrap="square" lIns="91440" tIns="45720" rIns="91440" bIns="45720" numCol="1" spcCol="0" rtlCol="0" fromWordArt="0" anchor="ctr" anchorCtr="0" forceAA="0" compatLnSpc="1">
+            <a:prstTxWarp prst="textNoShape">
+              <a:avLst/>
+            </a:prstTxWarp>
+            <a:noAutofit/>
+          </a:bodyPr>
+          <a:lstStyle>
+            <a:defPPr>
+              <a:defRPr lang="en-US"/>
+            </a:defPPr>
+            <a:lvl1pPr algn="ctr">
+              <a:defRPr sz="2400"/>
+            </a:lvl1pPr>
+            <a:lvl2pPr>
+              <a:defRPr>
+                <a:solidFill>
+                  <a:schemeClr val="lt1"/>
+                </a:solidFill>
+              </a:defRPr>
+            </a:lvl2pPr>
+            <a:lvl3pPr>
+              <a:defRPr>
+                <a:solidFill>
+                  <a:schemeClr val="lt1"/>
+                </a:solidFill>
+              </a:defRPr>
+            </a:lvl3pPr>
+            <a:lvl4pPr>
+              <a:defRPr>
+                <a:solidFill>
+                  <a:schemeClr val="lt1"/>
+                </a:solidFill>
+              </a:defRPr>
+            </a:lvl4pPr>
+            <a:lvl5pPr>
+              <a:defRPr>
+                <a:solidFill>
+                  <a:schemeClr val="lt1"/>
+                </a:solidFill>
+              </a:defRPr>
+            </a:lvl5pPr>
+            <a:lvl6pPr>
+              <a:defRPr>
+                <a:solidFill>
+                  <a:schemeClr val="lt1"/>
+                </a:solidFill>
+              </a:defRPr>
+            </a:lvl6pPr>
+            <a:lvl7pPr>
+              <a:defRPr>
+                <a:solidFill>
+                  <a:schemeClr val="lt1"/>
+                </a:solidFill>
+              </a:defRPr>
+            </a:lvl7pPr>
+            <a:lvl8pPr>
+              <a:defRPr>
+                <a:solidFill>
+                  <a:schemeClr val="lt1"/>
+                </a:solidFill>
+              </a:defRPr>
+            </a:lvl8pPr>
+            <a:lvl9pPr>
+              <a:defRPr>
+                <a:solidFill>
+                  <a:schemeClr val="lt1"/>
+                </a:solidFill>
+              </a:defRPr>
+            </a:lvl9pPr>
+          </a:lstStyle>
+          <a:p>
+            <a:r>
+              <a:rPr lang="en-US" dirty="0"/>
+              <a:t>Methodology</a:t>
+            </a:r>
+          </a:p>
+        </p:txBody>
+      </p:sp>
+      <p:sp>
+        <p:nvSpPr>
+          <p:cNvPr id="21" name="Content Placeholder 2"/>
+          <p:cNvSpPr txBox="1">
+            <a:spLocks/>
+          </p:cNvSpPr>
+          <p:nvPr/>
+        </p:nvSpPr>
+        <p:spPr>
+          <a:xfrm>
+            <a:off x="5589918" y="2194062"/>
+            <a:ext cx="6487003" cy="603572"/>
+          </a:xfrm>
+          <a:prstGeom prst="rect">
+            <a:avLst/>
+          </a:prstGeom>
+          <a:solidFill>
+            <a:srgbClr val="2DA5DB"/>
+          </a:solidFill>
+          <a:ln>
+            <a:noFill/>
+          </a:ln>
+        </p:spPr>
+        <p:style>
+          <a:lnRef idx="2">
+            <a:schemeClr val="accent1">
+              <a:shade val="50000"/>
+            </a:schemeClr>
+          </a:lnRef>
+          <a:fillRef idx="1">
+            <a:schemeClr val="accent1"/>
+          </a:fillRef>
+          <a:effectRef idx="0">
+            <a:schemeClr val="accent1"/>
+          </a:effectRef>
+          <a:fontRef idx="minor">
+            <a:schemeClr val="lt1"/>
+          </a:fontRef>
+        </p:style>
+        <p:txBody>
+          <a:bodyPr rot="0" spcFirstLastPara="0" vertOverflow="overflow" horzOverflow="overflow" vert="horz" wrap="square" lIns="91440" tIns="45720" rIns="91440" bIns="45720" numCol="1" spcCol="0" rtlCol="0" fromWordArt="0" anchor="ctr" anchorCtr="0" forceAA="0" compatLnSpc="1">
+            <a:prstTxWarp prst="textNoShape">
+              <a:avLst/>
+            </a:prstTxWarp>
+            <a:noAutofit/>
+          </a:bodyPr>
+          <a:lstStyle>
+            <a:defPPr>
+              <a:defRPr lang="en-US"/>
+            </a:defPPr>
+            <a:lvl1pPr algn="ctr">
+              <a:defRPr sz="2400">
+                <a:solidFill>
+                  <a:schemeClr val="tx1"/>
+                </a:solidFill>
+              </a:defRPr>
+            </a:lvl1pPr>
+          </a:lstStyle>
+          <a:p>
+            <a:r>
+              <a:rPr lang="en-US" dirty="0">
+                <a:solidFill>
+                  <a:schemeClr val="bg1"/>
+                </a:solidFill>
+              </a:rPr>
+              <a:t>Team Picks</a:t>
+            </a:r>
+          </a:p>
+        </p:txBody>
+      </p:sp>
     </p:spTree>
     <p:extLst>
       <p:ext uri="{BB962C8B-B14F-4D97-AF65-F5344CB8AC3E}">
@@ -7359,29 +9468,6 @@
           <a:chExt cx="0" cy="0"/>
         </a:xfrm>
       </p:grpSpPr>
-      <p:sp>
-        <p:nvSpPr>
-          <p:cNvPr id="2" name="Title 1"/>
-          <p:cNvSpPr>
-            <a:spLocks noGrp="1"/>
-          </p:cNvSpPr>
-          <p:nvPr>
-            <p:ph type="title"/>
-          </p:nvPr>
-        </p:nvSpPr>
-        <p:spPr/>
-        <p:txBody>
-          <a:bodyPr/>
-          <a:lstStyle/>
-          <a:p>
-            <a:r>
-              <a:rPr lang="en-US" dirty="0" smtClean="0"/>
-              <a:t>Communities</a:t>
-            </a:r>
-            <a:endParaRPr lang="en-US" dirty="0"/>
-          </a:p>
-        </p:txBody>
-      </p:sp>
       <p:pic>
         <p:nvPicPr>
           <p:cNvPr id="5" name="Content Placeholder 4"/>
@@ -7406,7 +9492,7 @@
         </p:blipFill>
         <p:spPr>
           <a:xfrm>
-            <a:off x="5851071" y="365125"/>
+            <a:off x="5954589" y="365125"/>
             <a:ext cx="5789819" cy="6175808"/>
           </a:xfrm>
         </p:spPr>
@@ -7473,7 +9559,7 @@
         <p:spPr>
           <a:xfrm>
             <a:off x="838200" y="1518557"/>
-            <a:ext cx="5012871" cy="369332"/>
+            <a:ext cx="5012871" cy="2585323"/>
           </a:xfrm>
           <a:prstGeom prst="rect">
             <a:avLst/>
@@ -7486,9 +9572,276 @@
           </a:bodyPr>
           <a:lstStyle/>
           <a:p>
-            <a:r>
-              <a:rPr lang="en-US" smtClean="0"/>
-              <a:t>bla</a:t>
+            <a:pPr marL="285750" indent="-285750">
+              <a:lnSpc>
+                <a:spcPct val="150000"/>
+              </a:lnSpc>
+              <a:buFont typeface="Arial" charset="0"/>
+              <a:buChar char="•"/>
+            </a:pPr>
+            <a:r>
+              <a:rPr lang="en-US" dirty="0" smtClean="0"/>
+              <a:t>4 clusters identified within the network</a:t>
+            </a:r>
+          </a:p>
+          <a:p>
+            <a:pPr marL="285750" indent="-285750">
+              <a:lnSpc>
+                <a:spcPct val="150000"/>
+              </a:lnSpc>
+              <a:buFont typeface="Arial" charset="0"/>
+              <a:buChar char="•"/>
+            </a:pPr>
+            <a:r>
+              <a:rPr lang="en-US" dirty="0" smtClean="0"/>
+              <a:t>The larger cluster members often have more votes (most likely from within the cluster), but come at higher costs</a:t>
+            </a:r>
+          </a:p>
+          <a:p>
+            <a:pPr marL="285750" indent="-285750">
+              <a:lnSpc>
+                <a:spcPct val="150000"/>
+              </a:lnSpc>
+              <a:buFont typeface="Arial" charset="0"/>
+              <a:buChar char="•"/>
+            </a:pPr>
+            <a:r>
+              <a:rPr lang="en-US" dirty="0" smtClean="0"/>
+              <a:t>To pick optimal teams,  the following constraints are put into place:</a:t>
+            </a:r>
+            <a:endParaRPr lang="en-US" dirty="0"/>
+          </a:p>
+        </p:txBody>
+      </p:sp>
+      <p:sp>
+        <p:nvSpPr>
+          <p:cNvPr id="2" name="Title 1"/>
+          <p:cNvSpPr>
+            <a:spLocks noGrp="1"/>
+          </p:cNvSpPr>
+          <p:nvPr>
+            <p:ph type="title"/>
+          </p:nvPr>
+        </p:nvSpPr>
+        <p:spPr/>
+        <p:txBody>
+          <a:bodyPr/>
+          <a:lstStyle/>
+          <a:p>
+            <a:r>
+              <a:rPr lang="en-US" smtClean="0"/>
+              <a:t>Teams and Communities</a:t>
+            </a:r>
+            <a:endParaRPr lang="en-US" dirty="0"/>
+          </a:p>
+        </p:txBody>
+      </p:sp>
+      <p:pic>
+        <p:nvPicPr>
+          <p:cNvPr id="9" name="Picture 8"/>
+          <p:cNvPicPr>
+            <a:picLocks noChangeAspect="1"/>
+          </p:cNvPicPr>
+          <p:nvPr/>
+        </p:nvPicPr>
+        <p:blipFill>
+          <a:blip r:embed="rId4">
+            <a:extLst>
+              <a:ext uri="{28A0092B-C50C-407E-A947-70E740481C1C}">
+                <a14:useLocalDpi xmlns:a14="http://schemas.microsoft.com/office/drawing/2010/main" val="0"/>
+              </a:ext>
+            </a:extLst>
+          </a:blip>
+          <a:stretch>
+            <a:fillRect/>
+          </a:stretch>
+        </p:blipFill>
+        <p:spPr>
+          <a:xfrm>
+            <a:off x="814354" y="4299293"/>
+            <a:ext cx="453564" cy="453564"/>
+          </a:xfrm>
+          <a:prstGeom prst="rect">
+            <a:avLst/>
+          </a:prstGeom>
+        </p:spPr>
+      </p:pic>
+      <p:pic>
+        <p:nvPicPr>
+          <p:cNvPr id="10" name="Picture 9"/>
+          <p:cNvPicPr>
+            <a:picLocks noChangeAspect="1"/>
+          </p:cNvPicPr>
+          <p:nvPr/>
+        </p:nvPicPr>
+        <p:blipFill>
+          <a:blip r:embed="rId5">
+            <a:extLst>
+              <a:ext uri="{28A0092B-C50C-407E-A947-70E740481C1C}">
+                <a14:useLocalDpi xmlns:a14="http://schemas.microsoft.com/office/drawing/2010/main" val="0"/>
+              </a:ext>
+            </a:extLst>
+          </a:blip>
+          <a:stretch>
+            <a:fillRect/>
+          </a:stretch>
+        </p:blipFill>
+        <p:spPr>
+          <a:xfrm>
+            <a:off x="814354" y="5358780"/>
+            <a:ext cx="453564" cy="453564"/>
+          </a:xfrm>
+          <a:prstGeom prst="rect">
+            <a:avLst/>
+          </a:prstGeom>
+        </p:spPr>
+      </p:pic>
+      <p:pic>
+        <p:nvPicPr>
+          <p:cNvPr id="11" name="Picture 10"/>
+          <p:cNvPicPr>
+            <a:picLocks noChangeAspect="1"/>
+          </p:cNvPicPr>
+          <p:nvPr/>
+        </p:nvPicPr>
+        <p:blipFill>
+          <a:blip r:embed="rId6">
+            <a:extLst>
+              <a:ext uri="{28A0092B-C50C-407E-A947-70E740481C1C}">
+                <a14:useLocalDpi xmlns:a14="http://schemas.microsoft.com/office/drawing/2010/main" val="0"/>
+              </a:ext>
+            </a:extLst>
+          </a:blip>
+          <a:stretch>
+            <a:fillRect/>
+          </a:stretch>
+        </p:blipFill>
+        <p:spPr>
+          <a:xfrm>
+            <a:off x="814354" y="4824096"/>
+            <a:ext cx="453564" cy="453564"/>
+          </a:xfrm>
+          <a:prstGeom prst="rect">
+            <a:avLst/>
+          </a:prstGeom>
+        </p:spPr>
+      </p:pic>
+      <p:sp>
+        <p:nvSpPr>
+          <p:cNvPr id="12" name="TextBox 11"/>
+          <p:cNvSpPr txBox="1"/>
+          <p:nvPr/>
+        </p:nvSpPr>
+        <p:spPr>
+          <a:xfrm>
+            <a:off x="1397478" y="4272160"/>
+            <a:ext cx="4589252" cy="507831"/>
+          </a:xfrm>
+          <a:prstGeom prst="rect">
+            <a:avLst/>
+          </a:prstGeom>
+          <a:noFill/>
+        </p:spPr>
+        <p:txBody>
+          <a:bodyPr wrap="square" rtlCol="0">
+            <a:spAutoFit/>
+          </a:bodyPr>
+          <a:lstStyle/>
+          <a:p>
+            <a:pPr>
+              <a:lnSpc>
+                <a:spcPct val="150000"/>
+              </a:lnSpc>
+            </a:pPr>
+            <a:r>
+              <a:rPr lang="en-US" b="1" dirty="0" smtClean="0"/>
+              <a:t>Diversity:</a:t>
+            </a:r>
+            <a:r>
+              <a:rPr lang="en-US" dirty="0" smtClean="0"/>
+              <a:t> No more than 2 members per cluster</a:t>
+            </a:r>
+            <a:endParaRPr lang="en-US" dirty="0"/>
+          </a:p>
+        </p:txBody>
+      </p:sp>
+      <p:sp>
+        <p:nvSpPr>
+          <p:cNvPr id="14" name="TextBox 13"/>
+          <p:cNvSpPr txBox="1"/>
+          <p:nvPr/>
+        </p:nvSpPr>
+        <p:spPr>
+          <a:xfrm>
+            <a:off x="1397478" y="4796963"/>
+            <a:ext cx="4589252" cy="507831"/>
+          </a:xfrm>
+          <a:prstGeom prst="rect">
+            <a:avLst/>
+          </a:prstGeom>
+          <a:noFill/>
+        </p:spPr>
+        <p:txBody>
+          <a:bodyPr wrap="square" rtlCol="0">
+            <a:spAutoFit/>
+          </a:bodyPr>
+          <a:lstStyle/>
+          <a:p>
+            <a:pPr>
+              <a:lnSpc>
+                <a:spcPct val="150000"/>
+              </a:lnSpc>
+            </a:pPr>
+            <a:r>
+              <a:rPr lang="en-US" b="1" dirty="0" smtClean="0"/>
+              <a:t>Diversity:</a:t>
+            </a:r>
+            <a:r>
+              <a:rPr lang="en-US" dirty="0" smtClean="0"/>
+              <a:t> No more than 2 members per cluster</a:t>
+            </a:r>
+            <a:endParaRPr lang="en-US" dirty="0"/>
+          </a:p>
+        </p:txBody>
+      </p:sp>
+      <p:sp>
+        <p:nvSpPr>
+          <p:cNvPr id="15" name="TextBox 14"/>
+          <p:cNvSpPr txBox="1"/>
+          <p:nvPr/>
+        </p:nvSpPr>
+        <p:spPr>
+          <a:xfrm>
+            <a:off x="1371436" y="5331647"/>
+            <a:ext cx="5270902" cy="507831"/>
+          </a:xfrm>
+          <a:prstGeom prst="rect">
+            <a:avLst/>
+          </a:prstGeom>
+          <a:noFill/>
+        </p:spPr>
+        <p:txBody>
+          <a:bodyPr wrap="square" rtlCol="0">
+            <a:spAutoFit/>
+          </a:bodyPr>
+          <a:lstStyle/>
+          <a:p>
+            <a:pPr>
+              <a:lnSpc>
+                <a:spcPct val="150000"/>
+              </a:lnSpc>
+            </a:pPr>
+            <a:r>
+              <a:rPr lang="en-US" b="1" dirty="0" smtClean="0"/>
+              <a:t>Some Diversity</a:t>
+            </a:r>
+            <a:r>
+              <a:rPr lang="en-US" b="1" dirty="0" smtClean="0"/>
+              <a:t>:</a:t>
+            </a:r>
+            <a:r>
+              <a:rPr lang="en-US" dirty="0" smtClean="0"/>
+              <a:t> No more than 3 members per cluster</a:t>
             </a:r>
             <a:endParaRPr lang="en-US" dirty="0"/>
           </a:p>

</xml_diff>

<commit_message>
pres file add Louises slide
</commit_message>
<xml_diff>
--- a/Presentation.pptx
+++ b/Presentation.pptx
@@ -5,7 +5,7 @@
     <p:sldMasterId id="2147483648" r:id="rId1"/>
   </p:sldMasterIdLst>
   <p:notesMasterIdLst>
-    <p:notesMasterId r:id="rId14"/>
+    <p:notesMasterId r:id="rId15"/>
   </p:notesMasterIdLst>
   <p:sldIdLst>
     <p:sldId id="256" r:id="rId2"/>
@@ -16,10 +16,11 @@
     <p:sldId id="268" r:id="rId7"/>
     <p:sldId id="269" r:id="rId8"/>
     <p:sldId id="270" r:id="rId9"/>
-    <p:sldId id="272" r:id="rId10"/>
-    <p:sldId id="275" r:id="rId11"/>
-    <p:sldId id="273" r:id="rId12"/>
-    <p:sldId id="274" r:id="rId13"/>
+    <p:sldId id="276" r:id="rId10"/>
+    <p:sldId id="272" r:id="rId11"/>
+    <p:sldId id="275" r:id="rId12"/>
+    <p:sldId id="273" r:id="rId13"/>
+    <p:sldId id="274" r:id="rId14"/>
   </p:sldIdLst>
   <p:sldSz cx="12192000" cy="6858000"/>
   <p:notesSz cx="6858000" cy="9144000"/>
@@ -1021,7 +1022,7 @@
           <a:p>
             <a:fld id="{ABE0B4DF-EF78-C641-9F01-3822F88552DE}" type="slidenum">
               <a:rPr lang="en-US" smtClean="0"/>
-              <a:t>11</a:t>
+              <a:t>12</a:t>
             </a:fld>
             <a:endParaRPr lang="en-US"/>
           </a:p>
@@ -4071,6 +4072,228 @@
 <file path=ppt/slides/slide10.xml><?xml version="1.0" encoding="utf-8"?>
 <p:sld xmlns:a="http://schemas.openxmlformats.org/drawingml/2006/main" xmlns:r="http://schemas.openxmlformats.org/officeDocument/2006/relationships" xmlns:p="http://schemas.openxmlformats.org/presentationml/2006/main">
   <p:cSld>
+    <p:spTree>
+      <p:nvGrpSpPr>
+        <p:cNvPr id="1" name=""/>
+        <p:cNvGrpSpPr/>
+        <p:nvPr/>
+      </p:nvGrpSpPr>
+      <p:grpSpPr>
+        <a:xfrm>
+          <a:off x="0" y="0"/>
+          <a:ext cx="0" cy="0"/>
+          <a:chOff x="0" y="0"/>
+          <a:chExt cx="0" cy="0"/>
+        </a:xfrm>
+      </p:grpSpPr>
+      <p:sp>
+        <p:nvSpPr>
+          <p:cNvPr id="2" name="Title 1"/>
+          <p:cNvSpPr>
+            <a:spLocks noGrp="1"/>
+          </p:cNvSpPr>
+          <p:nvPr>
+            <p:ph type="title"/>
+          </p:nvPr>
+        </p:nvSpPr>
+        <p:spPr/>
+        <p:txBody>
+          <a:bodyPr/>
+          <a:lstStyle/>
+          <a:p>
+            <a:r>
+              <a:rPr lang="en-US" dirty="0" smtClean="0"/>
+              <a:t>Team Comparison</a:t>
+            </a:r>
+            <a:endParaRPr lang="en-US" dirty="0"/>
+          </a:p>
+        </p:txBody>
+      </p:sp>
+      <p:sp>
+        <p:nvSpPr>
+          <p:cNvPr id="3" name="Content Placeholder 2"/>
+          <p:cNvSpPr>
+            <a:spLocks noGrp="1"/>
+          </p:cNvSpPr>
+          <p:nvPr>
+            <p:ph idx="1"/>
+          </p:nvPr>
+        </p:nvSpPr>
+        <p:spPr/>
+        <p:txBody>
+          <a:bodyPr/>
+          <a:lstStyle/>
+          <a:p>
+            <a:endParaRPr lang="en-US" dirty="0"/>
+          </a:p>
+        </p:txBody>
+      </p:sp>
+      <p:sp>
+        <p:nvSpPr>
+          <p:cNvPr id="4" name="Slide Number Placeholder 3"/>
+          <p:cNvSpPr>
+            <a:spLocks noGrp="1"/>
+          </p:cNvSpPr>
+          <p:nvPr>
+            <p:ph type="sldNum" sz="quarter" idx="12"/>
+          </p:nvPr>
+        </p:nvSpPr>
+        <p:spPr/>
+        <p:txBody>
+          <a:bodyPr/>
+          <a:lstStyle/>
+          <a:p>
+            <a:fld id="{9E487D81-23A7-E743-A35A-AC6109D8EDF6}" type="slidenum">
+              <a:rPr lang="en-US" smtClean="0"/>
+              <a:t>9</a:t>
+            </a:fld>
+            <a:endParaRPr lang="en-US"/>
+          </a:p>
+        </p:txBody>
+      </p:sp>
+      <p:pic>
+        <p:nvPicPr>
+          <p:cNvPr id="5" name="Content Placeholder 11"/>
+          <p:cNvPicPr>
+            <a:picLocks noChangeAspect="1"/>
+          </p:cNvPicPr>
+          <p:nvPr/>
+        </p:nvPicPr>
+        <p:blipFill>
+          <a:blip r:embed="rId2">
+            <a:extLst>
+              <a:ext uri="{28A0092B-C50C-407E-A947-70E740481C1C}">
+                <a14:useLocalDpi xmlns:a14="http://schemas.microsoft.com/office/drawing/2010/main" val="0"/>
+              </a:ext>
+            </a:extLst>
+          </a:blip>
+          <a:stretch>
+            <a:fillRect/>
+          </a:stretch>
+        </p:blipFill>
+        <p:spPr>
+          <a:xfrm>
+            <a:off x="5327400" y="435678"/>
+            <a:ext cx="1080000" cy="1080000"/>
+          </a:xfrm>
+          <a:prstGeom prst="rect">
+            <a:avLst/>
+          </a:prstGeom>
+        </p:spPr>
+      </p:pic>
+      <p:pic>
+        <p:nvPicPr>
+          <p:cNvPr id="6" name="Content Placeholder 4"/>
+          <p:cNvPicPr>
+            <a:picLocks noChangeAspect="1"/>
+          </p:cNvPicPr>
+          <p:nvPr/>
+        </p:nvPicPr>
+        <p:blipFill>
+          <a:blip r:embed="rId3">
+            <a:extLst>
+              <a:ext uri="{28A0092B-C50C-407E-A947-70E740481C1C}">
+                <a14:useLocalDpi xmlns:a14="http://schemas.microsoft.com/office/drawing/2010/main" val="0"/>
+              </a:ext>
+            </a:extLst>
+          </a:blip>
+          <a:stretch>
+            <a:fillRect/>
+          </a:stretch>
+        </p:blipFill>
+        <p:spPr>
+          <a:xfrm>
+            <a:off x="6882839" y="435678"/>
+            <a:ext cx="1080000" cy="1080000"/>
+          </a:xfrm>
+          <a:prstGeom prst="rect">
+            <a:avLst/>
+          </a:prstGeom>
+        </p:spPr>
+      </p:pic>
+      <p:pic>
+        <p:nvPicPr>
+          <p:cNvPr id="8" name="Content Placeholder 4"/>
+          <p:cNvPicPr>
+            <a:picLocks noChangeAspect="1"/>
+          </p:cNvPicPr>
+          <p:nvPr/>
+        </p:nvPicPr>
+        <p:blipFill>
+          <a:blip r:embed="rId4">
+            <a:extLst>
+              <a:ext uri="{28A0092B-C50C-407E-A947-70E740481C1C}">
+                <a14:useLocalDpi xmlns:a14="http://schemas.microsoft.com/office/drawing/2010/main" val="0"/>
+              </a:ext>
+            </a:extLst>
+          </a:blip>
+          <a:stretch>
+            <a:fillRect/>
+          </a:stretch>
+        </p:blipFill>
+        <p:spPr>
+          <a:xfrm>
+            <a:off x="8438279" y="435678"/>
+            <a:ext cx="1080000" cy="1080000"/>
+          </a:xfrm>
+          <a:prstGeom prst="rect">
+            <a:avLst/>
+          </a:prstGeom>
+        </p:spPr>
+      </p:pic>
+      <p:pic>
+        <p:nvPicPr>
+          <p:cNvPr id="9" name="Picture 8"/>
+          <p:cNvPicPr>
+            <a:picLocks noChangeAspect="1"/>
+          </p:cNvPicPr>
+          <p:nvPr/>
+        </p:nvPicPr>
+        <p:blipFill>
+          <a:blip r:embed="rId5">
+            <a:extLst>
+              <a:ext uri="{28A0092B-C50C-407E-A947-70E740481C1C}">
+                <a14:useLocalDpi xmlns:a14="http://schemas.microsoft.com/office/drawing/2010/main" val="0"/>
+              </a:ext>
+            </a:extLst>
+          </a:blip>
+          <a:stretch>
+            <a:fillRect/>
+          </a:stretch>
+        </p:blipFill>
+        <p:spPr>
+          <a:xfrm>
+            <a:off x="267676" y="6101861"/>
+            <a:ext cx="1857239" cy="518746"/>
+          </a:xfrm>
+          <a:prstGeom prst="rect">
+            <a:avLst/>
+          </a:prstGeom>
+        </p:spPr>
+      </p:pic>
+    </p:spTree>
+    <p:extLst>
+      <p:ext uri="{BB962C8B-B14F-4D97-AF65-F5344CB8AC3E}">
+        <p14:creationId xmlns:p14="http://schemas.microsoft.com/office/powerpoint/2010/main" val="835846567"/>
+      </p:ext>
+    </p:extLst>
+  </p:cSld>
+  <p:clrMapOvr>
+    <a:masterClrMapping/>
+  </p:clrMapOvr>
+  <p:timing>
+    <p:tnLst>
+      <p:par>
+        <p:cTn id="1" dur="indefinite" restart="never" nodeType="tmRoot"/>
+      </p:par>
+    </p:tnLst>
+  </p:timing>
+</p:sld>
+</file>
+
+<file path=ppt/slides/slide11.xml><?xml version="1.0" encoding="utf-8"?>
+<p:sld xmlns:a="http://schemas.openxmlformats.org/drawingml/2006/main" xmlns:r="http://schemas.openxmlformats.org/officeDocument/2006/relationships" xmlns:p="http://schemas.openxmlformats.org/presentationml/2006/main">
+  <p:cSld>
     <p:bg>
       <p:bgPr>
         <a:solidFill>
@@ -4147,7 +4370,7 @@
           <a:p>
             <a:fld id="{9E487D81-23A7-E743-A35A-AC6109D8EDF6}" type="slidenum">
               <a:rPr lang="en-US" smtClean="0"/>
-              <a:t>9</a:t>
+              <a:t>10</a:t>
             </a:fld>
             <a:endParaRPr lang="en-US"/>
           </a:p>
@@ -4196,101 +4419,6 @@
 </p:sld>
 </file>
 
-<file path=ppt/slides/slide11.xml><?xml version="1.0" encoding="utf-8"?>
-<p:sld xmlns:a="http://schemas.openxmlformats.org/drawingml/2006/main" xmlns:r="http://schemas.openxmlformats.org/officeDocument/2006/relationships" xmlns:p="http://schemas.openxmlformats.org/presentationml/2006/main">
-  <p:cSld>
-    <p:spTree>
-      <p:nvGrpSpPr>
-        <p:cNvPr id="1" name=""/>
-        <p:cNvGrpSpPr/>
-        <p:nvPr/>
-      </p:nvGrpSpPr>
-      <p:grpSpPr>
-        <a:xfrm>
-          <a:off x="0" y="0"/>
-          <a:ext cx="0" cy="0"/>
-          <a:chOff x="0" y="0"/>
-          <a:chExt cx="0" cy="0"/>
-        </a:xfrm>
-      </p:grpSpPr>
-      <p:sp>
-        <p:nvSpPr>
-          <p:cNvPr id="2" name="Title 1"/>
-          <p:cNvSpPr>
-            <a:spLocks noGrp="1"/>
-          </p:cNvSpPr>
-          <p:nvPr>
-            <p:ph type="title"/>
-          </p:nvPr>
-        </p:nvSpPr>
-        <p:spPr/>
-        <p:txBody>
-          <a:bodyPr/>
-          <a:lstStyle/>
-          <a:p>
-            <a:r>
-              <a:rPr lang="en-US" dirty="0" smtClean="0"/>
-              <a:t>Appendix / Old Slides</a:t>
-            </a:r>
-            <a:endParaRPr lang="en-US" dirty="0"/>
-          </a:p>
-        </p:txBody>
-      </p:sp>
-      <p:sp>
-        <p:nvSpPr>
-          <p:cNvPr id="3" name="Content Placeholder 2"/>
-          <p:cNvSpPr>
-            <a:spLocks noGrp="1"/>
-          </p:cNvSpPr>
-          <p:nvPr>
-            <p:ph idx="1"/>
-          </p:nvPr>
-        </p:nvSpPr>
-        <p:spPr/>
-        <p:txBody>
-          <a:bodyPr/>
-          <a:lstStyle/>
-          <a:p>
-            <a:endParaRPr lang="en-US"/>
-          </a:p>
-        </p:txBody>
-      </p:sp>
-      <p:sp>
-        <p:nvSpPr>
-          <p:cNvPr id="4" name="Slide Number Placeholder 3"/>
-          <p:cNvSpPr>
-            <a:spLocks noGrp="1"/>
-          </p:cNvSpPr>
-          <p:nvPr>
-            <p:ph type="sldNum" sz="quarter" idx="12"/>
-          </p:nvPr>
-        </p:nvSpPr>
-        <p:spPr/>
-        <p:txBody>
-          <a:bodyPr/>
-          <a:lstStyle/>
-          <a:p>
-            <a:fld id="{9E487D81-23A7-E743-A35A-AC6109D8EDF6}" type="slidenum">
-              <a:rPr lang="en-US" smtClean="0"/>
-              <a:t>10</a:t>
-            </a:fld>
-            <a:endParaRPr lang="en-US"/>
-          </a:p>
-        </p:txBody>
-      </p:sp>
-    </p:spTree>
-    <p:extLst>
-      <p:ext uri="{BB962C8B-B14F-4D97-AF65-F5344CB8AC3E}">
-        <p14:creationId xmlns:p14="http://schemas.microsoft.com/office/powerpoint/2010/main" val="1677023034"/>
-      </p:ext>
-    </p:extLst>
-  </p:cSld>
-  <p:clrMapOvr>
-    <a:masterClrMapping/>
-  </p:clrMapOvr>
-</p:sld>
-</file>
-
 <file path=ppt/slides/slide12.xml><?xml version="1.0" encoding="utf-8"?>
 <p:sld xmlns:a="http://schemas.openxmlformats.org/drawingml/2006/main" xmlns:r="http://schemas.openxmlformats.org/officeDocument/2006/relationships" xmlns:p="http://schemas.openxmlformats.org/presentationml/2006/main">
   <p:cSld>
@@ -4325,6 +4453,101 @@
           <a:p>
             <a:r>
               <a:rPr lang="en-US" dirty="0" smtClean="0"/>
+              <a:t>Appendix / Old Slides</a:t>
+            </a:r>
+            <a:endParaRPr lang="en-US" dirty="0"/>
+          </a:p>
+        </p:txBody>
+      </p:sp>
+      <p:sp>
+        <p:nvSpPr>
+          <p:cNvPr id="3" name="Content Placeholder 2"/>
+          <p:cNvSpPr>
+            <a:spLocks noGrp="1"/>
+          </p:cNvSpPr>
+          <p:nvPr>
+            <p:ph idx="1"/>
+          </p:nvPr>
+        </p:nvSpPr>
+        <p:spPr/>
+        <p:txBody>
+          <a:bodyPr/>
+          <a:lstStyle/>
+          <a:p>
+            <a:endParaRPr lang="en-US"/>
+          </a:p>
+        </p:txBody>
+      </p:sp>
+      <p:sp>
+        <p:nvSpPr>
+          <p:cNvPr id="4" name="Slide Number Placeholder 3"/>
+          <p:cNvSpPr>
+            <a:spLocks noGrp="1"/>
+          </p:cNvSpPr>
+          <p:nvPr>
+            <p:ph type="sldNum" sz="quarter" idx="12"/>
+          </p:nvPr>
+        </p:nvSpPr>
+        <p:spPr/>
+        <p:txBody>
+          <a:bodyPr/>
+          <a:lstStyle/>
+          <a:p>
+            <a:fld id="{9E487D81-23A7-E743-A35A-AC6109D8EDF6}" type="slidenum">
+              <a:rPr lang="en-US" smtClean="0"/>
+              <a:t>11</a:t>
+            </a:fld>
+            <a:endParaRPr lang="en-US"/>
+          </a:p>
+        </p:txBody>
+      </p:sp>
+    </p:spTree>
+    <p:extLst>
+      <p:ext uri="{BB962C8B-B14F-4D97-AF65-F5344CB8AC3E}">
+        <p14:creationId xmlns:p14="http://schemas.microsoft.com/office/powerpoint/2010/main" val="1677023034"/>
+      </p:ext>
+    </p:extLst>
+  </p:cSld>
+  <p:clrMapOvr>
+    <a:masterClrMapping/>
+  </p:clrMapOvr>
+</p:sld>
+</file>
+
+<file path=ppt/slides/slide13.xml><?xml version="1.0" encoding="utf-8"?>
+<p:sld xmlns:a="http://schemas.openxmlformats.org/drawingml/2006/main" xmlns:r="http://schemas.openxmlformats.org/officeDocument/2006/relationships" xmlns:p="http://schemas.openxmlformats.org/presentationml/2006/main">
+  <p:cSld>
+    <p:spTree>
+      <p:nvGrpSpPr>
+        <p:cNvPr id="1" name=""/>
+        <p:cNvGrpSpPr/>
+        <p:nvPr/>
+      </p:nvGrpSpPr>
+      <p:grpSpPr>
+        <a:xfrm>
+          <a:off x="0" y="0"/>
+          <a:ext cx="0" cy="0"/>
+          <a:chOff x="0" y="0"/>
+          <a:chExt cx="0" cy="0"/>
+        </a:xfrm>
+      </p:grpSpPr>
+      <p:sp>
+        <p:nvSpPr>
+          <p:cNvPr id="2" name="Title 1"/>
+          <p:cNvSpPr>
+            <a:spLocks noGrp="1"/>
+          </p:cNvSpPr>
+          <p:nvPr>
+            <p:ph type="title"/>
+          </p:nvPr>
+        </p:nvSpPr>
+        <p:spPr/>
+        <p:txBody>
+          <a:bodyPr/>
+          <a:lstStyle/>
+          <a:p>
+            <a:r>
+              <a:rPr lang="en-US" dirty="0" smtClean="0"/>
               <a:t>Agenda</a:t>
             </a:r>
             <a:endParaRPr lang="en-US" dirty="0"/>
@@ -4432,7 +4655,7 @@
           <a:p>
             <a:fld id="{9E487D81-23A7-E743-A35A-AC6109D8EDF6}" type="slidenum">
               <a:rPr lang="en-US" smtClean="0"/>
-              <a:t>11</a:t>
+              <a:t>12</a:t>
             </a:fld>
             <a:endParaRPr lang="en-US"/>
           </a:p>
@@ -8608,11 +8831,7 @@
                     <a:p>
                       <a:r>
                         <a:rPr lang="en-US" dirty="0" smtClean="0"/>
-                        <a:t>Expansive &gt; Exclusive &gt; </a:t>
-                      </a:r>
-                      <a:r>
-                        <a:rPr lang="en-US" dirty="0" smtClean="0"/>
-                        <a:t>Tight</a:t>
+                        <a:t>Expansive &gt; Exclusive &gt; Tight</a:t>
                       </a:r>
                       <a:endParaRPr lang="en-US" baseline="0" dirty="0" smtClean="0"/>
                     </a:p>
@@ -10080,13 +10299,8 @@
             </a:pPr>
             <a:r>
               <a:rPr lang="en-US" dirty="0" smtClean="0"/>
-              <a:t>4 clusters identified within the </a:t>
-            </a:r>
-            <a:r>
-              <a:rPr lang="en-US" dirty="0" smtClean="0"/>
-              <a:t>network  that match intuitive network dynamics</a:t>
-            </a:r>
-            <a:endParaRPr lang="en-US" dirty="0" smtClean="0"/>
+              <a:t>4 clusters identified within the network  that match intuitive network dynamics</a:t>
+            </a:r>
           </a:p>
           <a:p>
             <a:pPr marL="285750" indent="-285750">
@@ -10263,11 +10477,7 @@
             </a:r>
             <a:r>
               <a:rPr lang="en-US" dirty="0" smtClean="0"/>
-              <a:t> No more than 2 members per </a:t>
-            </a:r>
-            <a:r>
-              <a:rPr lang="en-US" dirty="0" smtClean="0"/>
-              <a:t>cluster</a:t>
+              <a:t> No more than 2 members per cluster</a:t>
             </a:r>
           </a:p>
           <a:p>
@@ -10799,25 +11009,6 @@
       </p:sp>
       <p:sp>
         <p:nvSpPr>
-          <p:cNvPr id="3" name="Content Placeholder 2"/>
-          <p:cNvSpPr>
-            <a:spLocks noGrp="1"/>
-          </p:cNvSpPr>
-          <p:nvPr>
-            <p:ph idx="1"/>
-          </p:nvPr>
-        </p:nvSpPr>
-        <p:spPr/>
-        <p:txBody>
-          <a:bodyPr/>
-          <a:lstStyle/>
-          <a:p>
-            <a:endParaRPr lang="en-US" dirty="0"/>
-          </a:p>
-        </p:txBody>
-      </p:sp>
-      <p:sp>
-        <p:nvSpPr>
           <p:cNvPr id="4" name="Slide Number Placeholder 3"/>
           <p:cNvSpPr>
             <a:spLocks noGrp="1"/>
@@ -10826,7 +11017,12 @@
             <p:ph type="sldNum" sz="quarter" idx="12"/>
           </p:nvPr>
         </p:nvSpPr>
-        <p:spPr/>
+        <p:spPr>
+          <a:xfrm>
+            <a:off x="8610600" y="6383717"/>
+            <a:ext cx="2743200" cy="365125"/>
+          </a:xfrm>
+        </p:spPr>
         <p:txBody>
           <a:bodyPr/>
           <a:lstStyle/>
@@ -10959,10 +11155,340 @@
           </a:prstGeom>
         </p:spPr>
       </p:pic>
+      <p:grpSp>
+        <p:nvGrpSpPr>
+          <p:cNvPr id="17" name="Group 16"/>
+          <p:cNvGrpSpPr/>
+          <p:nvPr/>
+        </p:nvGrpSpPr>
+        <p:grpSpPr>
+          <a:xfrm>
+            <a:off x="613911" y="1708028"/>
+            <a:ext cx="3837317" cy="3721034"/>
+            <a:chOff x="613911" y="1708028"/>
+            <a:chExt cx="3837317" cy="3721034"/>
+          </a:xfrm>
+        </p:grpSpPr>
+        <p:pic>
+          <p:nvPicPr>
+            <p:cNvPr id="7" name="Picture 6"/>
+            <p:cNvPicPr>
+              <a:picLocks noChangeAspect="1"/>
+            </p:cNvPicPr>
+            <p:nvPr/>
+          </p:nvPicPr>
+          <p:blipFill>
+            <a:blip r:embed="rId6"/>
+            <a:stretch>
+              <a:fillRect/>
+            </a:stretch>
+          </p:blipFill>
+          <p:spPr>
+            <a:xfrm>
+              <a:off x="613911" y="1708028"/>
+              <a:ext cx="3837317" cy="3721034"/>
+            </a:xfrm>
+            <a:prstGeom prst="rect">
+              <a:avLst/>
+            </a:prstGeom>
+          </p:spPr>
+        </p:pic>
+        <p:sp>
+          <p:nvSpPr>
+            <p:cNvPr id="11" name="Triangle 10"/>
+            <p:cNvSpPr/>
+            <p:nvPr/>
+          </p:nvSpPr>
+          <p:spPr>
+            <a:xfrm>
+              <a:off x="2587924" y="4785066"/>
+              <a:ext cx="293297" cy="252759"/>
+            </a:xfrm>
+            <a:prstGeom prst="triangle">
+              <a:avLst/>
+            </a:prstGeom>
+            <a:noFill/>
+            <a:ln>
+              <a:solidFill>
+                <a:srgbClr val="2DA5DB"/>
+              </a:solidFill>
+            </a:ln>
+          </p:spPr>
+          <p:style>
+            <a:lnRef idx="2">
+              <a:schemeClr val="accent1">
+                <a:shade val="50000"/>
+              </a:schemeClr>
+            </a:lnRef>
+            <a:fillRef idx="1">
+              <a:schemeClr val="accent1"/>
+            </a:fillRef>
+            <a:effectRef idx="0">
+              <a:schemeClr val="accent1"/>
+            </a:effectRef>
+            <a:fontRef idx="minor">
+              <a:schemeClr val="lt1"/>
+            </a:fontRef>
+          </p:style>
+          <p:txBody>
+            <a:bodyPr rtlCol="0" anchor="ctr"/>
+            <a:lstStyle/>
+            <a:p>
+              <a:pPr algn="ctr"/>
+              <a:endParaRPr lang="en-US"/>
+            </a:p>
+          </p:txBody>
+        </p:sp>
+      </p:grpSp>
+      <p:sp>
+        <p:nvSpPr>
+          <p:cNvPr id="14" name="TextBox 13"/>
+          <p:cNvSpPr txBox="1"/>
+          <p:nvPr/>
+        </p:nvSpPr>
+        <p:spPr>
+          <a:xfrm>
+            <a:off x="1631830" y="5456708"/>
+            <a:ext cx="1508185" cy="507831"/>
+          </a:xfrm>
+          <a:prstGeom prst="rect">
+            <a:avLst/>
+          </a:prstGeom>
+          <a:noFill/>
+        </p:spPr>
+        <p:txBody>
+          <a:bodyPr wrap="square" rtlCol="0">
+            <a:spAutoFit/>
+          </a:bodyPr>
+          <a:lstStyle/>
+          <a:p>
+            <a:pPr>
+              <a:lnSpc>
+                <a:spcPct val="150000"/>
+              </a:lnSpc>
+            </a:pPr>
+            <a:r>
+              <a:rPr lang="en-US" smtClean="0"/>
+              <a:t>Design Team</a:t>
+            </a:r>
+            <a:endParaRPr lang="en-US" dirty="0"/>
+          </a:p>
+        </p:txBody>
+      </p:sp>
+      <p:pic>
+        <p:nvPicPr>
+          <p:cNvPr id="18" name="Picture 17"/>
+          <p:cNvPicPr>
+            <a:picLocks noChangeAspect="1"/>
+          </p:cNvPicPr>
+          <p:nvPr/>
+        </p:nvPicPr>
+        <p:blipFill>
+          <a:blip r:embed="rId7"/>
+          <a:stretch>
+            <a:fillRect/>
+          </a:stretch>
+        </p:blipFill>
+        <p:spPr>
+          <a:xfrm>
+            <a:off x="4157932" y="1736727"/>
+            <a:ext cx="3842238" cy="3692335"/>
+          </a:xfrm>
+          <a:prstGeom prst="rect">
+            <a:avLst/>
+          </a:prstGeom>
+        </p:spPr>
+      </p:pic>
+      <p:sp>
+        <p:nvSpPr>
+          <p:cNvPr id="19" name="Triangle 18"/>
+          <p:cNvSpPr/>
+          <p:nvPr/>
+        </p:nvSpPr>
+        <p:spPr>
+          <a:xfrm>
+            <a:off x="6157754" y="3568545"/>
+            <a:ext cx="602809" cy="503123"/>
+          </a:xfrm>
+          <a:prstGeom prst="triangle">
+            <a:avLst/>
+          </a:prstGeom>
+          <a:noFill/>
+          <a:ln>
+            <a:solidFill>
+              <a:srgbClr val="2DA5DB"/>
+            </a:solidFill>
+          </a:ln>
+        </p:spPr>
+        <p:style>
+          <a:lnRef idx="2">
+            <a:schemeClr val="accent1">
+              <a:shade val="50000"/>
+            </a:schemeClr>
+          </a:lnRef>
+          <a:fillRef idx="1">
+            <a:schemeClr val="accent1"/>
+          </a:fillRef>
+          <a:effectRef idx="0">
+            <a:schemeClr val="accent1"/>
+          </a:effectRef>
+          <a:fontRef idx="minor">
+            <a:schemeClr val="lt1"/>
+          </a:fontRef>
+        </p:style>
+        <p:txBody>
+          <a:bodyPr rtlCol="0" anchor="ctr"/>
+          <a:lstStyle/>
+          <a:p>
+            <a:pPr algn="ctr"/>
+            <a:endParaRPr lang="en-US"/>
+          </a:p>
+        </p:txBody>
+      </p:sp>
+      <p:sp>
+        <p:nvSpPr>
+          <p:cNvPr id="20" name="TextBox 19"/>
+          <p:cNvSpPr txBox="1"/>
+          <p:nvPr/>
+        </p:nvSpPr>
+        <p:spPr>
+          <a:xfrm>
+            <a:off x="5199114" y="5484462"/>
+            <a:ext cx="1508185" cy="464871"/>
+          </a:xfrm>
+          <a:prstGeom prst="rect">
+            <a:avLst/>
+          </a:prstGeom>
+          <a:noFill/>
+        </p:spPr>
+        <p:txBody>
+          <a:bodyPr wrap="square" rtlCol="0">
+            <a:spAutoFit/>
+          </a:bodyPr>
+          <a:lstStyle/>
+          <a:p>
+            <a:pPr>
+              <a:lnSpc>
+                <a:spcPct val="150000"/>
+              </a:lnSpc>
+            </a:pPr>
+            <a:r>
+              <a:rPr lang="en-US" dirty="0" smtClean="0"/>
+              <a:t>Lobby Team</a:t>
+            </a:r>
+            <a:endParaRPr lang="en-US" dirty="0"/>
+          </a:p>
+        </p:txBody>
+      </p:sp>
+      <p:pic>
+        <p:nvPicPr>
+          <p:cNvPr id="21" name="Picture 20"/>
+          <p:cNvPicPr>
+            <a:picLocks noChangeAspect="1"/>
+          </p:cNvPicPr>
+          <p:nvPr/>
+        </p:nvPicPr>
+        <p:blipFill>
+          <a:blip r:embed="rId8"/>
+          <a:stretch>
+            <a:fillRect/>
+          </a:stretch>
+        </p:blipFill>
+        <p:spPr>
+          <a:xfrm>
+            <a:off x="7349707" y="1604903"/>
+            <a:ext cx="4004094" cy="3951209"/>
+          </a:xfrm>
+          <a:prstGeom prst="rect">
+            <a:avLst/>
+          </a:prstGeom>
+        </p:spPr>
+      </p:pic>
+      <p:sp>
+        <p:nvSpPr>
+          <p:cNvPr id="22" name="TextBox 21"/>
+          <p:cNvSpPr txBox="1"/>
+          <p:nvPr/>
+        </p:nvSpPr>
+        <p:spPr>
+          <a:xfrm>
+            <a:off x="8226451" y="5484462"/>
+            <a:ext cx="2250605" cy="464871"/>
+          </a:xfrm>
+          <a:prstGeom prst="rect">
+            <a:avLst/>
+          </a:prstGeom>
+          <a:noFill/>
+        </p:spPr>
+        <p:txBody>
+          <a:bodyPr wrap="square" rtlCol="0">
+            <a:spAutoFit/>
+          </a:bodyPr>
+          <a:lstStyle/>
+          <a:p>
+            <a:pPr algn="ctr">
+              <a:lnSpc>
+                <a:spcPct val="150000"/>
+              </a:lnSpc>
+            </a:pPr>
+            <a:r>
+              <a:rPr lang="en-US" dirty="0" smtClean="0"/>
+              <a:t>Implementation Team</a:t>
+            </a:r>
+            <a:endParaRPr lang="en-US" dirty="0"/>
+          </a:p>
+        </p:txBody>
+      </p:sp>
+      <p:sp>
+        <p:nvSpPr>
+          <p:cNvPr id="23" name="Triangle 22"/>
+          <p:cNvSpPr/>
+          <p:nvPr/>
+        </p:nvSpPr>
+        <p:spPr>
+          <a:xfrm>
+            <a:off x="9422544" y="3209026"/>
+            <a:ext cx="547047" cy="430470"/>
+          </a:xfrm>
+          <a:prstGeom prst="triangle">
+            <a:avLst/>
+          </a:prstGeom>
+          <a:noFill/>
+          <a:ln>
+            <a:solidFill>
+              <a:srgbClr val="2DA5DB"/>
+            </a:solidFill>
+          </a:ln>
+        </p:spPr>
+        <p:style>
+          <a:lnRef idx="2">
+            <a:schemeClr val="accent1">
+              <a:shade val="50000"/>
+            </a:schemeClr>
+          </a:lnRef>
+          <a:fillRef idx="1">
+            <a:schemeClr val="accent1"/>
+          </a:fillRef>
+          <a:effectRef idx="0">
+            <a:schemeClr val="accent1"/>
+          </a:effectRef>
+          <a:fontRef idx="minor">
+            <a:schemeClr val="lt1"/>
+          </a:fontRef>
+        </p:style>
+        <p:txBody>
+          <a:bodyPr rtlCol="0" anchor="ctr"/>
+          <a:lstStyle/>
+          <a:p>
+            <a:pPr algn="ctr"/>
+            <a:endParaRPr lang="en-US"/>
+          </a:p>
+        </p:txBody>
+      </p:sp>
     </p:spTree>
     <p:extLst>
       <p:ext uri="{BB962C8B-B14F-4D97-AF65-F5344CB8AC3E}">
-        <p14:creationId xmlns:p14="http://schemas.microsoft.com/office/powerpoint/2010/main" val="835846567"/>
+        <p14:creationId xmlns:p14="http://schemas.microsoft.com/office/powerpoint/2010/main" val="2028502145"/>
       </p:ext>
     </p:extLst>
   </p:cSld>

</xml_diff>

<commit_message>
Made some small presentation formatting changes
</commit_message>
<xml_diff>
--- a/Presentation.pptx
+++ b/Presentation.pptx
@@ -5,7 +5,7 @@
     <p:sldMasterId id="2147483648" r:id="rId1"/>
   </p:sldMasterIdLst>
   <p:notesMasterIdLst>
-    <p:notesMasterId r:id="rId15"/>
+    <p:notesMasterId r:id="rId13"/>
   </p:notesMasterIdLst>
   <p:sldIdLst>
     <p:sldId id="256" r:id="rId2"/>
@@ -19,8 +19,6 @@
     <p:sldId id="276" r:id="rId10"/>
     <p:sldId id="272" r:id="rId11"/>
     <p:sldId id="275" r:id="rId12"/>
-    <p:sldId id="273" r:id="rId13"/>
-    <p:sldId id="274" r:id="rId14"/>
   </p:sldIdLst>
   <p:sldSz cx="12192000" cy="6858000"/>
   <p:notesSz cx="6858000" cy="9144000"/>
@@ -948,90 +946,6 @@
     <p:extLst>
       <p:ext uri="{BB962C8B-B14F-4D97-AF65-F5344CB8AC3E}">
         <p14:creationId xmlns:p14="http://schemas.microsoft.com/office/powerpoint/2010/main" val="1726750021"/>
-      </p:ext>
-    </p:extLst>
-  </p:cSld>
-  <p:clrMapOvr>
-    <a:masterClrMapping/>
-  </p:clrMapOvr>
-</p:notes>
-</file>
-
-<file path=ppt/notesSlides/notesSlide6.xml><?xml version="1.0" encoding="utf-8"?>
-<p:notes xmlns:a="http://schemas.openxmlformats.org/drawingml/2006/main" xmlns:r="http://schemas.openxmlformats.org/officeDocument/2006/relationships" xmlns:p="http://schemas.openxmlformats.org/presentationml/2006/main">
-  <p:cSld>
-    <p:spTree>
-      <p:nvGrpSpPr>
-        <p:cNvPr id="1" name=""/>
-        <p:cNvGrpSpPr/>
-        <p:nvPr/>
-      </p:nvGrpSpPr>
-      <p:grpSpPr>
-        <a:xfrm>
-          <a:off x="0" y="0"/>
-          <a:ext cx="0" cy="0"/>
-          <a:chOff x="0" y="0"/>
-          <a:chExt cx="0" cy="0"/>
-        </a:xfrm>
-      </p:grpSpPr>
-      <p:sp>
-        <p:nvSpPr>
-          <p:cNvPr id="2" name="Slide Image Placeholder 1"/>
-          <p:cNvSpPr>
-            <a:spLocks noGrp="1" noRot="1" noChangeAspect="1"/>
-          </p:cNvSpPr>
-          <p:nvPr>
-            <p:ph type="sldImg"/>
-          </p:nvPr>
-        </p:nvSpPr>
-        <p:spPr/>
-      </p:sp>
-      <p:sp>
-        <p:nvSpPr>
-          <p:cNvPr id="3" name="Notes Placeholder 2"/>
-          <p:cNvSpPr>
-            <a:spLocks noGrp="1"/>
-          </p:cNvSpPr>
-          <p:nvPr>
-            <p:ph type="body" idx="1"/>
-          </p:nvPr>
-        </p:nvSpPr>
-        <p:spPr/>
-        <p:txBody>
-          <a:bodyPr/>
-          <a:lstStyle/>
-          <a:p>
-            <a:endParaRPr lang="en-US" dirty="0"/>
-          </a:p>
-        </p:txBody>
-      </p:sp>
-      <p:sp>
-        <p:nvSpPr>
-          <p:cNvPr id="4" name="Slide Number Placeholder 3"/>
-          <p:cNvSpPr>
-            <a:spLocks noGrp="1"/>
-          </p:cNvSpPr>
-          <p:nvPr>
-            <p:ph type="sldNum" sz="quarter" idx="10"/>
-          </p:nvPr>
-        </p:nvSpPr>
-        <p:spPr/>
-        <p:txBody>
-          <a:bodyPr/>
-          <a:lstStyle/>
-          <a:p>
-            <a:fld id="{ABE0B4DF-EF78-C641-9F01-3822F88552DE}" type="slidenum">
-              <a:rPr lang="en-US" smtClean="0"/>
-              <a:t>12</a:t>
-            </a:fld>
-            <a:endParaRPr lang="en-US"/>
-          </a:p>
-        </p:txBody>
-      </p:sp>
-    </p:spTree>
-    <p:extLst>
-      <p:ext uri="{BB962C8B-B14F-4D97-AF65-F5344CB8AC3E}">
-        <p14:creationId xmlns:p14="http://schemas.microsoft.com/office/powerpoint/2010/main" val="1197226166"/>
       </p:ext>
     </p:extLst>
   </p:cSld>
@@ -4419,298 +4333,6 @@
 </p:sld>
 </file>
 
-<file path=ppt/slides/slide12.xml><?xml version="1.0" encoding="utf-8"?>
-<p:sld xmlns:a="http://schemas.openxmlformats.org/drawingml/2006/main" xmlns:r="http://schemas.openxmlformats.org/officeDocument/2006/relationships" xmlns:p="http://schemas.openxmlformats.org/presentationml/2006/main">
-  <p:cSld>
-    <p:spTree>
-      <p:nvGrpSpPr>
-        <p:cNvPr id="1" name=""/>
-        <p:cNvGrpSpPr/>
-        <p:nvPr/>
-      </p:nvGrpSpPr>
-      <p:grpSpPr>
-        <a:xfrm>
-          <a:off x="0" y="0"/>
-          <a:ext cx="0" cy="0"/>
-          <a:chOff x="0" y="0"/>
-          <a:chExt cx="0" cy="0"/>
-        </a:xfrm>
-      </p:grpSpPr>
-      <p:sp>
-        <p:nvSpPr>
-          <p:cNvPr id="2" name="Title 1"/>
-          <p:cNvSpPr>
-            <a:spLocks noGrp="1"/>
-          </p:cNvSpPr>
-          <p:nvPr>
-            <p:ph type="title"/>
-          </p:nvPr>
-        </p:nvSpPr>
-        <p:spPr/>
-        <p:txBody>
-          <a:bodyPr/>
-          <a:lstStyle/>
-          <a:p>
-            <a:r>
-              <a:rPr lang="en-US" dirty="0" smtClean="0"/>
-              <a:t>Appendix / Old Slides</a:t>
-            </a:r>
-            <a:endParaRPr lang="en-US" dirty="0"/>
-          </a:p>
-        </p:txBody>
-      </p:sp>
-      <p:sp>
-        <p:nvSpPr>
-          <p:cNvPr id="3" name="Content Placeholder 2"/>
-          <p:cNvSpPr>
-            <a:spLocks noGrp="1"/>
-          </p:cNvSpPr>
-          <p:nvPr>
-            <p:ph idx="1"/>
-          </p:nvPr>
-        </p:nvSpPr>
-        <p:spPr/>
-        <p:txBody>
-          <a:bodyPr/>
-          <a:lstStyle/>
-          <a:p>
-            <a:endParaRPr lang="en-US"/>
-          </a:p>
-        </p:txBody>
-      </p:sp>
-      <p:sp>
-        <p:nvSpPr>
-          <p:cNvPr id="4" name="Slide Number Placeholder 3"/>
-          <p:cNvSpPr>
-            <a:spLocks noGrp="1"/>
-          </p:cNvSpPr>
-          <p:nvPr>
-            <p:ph type="sldNum" sz="quarter" idx="12"/>
-          </p:nvPr>
-        </p:nvSpPr>
-        <p:spPr/>
-        <p:txBody>
-          <a:bodyPr/>
-          <a:lstStyle/>
-          <a:p>
-            <a:fld id="{9E487D81-23A7-E743-A35A-AC6109D8EDF6}" type="slidenum">
-              <a:rPr lang="en-US" smtClean="0"/>
-              <a:t>11</a:t>
-            </a:fld>
-            <a:endParaRPr lang="en-US"/>
-          </a:p>
-        </p:txBody>
-      </p:sp>
-    </p:spTree>
-    <p:extLst>
-      <p:ext uri="{BB962C8B-B14F-4D97-AF65-F5344CB8AC3E}">
-        <p14:creationId xmlns:p14="http://schemas.microsoft.com/office/powerpoint/2010/main" val="1677023034"/>
-      </p:ext>
-    </p:extLst>
-  </p:cSld>
-  <p:clrMapOvr>
-    <a:masterClrMapping/>
-  </p:clrMapOvr>
-</p:sld>
-</file>
-
-<file path=ppt/slides/slide13.xml><?xml version="1.0" encoding="utf-8"?>
-<p:sld xmlns:a="http://schemas.openxmlformats.org/drawingml/2006/main" xmlns:r="http://schemas.openxmlformats.org/officeDocument/2006/relationships" xmlns:p="http://schemas.openxmlformats.org/presentationml/2006/main">
-  <p:cSld>
-    <p:spTree>
-      <p:nvGrpSpPr>
-        <p:cNvPr id="1" name=""/>
-        <p:cNvGrpSpPr/>
-        <p:nvPr/>
-      </p:nvGrpSpPr>
-      <p:grpSpPr>
-        <a:xfrm>
-          <a:off x="0" y="0"/>
-          <a:ext cx="0" cy="0"/>
-          <a:chOff x="0" y="0"/>
-          <a:chExt cx="0" cy="0"/>
-        </a:xfrm>
-      </p:grpSpPr>
-      <p:sp>
-        <p:nvSpPr>
-          <p:cNvPr id="2" name="Title 1"/>
-          <p:cNvSpPr>
-            <a:spLocks noGrp="1"/>
-          </p:cNvSpPr>
-          <p:nvPr>
-            <p:ph type="title"/>
-          </p:nvPr>
-        </p:nvSpPr>
-        <p:spPr/>
-        <p:txBody>
-          <a:bodyPr/>
-          <a:lstStyle/>
-          <a:p>
-            <a:r>
-              <a:rPr lang="en-US" dirty="0" smtClean="0"/>
-              <a:t>Agenda</a:t>
-            </a:r>
-            <a:endParaRPr lang="en-US" dirty="0"/>
-          </a:p>
-        </p:txBody>
-      </p:sp>
-      <p:sp>
-        <p:nvSpPr>
-          <p:cNvPr id="3" name="Content Placeholder 2"/>
-          <p:cNvSpPr>
-            <a:spLocks noGrp="1"/>
-          </p:cNvSpPr>
-          <p:nvPr>
-            <p:ph idx="1"/>
-          </p:nvPr>
-        </p:nvSpPr>
-        <p:spPr/>
-        <p:txBody>
-          <a:bodyPr>
-            <a:normAutofit lnSpcReduction="10000"/>
-          </a:bodyPr>
-          <a:lstStyle/>
-          <a:p>
-            <a:r>
-              <a:rPr lang="en-US" dirty="0" smtClean="0"/>
-              <a:t>Methodology</a:t>
-            </a:r>
-          </a:p>
-          <a:p>
-            <a:r>
-              <a:rPr lang="en-US" dirty="0" smtClean="0"/>
-              <a:t>Creativity</a:t>
-            </a:r>
-          </a:p>
-          <a:p>
-            <a:pPr lvl="1"/>
-            <a:r>
-              <a:rPr lang="en-US" dirty="0" smtClean="0"/>
-              <a:t>Leader</a:t>
-            </a:r>
-          </a:p>
-          <a:p>
-            <a:pPr lvl="1"/>
-            <a:r>
-              <a:rPr lang="en-US" dirty="0" smtClean="0"/>
-              <a:t>Team</a:t>
-            </a:r>
-          </a:p>
-          <a:p>
-            <a:r>
-              <a:rPr lang="en-US" dirty="0" smtClean="0"/>
-              <a:t>Influence</a:t>
-            </a:r>
-          </a:p>
-          <a:p>
-            <a:pPr lvl="1"/>
-            <a:r>
-              <a:rPr lang="en-US" dirty="0" smtClean="0"/>
-              <a:t>Leader</a:t>
-            </a:r>
-          </a:p>
-          <a:p>
-            <a:pPr lvl="1"/>
-            <a:r>
-              <a:rPr lang="en-US" dirty="0" smtClean="0"/>
-              <a:t>Team</a:t>
-            </a:r>
-          </a:p>
-          <a:p>
-            <a:r>
-              <a:rPr lang="en-US" dirty="0" smtClean="0"/>
-              <a:t>Implementation</a:t>
-            </a:r>
-          </a:p>
-          <a:p>
-            <a:pPr lvl="1"/>
-            <a:r>
-              <a:rPr lang="en-US" dirty="0" smtClean="0"/>
-              <a:t>Leader</a:t>
-            </a:r>
-          </a:p>
-          <a:p>
-            <a:pPr lvl="1"/>
-            <a:r>
-              <a:rPr lang="en-US" dirty="0" smtClean="0"/>
-              <a:t>Team</a:t>
-            </a:r>
-          </a:p>
-        </p:txBody>
-      </p:sp>
-      <p:sp>
-        <p:nvSpPr>
-          <p:cNvPr id="5" name="Slide Number Placeholder 4"/>
-          <p:cNvSpPr>
-            <a:spLocks noGrp="1"/>
-          </p:cNvSpPr>
-          <p:nvPr>
-            <p:ph type="sldNum" sz="quarter" idx="12"/>
-          </p:nvPr>
-        </p:nvSpPr>
-        <p:spPr/>
-        <p:txBody>
-          <a:bodyPr/>
-          <a:lstStyle/>
-          <a:p>
-            <a:fld id="{9E487D81-23A7-E743-A35A-AC6109D8EDF6}" type="slidenum">
-              <a:rPr lang="en-US" smtClean="0"/>
-              <a:t>12</a:t>
-            </a:fld>
-            <a:endParaRPr lang="en-US"/>
-          </a:p>
-        </p:txBody>
-      </p:sp>
-      <p:pic>
-        <p:nvPicPr>
-          <p:cNvPr id="7" name="Picture 6"/>
-          <p:cNvPicPr>
-            <a:picLocks noChangeAspect="1"/>
-          </p:cNvPicPr>
-          <p:nvPr/>
-        </p:nvPicPr>
-        <p:blipFill>
-          <a:blip r:embed="rId3">
-            <a:extLst>
-              <a:ext uri="{28A0092B-C50C-407E-A947-70E740481C1C}">
-                <a14:useLocalDpi xmlns:a14="http://schemas.microsoft.com/office/drawing/2010/main" val="0"/>
-              </a:ext>
-            </a:extLst>
-          </a:blip>
-          <a:stretch>
-            <a:fillRect/>
-          </a:stretch>
-        </p:blipFill>
-        <p:spPr>
-          <a:xfrm>
-            <a:off x="267676" y="6101861"/>
-            <a:ext cx="1857239" cy="518746"/>
-          </a:xfrm>
-          <a:prstGeom prst="rect">
-            <a:avLst/>
-          </a:prstGeom>
-        </p:spPr>
-      </p:pic>
-    </p:spTree>
-    <p:extLst>
-      <p:ext uri="{BB962C8B-B14F-4D97-AF65-F5344CB8AC3E}">
-        <p14:creationId xmlns:p14="http://schemas.microsoft.com/office/powerpoint/2010/main" val="3265563"/>
-      </p:ext>
-    </p:extLst>
-  </p:cSld>
-  <p:clrMapOvr>
-    <a:masterClrMapping/>
-  </p:clrMapOvr>
-  <p:timing>
-    <p:tnLst>
-      <p:par>
-        <p:cTn id="1" dur="indefinite" restart="never" nodeType="tmRoot"/>
-      </p:par>
-    </p:tnLst>
-  </p:timing>
-</p:sld>
-</file>
-
 <file path=ppt/slides/slide2.xml><?xml version="1.0" encoding="utf-8"?>
 <p:sld xmlns:a="http://schemas.openxmlformats.org/drawingml/2006/main" xmlns:r="http://schemas.openxmlformats.org/officeDocument/2006/relationships" xmlns:p="http://schemas.openxmlformats.org/presentationml/2006/main">
   <p:cSld>
@@ -6581,7 +6203,7 @@
             <p:ph idx="1"/>
             <p:extLst>
               <p:ext uri="{D42A27DB-BD31-4B8C-83A1-F6EECF244321}">
-                <p14:modId xmlns:p14="http://schemas.microsoft.com/office/powerpoint/2010/main" val="1040843489"/>
+                <p14:modId xmlns:p14="http://schemas.microsoft.com/office/powerpoint/2010/main" val="967103061"/>
               </p:ext>
             </p:extLst>
           </p:nvPr>
@@ -6817,14 +6439,14 @@
                     <a:bodyPr/>
                     <a:lstStyle/>
                     <a:p>
-                      <a:pPr algn="r"/>
+                      <a:pPr algn="ctr"/>
                       <a:r>
                         <a:rPr lang="en-US" sz="2400" b="1" dirty="0" smtClean="0">
                           <a:solidFill>
                             <a:schemeClr val="bg1"/>
                           </a:solidFill>
                         </a:rPr>
-                        <a:t>Advice</a:t>
+                        <a:t>       Advice</a:t>
                       </a:r>
                       <a:endParaRPr lang="en-US" sz="2400" b="1" dirty="0">
                         <a:solidFill>
@@ -7075,6 +6697,7 @@
                     <a:bodyPr/>
                     <a:lstStyle/>
                     <a:p>
+                      <a:pPr algn="ctr"/>
                       <a:r>
                         <a:rPr lang="en-US" dirty="0" smtClean="0"/>
                         <a:t>Expansive</a:t>
@@ -7082,7 +6705,7 @@
                       <a:endParaRPr lang="en-US" dirty="0"/>
                     </a:p>
                   </a:txBody>
-                  <a:tcPr>
+                  <a:tcPr anchor="ctr">
                     <a:lnL w="12700" cap="flat" cmpd="sng" algn="ctr">
                       <a:noFill/>
                       <a:prstDash val="solid"/>
@@ -7128,6 +6751,7 @@
                     <a:bodyPr/>
                     <a:lstStyle/>
                     <a:p>
+                      <a:pPr algn="ctr"/>
                       <a:r>
                         <a:rPr lang="en-US" dirty="0" smtClean="0"/>
                         <a:t>Perceived</a:t>
@@ -7146,6 +6770,7 @@
                       </a:r>
                     </a:p>
                     <a:p>
+                      <a:pPr algn="ctr"/>
                       <a:r>
                         <a:rPr lang="en-US" b="1" baseline="0" dirty="0" smtClean="0"/>
                         <a:t>0.40</a:t>
@@ -7153,7 +6778,7 @@
                       <a:endParaRPr lang="en-US" b="1" dirty="0"/>
                     </a:p>
                   </a:txBody>
-                  <a:tcPr>
+                  <a:tcPr anchor="ctr">
                     <a:lnL w="12700" cap="flat" cmpd="sng" algn="ctr">
                       <a:noFill/>
                       <a:prstDash val="solid"/>
@@ -7199,6 +6824,7 @@
                     <a:bodyPr/>
                     <a:lstStyle/>
                     <a:p>
+                      <a:pPr algn="ctr"/>
                       <a:r>
                         <a:rPr lang="en-US" b="1" dirty="0" smtClean="0"/>
                         <a:t>0.275</a:t>
@@ -7206,7 +6832,7 @@
                       <a:endParaRPr lang="en-US" b="1" dirty="0"/>
                     </a:p>
                   </a:txBody>
-                  <a:tcPr>
+                  <a:tcPr anchor="ctr">
                     <a:lnL w="12700" cap="flat" cmpd="sng" algn="ctr">
                       <a:noFill/>
                       <a:prstDash val="solid"/>
@@ -7252,6 +6878,7 @@
                     <a:bodyPr/>
                     <a:lstStyle/>
                     <a:p>
+                      <a:pPr algn="ctr"/>
                       <a:r>
                         <a:rPr lang="en-US" b="1" dirty="0" smtClean="0"/>
                         <a:t>0.275</a:t>
@@ -7259,7 +6886,7 @@
                       <a:endParaRPr lang="en-US" b="1" dirty="0"/>
                     </a:p>
                   </a:txBody>
-                  <a:tcPr>
+                  <a:tcPr anchor="ctr">
                     <a:lnL w="12700" cap="flat" cmpd="sng" algn="ctr">
                       <a:noFill/>
                       <a:prstDash val="solid"/>
@@ -7305,6 +6932,7 @@
                     <a:bodyPr/>
                     <a:lstStyle/>
                     <a:p>
+                      <a:pPr algn="ctr"/>
                       <a:r>
                         <a:rPr lang="en-US" b="1" dirty="0" smtClean="0"/>
                         <a:t>0.05</a:t>
@@ -7312,7 +6940,7 @@
                       <a:endParaRPr lang="en-US" b="1" dirty="0"/>
                     </a:p>
                   </a:txBody>
-                  <a:tcPr>
+                  <a:tcPr anchor="ctr">
                     <a:lnL w="12700" cap="flat" cmpd="sng" algn="ctr">
                       <a:noFill/>
                       <a:prstDash val="solid"/>
@@ -7411,6 +7039,7 @@
                     <a:bodyPr/>
                     <a:lstStyle/>
                     <a:p>
+                      <a:pPr algn="ctr"/>
                       <a:r>
                         <a:rPr lang="en-US" b="0" dirty="0" smtClean="0"/>
                         <a:t>Expansive</a:t>
@@ -7421,13 +7050,14 @@
                       </a:r>
                     </a:p>
                     <a:p>
+                      <a:pPr algn="ctr"/>
                       <a:r>
                         <a:rPr lang="en-US" b="0" baseline="0" dirty="0" smtClean="0"/>
                         <a:t>Exclusive</a:t>
                       </a:r>
                     </a:p>
                   </a:txBody>
-                  <a:tcPr>
+                  <a:tcPr anchor="ctr">
                     <a:lnL w="12700" cap="flat" cmpd="sng" algn="ctr">
                       <a:noFill/>
                       <a:prstDash val="solid"/>
@@ -7475,6 +7105,7 @@
                     <a:bodyPr/>
                     <a:lstStyle/>
                     <a:p>
+                      <a:pPr algn="ctr"/>
                       <a:r>
                         <a:rPr lang="en-US" b="0" dirty="0" smtClean="0"/>
                         <a:t>Perceived</a:t>
@@ -7489,6 +7120,7 @@
                       </a:r>
                     </a:p>
                     <a:p>
+                      <a:pPr algn="ctr"/>
                       <a:r>
                         <a:rPr lang="en-US" b="1" dirty="0" smtClean="0"/>
                         <a:t>0.40</a:t>
@@ -7496,7 +7128,7 @@
                       <a:endParaRPr lang="en-US" b="1" dirty="0"/>
                     </a:p>
                   </a:txBody>
-                  <a:tcPr>
+                  <a:tcPr anchor="ctr">
                     <a:lnL w="12700" cap="flat" cmpd="sng" algn="ctr">
                       <a:noFill/>
                       <a:prstDash val="solid"/>
@@ -7544,6 +7176,7 @@
                     <a:bodyPr/>
                     <a:lstStyle/>
                     <a:p>
+                      <a:pPr algn="ctr"/>
                       <a:r>
                         <a:rPr lang="en-US" b="1" dirty="0" smtClean="0"/>
                         <a:t>0.275</a:t>
@@ -7551,7 +7184,7 @@
                       <a:endParaRPr lang="en-US" b="1" dirty="0"/>
                     </a:p>
                   </a:txBody>
-                  <a:tcPr>
+                  <a:tcPr anchor="ctr">
                     <a:lnL w="12700" cap="flat" cmpd="sng" algn="ctr">
                       <a:noFill/>
                       <a:prstDash val="solid"/>
@@ -7599,6 +7232,7 @@
                     <a:bodyPr/>
                     <a:lstStyle/>
                     <a:p>
+                      <a:pPr algn="ctr"/>
                       <a:r>
                         <a:rPr lang="en-US" b="1" dirty="0" smtClean="0"/>
                         <a:t>0.275</a:t>
@@ -7606,7 +7240,7 @@
                       <a:endParaRPr lang="en-US" b="1" dirty="0"/>
                     </a:p>
                   </a:txBody>
-                  <a:tcPr>
+                  <a:tcPr anchor="ctr">
                     <a:lnL w="12700" cap="flat" cmpd="sng" algn="ctr">
                       <a:noFill/>
                       <a:prstDash val="solid"/>
@@ -7654,6 +7288,7 @@
                     <a:bodyPr/>
                     <a:lstStyle/>
                     <a:p>
+                      <a:pPr algn="ctr"/>
                       <a:r>
                         <a:rPr lang="en-US" b="1" dirty="0" smtClean="0"/>
                         <a:t>0.05</a:t>
@@ -7661,7 +7296,7 @@
                       <a:endParaRPr lang="en-US" b="1" dirty="0"/>
                     </a:p>
                   </a:txBody>
-                  <a:tcPr>
+                  <a:tcPr anchor="ctr">
                     <a:lnL w="12700" cap="flat" cmpd="sng" algn="ctr">
                       <a:noFill/>
                       <a:prstDash val="solid"/>
@@ -7760,6 +7395,7 @@
                     <a:bodyPr/>
                     <a:lstStyle/>
                     <a:p>
+                      <a:pPr algn="ctr"/>
                       <a:r>
                         <a:rPr lang="en-US" dirty="0" smtClean="0"/>
                         <a:t>Tight</a:t>
@@ -7767,7 +7403,7 @@
                       <a:endParaRPr lang="en-US" dirty="0"/>
                     </a:p>
                   </a:txBody>
-                  <a:tcPr>
+                  <a:tcPr anchor="ctr">
                     <a:lnL w="12700" cap="flat" cmpd="sng" algn="ctr">
                       <a:noFill/>
                       <a:prstDash val="solid"/>
@@ -7813,6 +7449,7 @@
                     <a:bodyPr/>
                     <a:lstStyle/>
                     <a:p>
+                      <a:pPr algn="ctr"/>
                       <a:r>
                         <a:rPr lang="en-US" dirty="0" smtClean="0"/>
                         <a:t>Perceived</a:t>
@@ -7832,7 +7469,7 @@
                       <a:endParaRPr lang="en-US" b="1" dirty="0"/>
                     </a:p>
                   </a:txBody>
-                  <a:tcPr>
+                  <a:tcPr anchor="ctr">
                     <a:lnL w="12700" cap="flat" cmpd="sng" algn="ctr">
                       <a:noFill/>
                       <a:prstDash val="solid"/>
@@ -7878,6 +7515,7 @@
                     <a:bodyPr/>
                     <a:lstStyle/>
                     <a:p>
+                      <a:pPr algn="ctr"/>
                       <a:r>
                         <a:rPr lang="en-US" b="1" dirty="0" smtClean="0"/>
                         <a:t>0.35</a:t>
@@ -7885,7 +7523,7 @@
                       <a:endParaRPr lang="en-US" b="1" dirty="0"/>
                     </a:p>
                   </a:txBody>
-                  <a:tcPr>
+                  <a:tcPr anchor="ctr">
                     <a:lnL w="12700" cap="flat" cmpd="sng" algn="ctr">
                       <a:noFill/>
                       <a:prstDash val="solid"/>
@@ -7931,6 +7569,7 @@
                     <a:bodyPr/>
                     <a:lstStyle/>
                     <a:p>
+                      <a:pPr algn="ctr"/>
                       <a:r>
                         <a:rPr lang="en-US" b="1" dirty="0" smtClean="0"/>
                         <a:t>0.20</a:t>
@@ -7938,7 +7577,7 @@
                       <a:endParaRPr lang="en-US" b="1" dirty="0"/>
                     </a:p>
                   </a:txBody>
-                  <a:tcPr>
+                  <a:tcPr anchor="ctr">
                     <a:lnL w="12700" cap="flat" cmpd="sng" algn="ctr">
                       <a:noFill/>
                       <a:prstDash val="solid"/>
@@ -7984,6 +7623,7 @@
                     <a:bodyPr/>
                     <a:lstStyle/>
                     <a:p>
+                      <a:pPr algn="ctr"/>
                       <a:r>
                         <a:rPr lang="en-US" b="1" dirty="0" smtClean="0"/>
                         <a:t>0.10</a:t>
@@ -7991,7 +7631,7 @@
                       <a:endParaRPr lang="en-US" b="1" dirty="0"/>
                     </a:p>
                   </a:txBody>
-                  <a:tcPr>
+                  <a:tcPr anchor="ctr">
                     <a:lnL w="12700" cap="flat" cmpd="sng" algn="ctr">
                       <a:noFill/>
                       <a:prstDash val="solid"/>
@@ -8405,7 +8045,7 @@
             <p:ph idx="1"/>
             <p:extLst>
               <p:ext uri="{D42A27DB-BD31-4B8C-83A1-F6EECF244321}">
-                <p14:modId xmlns:p14="http://schemas.microsoft.com/office/powerpoint/2010/main" val="1475997842"/>
+                <p14:modId xmlns:p14="http://schemas.microsoft.com/office/powerpoint/2010/main" val="969822082"/>
               </p:ext>
             </p:extLst>
           </p:nvPr>
@@ -8509,7 +8149,15 @@
                             <a:schemeClr val="bg1"/>
                           </a:solidFill>
                         </a:rPr>
-                        <a:t>Party Type</a:t>
+                        <a:t>   Party </a:t>
+                      </a:r>
+                      <a:r>
+                        <a:rPr lang="en-US" sz="2400" b="1" dirty="0" smtClean="0">
+                          <a:solidFill>
+                            <a:schemeClr val="bg1"/>
+                          </a:solidFill>
+                        </a:rPr>
+                        <a:t>Type</a:t>
                       </a:r>
                       <a:endParaRPr lang="en-US" sz="2400" b="1" dirty="0">
                         <a:solidFill>
@@ -8578,7 +8226,7 @@
                             <a:schemeClr val="bg1"/>
                           </a:solidFill>
                         </a:rPr>
-                        <a:t>Strength</a:t>
+                        <a:t>    Strength</a:t>
                       </a:r>
                       <a:endParaRPr lang="en-US" sz="2400" b="1" dirty="0">
                         <a:solidFill>
@@ -8647,7 +8295,7 @@
                             <a:schemeClr val="bg1"/>
                           </a:solidFill>
                         </a:rPr>
-                        <a:t>Network</a:t>
+                        <a:t>       Network</a:t>
                       </a:r>
                       <a:endParaRPr lang="en-US" sz="2400" b="1" dirty="0">
                         <a:solidFill>
@@ -8716,7 +8364,15 @@
                             <a:schemeClr val="bg1"/>
                           </a:solidFill>
                         </a:rPr>
-                        <a:t>Leader pick</a:t>
+                        <a:t>    Leader </a:t>
+                      </a:r>
+                      <a:r>
+                        <a:rPr lang="en-US" sz="2400" b="1" dirty="0" smtClean="0">
+                          <a:solidFill>
+                            <a:schemeClr val="bg1"/>
+                          </a:solidFill>
+                        </a:rPr>
+                        <a:t>pick</a:t>
                       </a:r>
                       <a:endParaRPr lang="en-US" sz="2400" b="1" dirty="0">
                         <a:solidFill>
@@ -8829,6 +8485,7 @@
                     <a:bodyPr/>
                     <a:lstStyle/>
                     <a:p>
+                      <a:pPr algn="ctr"/>
                       <a:r>
                         <a:rPr lang="en-US" dirty="0" smtClean="0"/>
                         <a:t>Expansive &gt; Exclusive &gt; Tight</a:t>
@@ -8836,6 +8493,7 @@
                       <a:endParaRPr lang="en-US" baseline="0" dirty="0" smtClean="0"/>
                     </a:p>
                     <a:p>
+                      <a:pPr algn="ctr"/>
                       <a:r>
                         <a:rPr lang="en-US" b="1" dirty="0" smtClean="0"/>
                         <a:t>0.15</a:t>
@@ -8843,7 +8501,7 @@
                       <a:endParaRPr lang="en-US" b="1" dirty="0"/>
                     </a:p>
                   </a:txBody>
-                  <a:tcPr>
+                  <a:tcPr anchor="ctr">
                     <a:lnL w="12700" cap="flat" cmpd="sng" algn="ctr">
                       <a:noFill/>
                       <a:prstDash val="solid"/>
@@ -8889,7 +8547,7 @@
                     <a:bodyPr/>
                     <a:lstStyle/>
                     <a:p>
-                      <a:pPr marL="0" marR="0" indent="0" algn="l" defTabSz="914400" rtl="0" eaLnBrk="1" fontAlgn="auto" latinLnBrk="0" hangingPunct="1">
+                      <a:pPr marL="0" marR="0" indent="0" algn="ctr" defTabSz="914400" rtl="0" eaLnBrk="1" fontAlgn="auto" latinLnBrk="0" hangingPunct="1">
                         <a:lnSpc>
                           <a:spcPct val="100000"/>
                         </a:lnSpc>
@@ -8921,10 +8579,11 @@
                       <a:endParaRPr lang="en-US" b="1" dirty="0" smtClean="0"/>
                     </a:p>
                     <a:p>
+                      <a:pPr algn="ctr"/>
                       <a:endParaRPr lang="en-US" dirty="0"/>
                     </a:p>
                   </a:txBody>
-                  <a:tcPr>
+                  <a:tcPr anchor="ctr">
                     <a:lnL w="12700" cap="flat" cmpd="sng" algn="ctr">
                       <a:noFill/>
                       <a:prstDash val="solid"/>
@@ -8970,7 +8629,7 @@
                     <a:bodyPr/>
                     <a:lstStyle/>
                     <a:p>
-                      <a:pPr marL="0" marR="0" indent="0" algn="l" defTabSz="914400" rtl="0" eaLnBrk="1" fontAlgn="auto" latinLnBrk="0" hangingPunct="1">
+                      <a:pPr marL="0" marR="0" indent="0" algn="ctr" defTabSz="914400" rtl="0" eaLnBrk="1" fontAlgn="auto" latinLnBrk="0" hangingPunct="1">
                         <a:lnSpc>
                           <a:spcPct val="100000"/>
                         </a:lnSpc>
@@ -8993,7 +8652,7 @@
                       </a:r>
                     </a:p>
                     <a:p>
-                      <a:pPr marL="0" marR="0" indent="0" algn="l" defTabSz="914400" rtl="0" eaLnBrk="1" fontAlgn="auto" latinLnBrk="0" hangingPunct="1">
+                      <a:pPr marL="0" marR="0" indent="0" algn="ctr" defTabSz="914400" rtl="0" eaLnBrk="1" fontAlgn="auto" latinLnBrk="0" hangingPunct="1">
                         <a:lnSpc>
                           <a:spcPct val="100000"/>
                         </a:lnSpc>
@@ -9024,7 +8683,7 @@
                       </a:r>
                     </a:p>
                     <a:p>
-                      <a:pPr marL="0" marR="0" indent="0" algn="l" defTabSz="914400" rtl="0" eaLnBrk="1" fontAlgn="auto" latinLnBrk="0" hangingPunct="1">
+                      <a:pPr marL="0" marR="0" indent="0" algn="ctr" defTabSz="914400" rtl="0" eaLnBrk="1" fontAlgn="auto" latinLnBrk="0" hangingPunct="1">
                         <a:lnSpc>
                           <a:spcPct val="100000"/>
                         </a:lnSpc>
@@ -9047,7 +8706,7 @@
                       </a:r>
                     </a:p>
                   </a:txBody>
-                  <a:tcPr>
+                  <a:tcPr anchor="ctr">
                     <a:lnL w="12700" cap="flat" cmpd="sng" algn="ctr">
                       <a:noFill/>
                       <a:prstDash val="solid"/>
@@ -9093,6 +8752,7 @@
                     <a:bodyPr/>
                     <a:lstStyle/>
                     <a:p>
+                      <a:pPr algn="ctr"/>
                       <a:r>
                         <a:rPr lang="en-US" b="1" dirty="0" smtClean="0"/>
                         <a:t>0.15</a:t>
@@ -9100,7 +8760,7 @@
                       <a:endParaRPr lang="en-US" b="1" dirty="0"/>
                     </a:p>
                   </a:txBody>
-                  <a:tcPr>
+                  <a:tcPr anchor="ctr">
                     <a:lnL w="12700" cap="flat" cmpd="sng" algn="ctr">
                       <a:noFill/>
                       <a:prstDash val="solid"/>
@@ -9199,12 +8859,14 @@
                     <a:bodyPr/>
                     <a:lstStyle/>
                     <a:p>
+                      <a:pPr algn="ctr"/>
                       <a:r>
                         <a:rPr lang="en-US" dirty="0" smtClean="0"/>
                         <a:t>Exclusive or Expansive &gt; Tight</a:t>
                       </a:r>
                     </a:p>
                     <a:p>
+                      <a:pPr algn="ctr"/>
                       <a:r>
                         <a:rPr lang="en-US" b="1" dirty="0" smtClean="0"/>
                         <a:t>0.15</a:t>
@@ -9212,7 +8874,7 @@
                       <a:endParaRPr lang="en-US" b="1" dirty="0"/>
                     </a:p>
                   </a:txBody>
-                  <a:tcPr>
+                  <a:tcPr anchor="ctr">
                     <a:lnL w="12700" cap="flat" cmpd="sng" algn="ctr">
                       <a:noFill/>
                       <a:prstDash val="solid"/>
@@ -9260,7 +8922,7 @@
                     <a:bodyPr/>
                     <a:lstStyle/>
                     <a:p>
-                      <a:pPr marL="0" marR="0" indent="0" algn="l" defTabSz="914400" rtl="0" eaLnBrk="1" fontAlgn="auto" latinLnBrk="0" hangingPunct="1">
+                      <a:pPr marL="0" marR="0" indent="0" algn="ctr" defTabSz="914400" rtl="0" eaLnBrk="1" fontAlgn="auto" latinLnBrk="0" hangingPunct="1">
                         <a:lnSpc>
                           <a:spcPct val="100000"/>
                         </a:lnSpc>
@@ -9292,10 +8954,11 @@
                       <a:endParaRPr lang="en-US" b="1" dirty="0" smtClean="0"/>
                     </a:p>
                     <a:p>
+                      <a:pPr algn="ctr"/>
                       <a:endParaRPr lang="en-US" dirty="0"/>
                     </a:p>
                   </a:txBody>
-                  <a:tcPr>
+                  <a:tcPr anchor="ctr">
                     <a:lnL w="12700" cap="flat" cmpd="sng" algn="ctr">
                       <a:noFill/>
                       <a:prstDash val="solid"/>
@@ -9343,7 +9006,7 @@
                     <a:bodyPr/>
                     <a:lstStyle/>
                     <a:p>
-                      <a:pPr marL="0" marR="0" indent="0" algn="l" defTabSz="914400" rtl="0" eaLnBrk="1" fontAlgn="auto" latinLnBrk="0" hangingPunct="1">
+                      <a:pPr marL="0" marR="0" indent="0" algn="ctr" defTabSz="914400" rtl="0" eaLnBrk="1" fontAlgn="auto" latinLnBrk="0" hangingPunct="1">
                         <a:lnSpc>
                           <a:spcPct val="100000"/>
                         </a:lnSpc>
@@ -9366,7 +9029,7 @@
                       </a:r>
                     </a:p>
                     <a:p>
-                      <a:pPr marL="0" marR="0" indent="0" algn="l" defTabSz="914400" rtl="0" eaLnBrk="1" fontAlgn="auto" latinLnBrk="0" hangingPunct="1">
+                      <a:pPr marL="0" marR="0" indent="0" algn="ctr" defTabSz="914400" rtl="0" eaLnBrk="1" fontAlgn="auto" latinLnBrk="0" hangingPunct="1">
                         <a:lnSpc>
                           <a:spcPct val="100000"/>
                         </a:lnSpc>
@@ -9389,7 +9052,7 @@
                       </a:r>
                     </a:p>
                     <a:p>
-                      <a:pPr marL="0" marR="0" indent="0" algn="l" defTabSz="914400" rtl="0" eaLnBrk="1" fontAlgn="auto" latinLnBrk="0" hangingPunct="1">
+                      <a:pPr marL="0" marR="0" indent="0" algn="ctr" defTabSz="914400" rtl="0" eaLnBrk="1" fontAlgn="auto" latinLnBrk="0" hangingPunct="1">
                         <a:lnSpc>
                           <a:spcPct val="100000"/>
                         </a:lnSpc>
@@ -9412,7 +9075,7 @@
                       </a:r>
                     </a:p>
                   </a:txBody>
-                  <a:tcPr>
+                  <a:tcPr anchor="ctr">
                     <a:lnL w="12700" cap="flat" cmpd="sng" algn="ctr">
                       <a:noFill/>
                       <a:prstDash val="solid"/>
@@ -9460,6 +9123,7 @@
                     <a:bodyPr/>
                     <a:lstStyle/>
                     <a:p>
+                      <a:pPr algn="ctr"/>
                       <a:r>
                         <a:rPr lang="en-US" b="1" dirty="0" smtClean="0"/>
                         <a:t>0.15</a:t>
@@ -9467,7 +9131,7 @@
                       <a:endParaRPr lang="en-US" b="1" dirty="0"/>
                     </a:p>
                   </a:txBody>
-                  <a:tcPr>
+                  <a:tcPr anchor="ctr">
                     <a:lnL w="12700" cap="flat" cmpd="sng" algn="ctr">
                       <a:noFill/>
                       <a:prstDash val="solid"/>
@@ -9566,10 +9230,15 @@
                     <a:bodyPr/>
                     <a:lstStyle/>
                     <a:p>
+                      <a:pPr algn="ctr"/>
                       <a:r>
                         <a:rPr lang="en-US" dirty="0" smtClean="0"/>
-                        <a:t>Tight &gt; Exclusive &gt; Expansive  party invites </a:t>
+                        <a:t>Tight &gt; Exclusive &gt; Expansive </a:t>
                       </a:r>
+                      <a:endParaRPr lang="en-US" dirty="0" smtClean="0"/>
+                    </a:p>
+                    <a:p>
+                      <a:pPr algn="ctr"/>
                       <a:r>
                         <a:rPr lang="en-US" b="1" dirty="0" smtClean="0"/>
                         <a:t>0.15</a:t>
@@ -9577,7 +9246,7 @@
                       <a:endParaRPr lang="en-US" b="1" dirty="0"/>
                     </a:p>
                   </a:txBody>
-                  <a:tcPr>
+                  <a:tcPr anchor="ctr">
                     <a:lnL w="12700" cap="flat" cmpd="sng" algn="ctr">
                       <a:noFill/>
                       <a:prstDash val="solid"/>
@@ -9623,7 +9292,7 @@
                     <a:bodyPr/>
                     <a:lstStyle/>
                     <a:p>
-                      <a:pPr marL="0" marR="0" indent="0" algn="l" defTabSz="914400" rtl="0" eaLnBrk="1" fontAlgn="auto" latinLnBrk="0" hangingPunct="1">
+                      <a:pPr marL="0" marR="0" indent="0" algn="ctr" defTabSz="914400" rtl="0" eaLnBrk="1" fontAlgn="auto" latinLnBrk="0" hangingPunct="1">
                         <a:lnSpc>
                           <a:spcPct val="100000"/>
                         </a:lnSpc>
@@ -9646,7 +9315,7 @@
                       </a:r>
                     </a:p>
                     <a:p>
-                      <a:pPr marL="0" marR="0" indent="0" algn="l" defTabSz="914400" rtl="0" eaLnBrk="1" fontAlgn="auto" latinLnBrk="0" hangingPunct="1">
+                      <a:pPr marL="0" marR="0" indent="0" algn="ctr" defTabSz="914400" rtl="0" eaLnBrk="1" fontAlgn="auto" latinLnBrk="0" hangingPunct="1">
                         <a:lnSpc>
                           <a:spcPct val="100000"/>
                         </a:lnSpc>
@@ -9669,10 +9338,11 @@
                       </a:r>
                     </a:p>
                     <a:p>
+                      <a:pPr algn="ctr"/>
                       <a:endParaRPr lang="en-US" dirty="0"/>
                     </a:p>
                   </a:txBody>
-                  <a:tcPr>
+                  <a:tcPr anchor="ctr">
                     <a:lnL w="12700" cap="flat" cmpd="sng" algn="ctr">
                       <a:noFill/>
                       <a:prstDash val="solid"/>
@@ -9718,7 +9388,7 @@
                     <a:bodyPr/>
                     <a:lstStyle/>
                     <a:p>
-                      <a:pPr marL="0" marR="0" indent="0" algn="l" defTabSz="914400" rtl="0" eaLnBrk="1" fontAlgn="auto" latinLnBrk="0" hangingPunct="1">
+                      <a:pPr marL="0" marR="0" indent="0" algn="ctr" defTabSz="914400" rtl="0" eaLnBrk="1" fontAlgn="auto" latinLnBrk="0" hangingPunct="1">
                         <a:lnSpc>
                           <a:spcPct val="100000"/>
                         </a:lnSpc>
@@ -9741,7 +9411,7 @@
                       </a:r>
                     </a:p>
                     <a:p>
-                      <a:pPr marL="0" marR="0" indent="0" algn="l" defTabSz="914400" rtl="0" eaLnBrk="1" fontAlgn="auto" latinLnBrk="0" hangingPunct="1">
+                      <a:pPr marL="0" marR="0" indent="0" algn="ctr" defTabSz="914400" rtl="0" eaLnBrk="1" fontAlgn="auto" latinLnBrk="0" hangingPunct="1">
                         <a:lnSpc>
                           <a:spcPct val="100000"/>
                         </a:lnSpc>
@@ -9764,7 +9434,7 @@
                       </a:r>
                     </a:p>
                     <a:p>
-                      <a:pPr marL="0" marR="0" indent="0" algn="l" defTabSz="914400" rtl="0" eaLnBrk="1" fontAlgn="auto" latinLnBrk="0" hangingPunct="1">
+                      <a:pPr marL="0" marR="0" indent="0" algn="ctr" defTabSz="914400" rtl="0" eaLnBrk="1" fontAlgn="auto" latinLnBrk="0" hangingPunct="1">
                         <a:lnSpc>
                           <a:spcPct val="100000"/>
                         </a:lnSpc>
@@ -9787,7 +9457,7 @@
                       </a:r>
                     </a:p>
                   </a:txBody>
-                  <a:tcPr>
+                  <a:tcPr anchor="ctr">
                     <a:lnL w="12700" cap="flat" cmpd="sng" algn="ctr">
                       <a:noFill/>
                       <a:prstDash val="solid"/>
@@ -9833,6 +9503,7 @@
                     <a:bodyPr/>
                     <a:lstStyle/>
                     <a:p>
+                      <a:pPr algn="ctr"/>
                       <a:r>
                         <a:rPr lang="en-US" b="1" dirty="0" smtClean="0"/>
                         <a:t>0.15</a:t>
@@ -9840,7 +9511,7 @@
                       <a:endParaRPr lang="en-US" b="1" dirty="0"/>
                     </a:p>
                   </a:txBody>
-                  <a:tcPr>
+                  <a:tcPr anchor="ctr">
                     <a:lnL w="12700" cap="flat" cmpd="sng" algn="ctr">
                       <a:noFill/>
                       <a:prstDash val="solid"/>
@@ -10276,7 +9947,7 @@
         </p:nvSpPr>
         <p:spPr>
           <a:xfrm>
-            <a:off x="838200" y="1518557"/>
+            <a:off x="838200" y="1418807"/>
             <a:ext cx="5012871" cy="3000821"/>
           </a:xfrm>
           <a:prstGeom prst="rect">
@@ -10298,8 +9969,32 @@
               <a:buChar char="•"/>
             </a:pPr>
             <a:r>
+              <a:rPr lang="en-US" b="1" dirty="0" smtClean="0">
+                <a:solidFill>
+                  <a:srgbClr val="37BDA7"/>
+                </a:solidFill>
+              </a:rPr>
+              <a:t>Four</a:t>
+            </a:r>
+            <a:r>
+              <a:rPr lang="en-US" b="1" dirty="0" smtClean="0">
+                <a:solidFill>
+                  <a:srgbClr val="37BDA7"/>
+                </a:solidFill>
+              </a:rPr>
+              <a:t> </a:t>
+            </a:r>
+            <a:r>
+              <a:rPr lang="en-US" b="1" dirty="0" smtClean="0">
+                <a:solidFill>
+                  <a:srgbClr val="37BDA7"/>
+                </a:solidFill>
+              </a:rPr>
+              <a:t>clusters </a:t>
+            </a:r>
+            <a:r>
               <a:rPr lang="en-US" dirty="0" smtClean="0"/>
-              <a:t>4 clusters identified within the network  that match intuitive network dynamics</a:t>
+              <a:t>identified within the network  that match intuitive network dynamics</a:t>
             </a:r>
           </a:p>
           <a:p>
@@ -10312,7 +10007,39 @@
             </a:pPr>
             <a:r>
               <a:rPr lang="en-US" dirty="0" smtClean="0"/>
-              <a:t>The larger cluster members often have more votes (most likely from within the cluster), but come at higher costs</a:t>
+              <a:t>The </a:t>
+            </a:r>
+            <a:r>
+              <a:rPr lang="en-US" b="1" dirty="0" smtClean="0">
+                <a:solidFill>
+                  <a:srgbClr val="37BDA7"/>
+                </a:solidFill>
+              </a:rPr>
+              <a:t>larger cluster </a:t>
+            </a:r>
+            <a:r>
+              <a:rPr lang="en-US" dirty="0" smtClean="0"/>
+              <a:t>members often have </a:t>
+            </a:r>
+            <a:r>
+              <a:rPr lang="en-US" b="1" dirty="0" smtClean="0">
+                <a:solidFill>
+                  <a:srgbClr val="37BDA7"/>
+                </a:solidFill>
+              </a:rPr>
+              <a:t>more votes </a:t>
+            </a:r>
+            <a:r>
+              <a:rPr lang="en-US" dirty="0" smtClean="0"/>
+              <a:t>(most likely from within the cluster), but come at </a:t>
+            </a:r>
+            <a:r>
+              <a:rPr lang="en-US" b="1" dirty="0" smtClean="0">
+                <a:solidFill>
+                  <a:srgbClr val="37BDA7"/>
+                </a:solidFill>
+              </a:rPr>
+              <a:t>higher costs</a:t>
             </a:r>
           </a:p>
           <a:p>
@@ -10325,7 +10052,19 @@
             </a:pPr>
             <a:r>
               <a:rPr lang="en-US" dirty="0" smtClean="0"/>
-              <a:t>To pick optimal teams,  the following constraints are put into place:</a:t>
+              <a:t>To pick </a:t>
+            </a:r>
+            <a:r>
+              <a:rPr lang="en-US" b="1" dirty="0" smtClean="0">
+                <a:solidFill>
+                  <a:srgbClr val="37BDA7"/>
+                </a:solidFill>
+              </a:rPr>
+              <a:t>optimal teams</a:t>
+            </a:r>
+            <a:r>
+              <a:rPr lang="en-US" dirty="0" smtClean="0"/>
+              <a:t>,  the following constraints are put into place:</a:t>
             </a:r>
             <a:endParaRPr lang="en-US" dirty="0"/>
           </a:p>
@@ -10347,7 +10086,7 @@
           <a:lstStyle/>
           <a:p>
             <a:r>
-              <a:rPr lang="en-US" smtClean="0"/>
+              <a:rPr lang="en-US" dirty="0" smtClean="0"/>
               <a:t>Teams and Communities</a:t>
             </a:r>
             <a:endParaRPr lang="en-US" dirty="0"/>
@@ -10453,7 +10192,7 @@
         <p:spPr>
           <a:xfrm>
             <a:off x="1041136" y="4299295"/>
-            <a:ext cx="5219454" cy="1676741"/>
+            <a:ext cx="5219454" cy="1754326"/>
           </a:xfrm>
           <a:prstGeom prst="rect">
             <a:avLst/>
@@ -10506,12 +10245,16 @@
               </a:lnSpc>
             </a:pPr>
             <a:r>
-              <a:rPr lang="en-US" b="1" dirty="0"/>
-              <a:t>Some Diversity:</a:t>
+              <a:rPr lang="en-US" b="1" dirty="0" smtClean="0"/>
+              <a:t>More Cohesion:</a:t>
+            </a:r>
+            <a:r>
+              <a:rPr lang="en-US" dirty="0" smtClean="0"/>
+              <a:t> </a:t>
             </a:r>
             <a:r>
               <a:rPr lang="en-US" dirty="0"/>
-              <a:t> No more than 3 members per </a:t>
+              <a:t>No more than 3 members per </a:t>
             </a:r>
             <a:r>
               <a:rPr lang="en-US" dirty="0" smtClean="0"/>

</xml_diff>

<commit_message>
Updated presentation to include the important criteria on the spider diagrams
</commit_message>
<xml_diff>
--- a/Presentation.pptx
+++ b/Presentation.pptx
@@ -5,7 +5,7 @@
     <p:sldMasterId id="2147483648" r:id="rId1"/>
   </p:sldMasterIdLst>
   <p:notesMasterIdLst>
-    <p:notesMasterId r:id="rId15"/>
+    <p:notesMasterId r:id="rId13"/>
   </p:notesMasterIdLst>
   <p:sldIdLst>
     <p:sldId id="256" r:id="rId2"/>
@@ -19,8 +19,6 @@
     <p:sldId id="276" r:id="rId10"/>
     <p:sldId id="272" r:id="rId11"/>
     <p:sldId id="275" r:id="rId12"/>
-    <p:sldId id="273" r:id="rId13"/>
-    <p:sldId id="274" r:id="rId14"/>
   </p:sldIdLst>
   <p:sldSz cx="12192000" cy="6858000"/>
   <p:notesSz cx="6858000" cy="9144000"/>
@@ -653,90 +651,6 @@
 </p:notes>
 </file>
 
-<file path=ppt/notesSlides/notesSlide11.xml><?xml version="1.0" encoding="utf-8"?>
-<p:notes xmlns:a="http://schemas.openxmlformats.org/drawingml/2006/main" xmlns:r="http://schemas.openxmlformats.org/officeDocument/2006/relationships" xmlns:p="http://schemas.openxmlformats.org/presentationml/2006/main">
-  <p:cSld>
-    <p:spTree>
-      <p:nvGrpSpPr>
-        <p:cNvPr id="1" name=""/>
-        <p:cNvGrpSpPr/>
-        <p:nvPr/>
-      </p:nvGrpSpPr>
-      <p:grpSpPr>
-        <a:xfrm>
-          <a:off x="0" y="0"/>
-          <a:ext cx="0" cy="0"/>
-          <a:chOff x="0" y="0"/>
-          <a:chExt cx="0" cy="0"/>
-        </a:xfrm>
-      </p:grpSpPr>
-      <p:sp>
-        <p:nvSpPr>
-          <p:cNvPr id="2" name="Slide Image Placeholder 1"/>
-          <p:cNvSpPr>
-            <a:spLocks noGrp="1" noRot="1" noChangeAspect="1"/>
-          </p:cNvSpPr>
-          <p:nvPr>
-            <p:ph type="sldImg"/>
-          </p:nvPr>
-        </p:nvSpPr>
-        <p:spPr/>
-      </p:sp>
-      <p:sp>
-        <p:nvSpPr>
-          <p:cNvPr id="3" name="Notes Placeholder 2"/>
-          <p:cNvSpPr>
-            <a:spLocks noGrp="1"/>
-          </p:cNvSpPr>
-          <p:nvPr>
-            <p:ph type="body" idx="1"/>
-          </p:nvPr>
-        </p:nvSpPr>
-        <p:spPr/>
-        <p:txBody>
-          <a:bodyPr/>
-          <a:lstStyle/>
-          <a:p>
-            <a:endParaRPr lang="en-US" dirty="0"/>
-          </a:p>
-        </p:txBody>
-      </p:sp>
-      <p:sp>
-        <p:nvSpPr>
-          <p:cNvPr id="4" name="Slide Number Placeholder 3"/>
-          <p:cNvSpPr>
-            <a:spLocks noGrp="1"/>
-          </p:cNvSpPr>
-          <p:nvPr>
-            <p:ph type="sldNum" sz="quarter" idx="10"/>
-          </p:nvPr>
-        </p:nvSpPr>
-        <p:spPr/>
-        <p:txBody>
-          <a:bodyPr/>
-          <a:lstStyle/>
-          <a:p>
-            <a:fld id="{ABE0B4DF-EF78-C641-9F01-3822F88552DE}" type="slidenum">
-              <a:rPr lang="en-US" smtClean="0"/>
-              <a:t>12</a:t>
-            </a:fld>
-            <a:endParaRPr lang="en-US"/>
-          </a:p>
-        </p:txBody>
-      </p:sp>
-    </p:spTree>
-    <p:extLst>
-      <p:ext uri="{BB962C8B-B14F-4D97-AF65-F5344CB8AC3E}">
-        <p14:creationId xmlns:p14="http://schemas.microsoft.com/office/powerpoint/2010/main" val="1197226166"/>
-      </p:ext>
-    </p:extLst>
-  </p:cSld>
-  <p:clrMapOvr>
-    <a:masterClrMapping/>
-  </p:clrMapOvr>
-</p:notes>
-</file>
-
 <file path=ppt/notesSlides/notesSlide2.xml><?xml version="1.0" encoding="utf-8"?>
 <p:notes xmlns:a="http://schemas.openxmlformats.org/drawingml/2006/main" xmlns:r="http://schemas.openxmlformats.org/officeDocument/2006/relationships" xmlns:p="http://schemas.openxmlformats.org/presentationml/2006/main">
   <p:cSld>
@@ -918,11 +832,7 @@
             </a:r>
             <a:r>
               <a:rPr lang="en-US" baseline="0" dirty="0" smtClean="0"/>
-              <a:t> more important people trust them (advice), less important that he is flexible (cohesion</a:t>
-            </a:r>
-            <a:r>
-              <a:rPr lang="en-US" baseline="0" dirty="0" smtClean="0"/>
-              <a:t>)</a:t>
+              <a:t> more important people trust them (advice), less important that he is flexible (cohesion)</a:t>
             </a:r>
           </a:p>
           <a:p>
@@ -5358,305 +5268,6 @@
 </p:sld>
 </file>
 
-<file path=ppt/slides/slide12.xml><?xml version="1.0" encoding="utf-8"?>
-<p:sld xmlns:a="http://schemas.openxmlformats.org/drawingml/2006/main" xmlns:r="http://schemas.openxmlformats.org/officeDocument/2006/relationships" xmlns:p="http://schemas.openxmlformats.org/presentationml/2006/main">
-  <p:cSld>
-    <p:spTree>
-      <p:nvGrpSpPr>
-        <p:cNvPr id="1" name=""/>
-        <p:cNvGrpSpPr/>
-        <p:nvPr/>
-      </p:nvGrpSpPr>
-      <p:grpSpPr>
-        <a:xfrm>
-          <a:off x="0" y="0"/>
-          <a:ext cx="0" cy="0"/>
-          <a:chOff x="0" y="0"/>
-          <a:chExt cx="0" cy="0"/>
-        </a:xfrm>
-      </p:grpSpPr>
-      <p:sp>
-        <p:nvSpPr>
-          <p:cNvPr id="2" name="Title 1"/>
-          <p:cNvSpPr>
-            <a:spLocks noGrp="1"/>
-          </p:cNvSpPr>
-          <p:nvPr>
-            <p:ph type="title"/>
-          </p:nvPr>
-        </p:nvSpPr>
-        <p:spPr/>
-        <p:txBody>
-          <a:bodyPr/>
-          <a:lstStyle/>
-          <a:p>
-            <a:r>
-              <a:rPr lang="en-US" dirty="0" smtClean="0"/>
-              <a:t>Appendix / Old Slides</a:t>
-            </a:r>
-            <a:endParaRPr lang="en-US" dirty="0"/>
-          </a:p>
-        </p:txBody>
-      </p:sp>
-      <p:sp>
-        <p:nvSpPr>
-          <p:cNvPr id="3" name="Content Placeholder 2"/>
-          <p:cNvSpPr>
-            <a:spLocks noGrp="1"/>
-          </p:cNvSpPr>
-          <p:nvPr>
-            <p:ph idx="1"/>
-          </p:nvPr>
-        </p:nvSpPr>
-        <p:spPr/>
-        <p:txBody>
-          <a:bodyPr/>
-          <a:lstStyle/>
-          <a:p>
-            <a:endParaRPr lang="en-US"/>
-          </a:p>
-        </p:txBody>
-      </p:sp>
-      <p:sp>
-        <p:nvSpPr>
-          <p:cNvPr id="4" name="Slide Number Placeholder 3"/>
-          <p:cNvSpPr>
-            <a:spLocks noGrp="1"/>
-          </p:cNvSpPr>
-          <p:nvPr>
-            <p:ph type="sldNum" sz="quarter" idx="12"/>
-          </p:nvPr>
-        </p:nvSpPr>
-        <p:spPr/>
-        <p:txBody>
-          <a:bodyPr/>
-          <a:lstStyle/>
-          <a:p>
-            <a:fld id="{9E487D81-23A7-E743-A35A-AC6109D8EDF6}" type="slidenum">
-              <a:rPr lang="en-US" smtClean="0"/>
-              <a:t>11</a:t>
-            </a:fld>
-            <a:endParaRPr lang="en-US"/>
-          </a:p>
-        </p:txBody>
-      </p:sp>
-    </p:spTree>
-    <p:extLst>
-      <p:ext uri="{BB962C8B-B14F-4D97-AF65-F5344CB8AC3E}">
-        <p14:creationId xmlns:p14="http://schemas.microsoft.com/office/powerpoint/2010/main" val="1677023034"/>
-      </p:ext>
-    </p:extLst>
-  </p:cSld>
-  <p:clrMapOvr>
-    <a:masterClrMapping/>
-  </p:clrMapOvr>
-  <p:timing>
-    <p:tnLst>
-      <p:par>
-        <p:cTn id="1" dur="indefinite" restart="never" nodeType="tmRoot"/>
-      </p:par>
-    </p:tnLst>
-  </p:timing>
-</p:sld>
-</file>
-
-<file path=ppt/slides/slide13.xml><?xml version="1.0" encoding="utf-8"?>
-<p:sld xmlns:a="http://schemas.openxmlformats.org/drawingml/2006/main" xmlns:r="http://schemas.openxmlformats.org/officeDocument/2006/relationships" xmlns:p="http://schemas.openxmlformats.org/presentationml/2006/main">
-  <p:cSld>
-    <p:spTree>
-      <p:nvGrpSpPr>
-        <p:cNvPr id="1" name=""/>
-        <p:cNvGrpSpPr/>
-        <p:nvPr/>
-      </p:nvGrpSpPr>
-      <p:grpSpPr>
-        <a:xfrm>
-          <a:off x="0" y="0"/>
-          <a:ext cx="0" cy="0"/>
-          <a:chOff x="0" y="0"/>
-          <a:chExt cx="0" cy="0"/>
-        </a:xfrm>
-      </p:grpSpPr>
-      <p:sp>
-        <p:nvSpPr>
-          <p:cNvPr id="2" name="Title 1"/>
-          <p:cNvSpPr>
-            <a:spLocks noGrp="1"/>
-          </p:cNvSpPr>
-          <p:nvPr>
-            <p:ph type="title"/>
-          </p:nvPr>
-        </p:nvSpPr>
-        <p:spPr/>
-        <p:txBody>
-          <a:bodyPr/>
-          <a:lstStyle/>
-          <a:p>
-            <a:r>
-              <a:rPr lang="en-US" dirty="0" smtClean="0"/>
-              <a:t>Agenda</a:t>
-            </a:r>
-            <a:endParaRPr lang="en-US" dirty="0"/>
-          </a:p>
-        </p:txBody>
-      </p:sp>
-      <p:sp>
-        <p:nvSpPr>
-          <p:cNvPr id="3" name="Content Placeholder 2"/>
-          <p:cNvSpPr>
-            <a:spLocks noGrp="1"/>
-          </p:cNvSpPr>
-          <p:nvPr>
-            <p:ph idx="1"/>
-          </p:nvPr>
-        </p:nvSpPr>
-        <p:spPr/>
-        <p:txBody>
-          <a:bodyPr>
-            <a:normAutofit lnSpcReduction="10000"/>
-          </a:bodyPr>
-          <a:lstStyle/>
-          <a:p>
-            <a:r>
-              <a:rPr lang="en-US" dirty="0" smtClean="0"/>
-              <a:t>Methodology</a:t>
-            </a:r>
-          </a:p>
-          <a:p>
-            <a:r>
-              <a:rPr lang="en-US" dirty="0" smtClean="0"/>
-              <a:t>Creativity</a:t>
-            </a:r>
-          </a:p>
-          <a:p>
-            <a:pPr lvl="1"/>
-            <a:r>
-              <a:rPr lang="en-US" dirty="0" smtClean="0"/>
-              <a:t>Leader</a:t>
-            </a:r>
-          </a:p>
-          <a:p>
-            <a:pPr lvl="1"/>
-            <a:r>
-              <a:rPr lang="en-US" dirty="0" smtClean="0"/>
-              <a:t>Team</a:t>
-            </a:r>
-          </a:p>
-          <a:p>
-            <a:r>
-              <a:rPr lang="en-US" dirty="0" smtClean="0"/>
-              <a:t>Influence</a:t>
-            </a:r>
-          </a:p>
-          <a:p>
-            <a:pPr lvl="1"/>
-            <a:r>
-              <a:rPr lang="en-US" dirty="0" smtClean="0"/>
-              <a:t>Leader</a:t>
-            </a:r>
-          </a:p>
-          <a:p>
-            <a:pPr lvl="1"/>
-            <a:r>
-              <a:rPr lang="en-US" dirty="0" smtClean="0"/>
-              <a:t>Team</a:t>
-            </a:r>
-          </a:p>
-          <a:p>
-            <a:r>
-              <a:rPr lang="en-US" dirty="0" smtClean="0"/>
-              <a:t>Implementation</a:t>
-            </a:r>
-          </a:p>
-          <a:p>
-            <a:pPr lvl="1"/>
-            <a:r>
-              <a:rPr lang="en-US" dirty="0" smtClean="0"/>
-              <a:t>Leader</a:t>
-            </a:r>
-          </a:p>
-          <a:p>
-            <a:pPr lvl="1"/>
-            <a:r>
-              <a:rPr lang="en-US" dirty="0" smtClean="0"/>
-              <a:t>Team</a:t>
-            </a:r>
-          </a:p>
-        </p:txBody>
-      </p:sp>
-      <p:sp>
-        <p:nvSpPr>
-          <p:cNvPr id="5" name="Slide Number Placeholder 4"/>
-          <p:cNvSpPr>
-            <a:spLocks noGrp="1"/>
-          </p:cNvSpPr>
-          <p:nvPr>
-            <p:ph type="sldNum" sz="quarter" idx="12"/>
-          </p:nvPr>
-        </p:nvSpPr>
-        <p:spPr/>
-        <p:txBody>
-          <a:bodyPr/>
-          <a:lstStyle/>
-          <a:p>
-            <a:fld id="{9E487D81-23A7-E743-A35A-AC6109D8EDF6}" type="slidenum">
-              <a:rPr lang="en-US" smtClean="0"/>
-              <a:t>12</a:t>
-            </a:fld>
-            <a:endParaRPr lang="en-US"/>
-          </a:p>
-        </p:txBody>
-      </p:sp>
-      <p:pic>
-        <p:nvPicPr>
-          <p:cNvPr id="7" name="Picture 6"/>
-          <p:cNvPicPr>
-            <a:picLocks noChangeAspect="1"/>
-          </p:cNvPicPr>
-          <p:nvPr/>
-        </p:nvPicPr>
-        <p:blipFill>
-          <a:blip r:embed="rId3">
-            <a:extLst>
-              <a:ext uri="{28A0092B-C50C-407E-A947-70E740481C1C}">
-                <a14:useLocalDpi xmlns:a14="http://schemas.microsoft.com/office/drawing/2010/main" val="0"/>
-              </a:ext>
-            </a:extLst>
-          </a:blip>
-          <a:stretch>
-            <a:fillRect/>
-          </a:stretch>
-        </p:blipFill>
-        <p:spPr>
-          <a:xfrm>
-            <a:off x="267676" y="6101861"/>
-            <a:ext cx="1857239" cy="518746"/>
-          </a:xfrm>
-          <a:prstGeom prst="rect">
-            <a:avLst/>
-          </a:prstGeom>
-        </p:spPr>
-      </p:pic>
-    </p:spTree>
-    <p:extLst>
-      <p:ext uri="{BB962C8B-B14F-4D97-AF65-F5344CB8AC3E}">
-        <p14:creationId xmlns:p14="http://schemas.microsoft.com/office/powerpoint/2010/main" val="3265563"/>
-      </p:ext>
-    </p:extLst>
-  </p:cSld>
-  <p:clrMapOvr>
-    <a:masterClrMapping/>
-  </p:clrMapOvr>
-  <p:timing>
-    <p:tnLst>
-      <p:par>
-        <p:cTn id="1" dur="indefinite" restart="never" nodeType="tmRoot"/>
-      </p:par>
-    </p:tnLst>
-  </p:timing>
-</p:sld>
-</file>
-
 <file path=ppt/slides/slide2.xml><?xml version="1.0" encoding="utf-8"?>
 <p:sld xmlns:a="http://schemas.openxmlformats.org/drawingml/2006/main" xmlns:r="http://schemas.openxmlformats.org/officeDocument/2006/relationships" xmlns:p="http://schemas.openxmlformats.org/presentationml/2006/main">
   <p:cSld>
@@ -7511,11 +7122,7 @@
           <a:p>
             <a:r>
               <a:rPr lang="en-US" dirty="0" smtClean="0"/>
-              <a:t>Leader </a:t>
-            </a:r>
-            <a:r>
-              <a:rPr lang="en-US" dirty="0" smtClean="0"/>
-              <a:t>Criteria</a:t>
+              <a:t>Leader Criteria</a:t>
             </a:r>
             <a:endParaRPr lang="en-US" dirty="0"/>
           </a:p>
@@ -9357,15 +8964,7 @@
           <a:p>
             <a:r>
               <a:rPr lang="en-US" dirty="0" smtClean="0"/>
-              <a:t>Member</a:t>
-            </a:r>
-            <a:r>
-              <a:rPr lang="en-US" dirty="0" smtClean="0"/>
-              <a:t> </a:t>
-            </a:r>
-            <a:r>
-              <a:rPr lang="en-US" dirty="0" smtClean="0"/>
-              <a:t>Criteria</a:t>
+              <a:t>Member Criteria</a:t>
             </a:r>
             <a:endParaRPr lang="en-US" dirty="0"/>
           </a:p>
@@ -10182,11 +9781,7 @@
                       <a:pPr algn="ctr"/>
                       <a:r>
                         <a:rPr lang="en-US" dirty="0" smtClean="0"/>
-                        <a:t>Exclusive </a:t>
-                      </a:r>
-                      <a:r>
-                        <a:rPr lang="en-US" dirty="0" smtClean="0"/>
-                        <a:t>&gt;</a:t>
+                        <a:t>Exclusive &gt;</a:t>
                       </a:r>
                       <a:r>
                         <a:rPr lang="en-US" baseline="0" dirty="0" smtClean="0"/>
@@ -10194,11 +9789,7 @@
                       </a:r>
                       <a:r>
                         <a:rPr lang="en-US" dirty="0" smtClean="0"/>
-                        <a:t>Expansive </a:t>
-                      </a:r>
-                      <a:r>
-                        <a:rPr lang="en-US" dirty="0" smtClean="0"/>
-                        <a:t>&gt; Tight</a:t>
+                        <a:t>Expansive &gt; Tight</a:t>
                       </a:r>
                     </a:p>
                     <a:p>
@@ -10363,7 +9954,6 @@
                         <a:rPr lang="en-US" dirty="0" smtClean="0"/>
                         <a:t>Importance</a:t>
                       </a:r>
-                      <a:endParaRPr lang="en-US" dirty="0" smtClean="0"/>
                     </a:p>
                     <a:p>
                       <a:pPr marL="0" marR="0" indent="0" algn="ctr" defTabSz="914400" rtl="0" eaLnBrk="1" fontAlgn="auto" latinLnBrk="0" hangingPunct="1">
@@ -10570,11 +10160,7 @@
                       <a:pPr algn="ctr"/>
                       <a:r>
                         <a:rPr lang="en-US" dirty="0" smtClean="0"/>
-                        <a:t>Tight &gt; Exclusive &gt; </a:t>
-                      </a:r>
-                      <a:r>
-                        <a:rPr lang="en-US" dirty="0" smtClean="0"/>
-                        <a:t>Expansive</a:t>
+                        <a:t>Tight &gt; Exclusive &gt; Expansive</a:t>
                       </a:r>
                     </a:p>
                     <a:p>
@@ -11323,15 +10909,7 @@
             </a:pPr>
             <a:r>
               <a:rPr lang="en-US" dirty="0" smtClean="0"/>
-              <a:t>To </a:t>
-            </a:r>
-            <a:r>
-              <a:rPr lang="en-US" dirty="0" smtClean="0"/>
-              <a:t>pick optimal teams,  the following constraints are put into </a:t>
-            </a:r>
-            <a:r>
-              <a:rPr lang="en-US" dirty="0" smtClean="0"/>
-              <a:t>place:</a:t>
+              <a:t>To pick optimal teams,  the following constraints are put into place:</a:t>
             </a:r>
             <a:endParaRPr lang="en-US" dirty="0"/>
           </a:p>
@@ -11513,11 +11091,7 @@
             </a:pPr>
             <a:r>
               <a:rPr lang="en-US" b="1" dirty="0" smtClean="0"/>
-              <a:t>More</a:t>
-            </a:r>
-            <a:r>
-              <a:rPr lang="en-US" b="1" dirty="0" smtClean="0"/>
-              <a:t> cohesion:</a:t>
+              <a:t>More cohesion:</a:t>
             </a:r>
             <a:r>
               <a:rPr lang="en-US" dirty="0" smtClean="0"/>
@@ -11737,7 +11311,7 @@
         </p:blipFill>
         <p:spPr>
           <a:xfrm>
-            <a:off x="4932974" y="3406587"/>
+            <a:off x="4932974" y="3675525"/>
             <a:ext cx="2719512" cy="2352011"/>
           </a:xfrm>
           <a:prstGeom prst="rect">
@@ -11767,7 +11341,7 @@
         </p:blipFill>
         <p:spPr>
           <a:xfrm>
-            <a:off x="7644924" y="3455134"/>
+            <a:off x="7644924" y="3652353"/>
             <a:ext cx="2561575" cy="2294913"/>
           </a:xfrm>
           <a:prstGeom prst="rect">
@@ -11980,6 +11554,374 @@
           </a:prstGeom>
         </p:spPr>
       </p:pic>
+      <p:sp>
+        <p:nvSpPr>
+          <p:cNvPr id="7" name="Rectangle 6"/>
+          <p:cNvSpPr/>
+          <p:nvPr/>
+        </p:nvSpPr>
+        <p:spPr>
+          <a:xfrm>
+            <a:off x="6831106" y="1960161"/>
+            <a:ext cx="609600" cy="137579"/>
+          </a:xfrm>
+          <a:prstGeom prst="rect">
+            <a:avLst/>
+          </a:prstGeom>
+          <a:noFill/>
+          <a:ln w="19050">
+            <a:solidFill>
+              <a:srgbClr val="2DA5DB"/>
+            </a:solidFill>
+          </a:ln>
+        </p:spPr>
+        <p:style>
+          <a:lnRef idx="2">
+            <a:schemeClr val="accent1">
+              <a:shade val="50000"/>
+            </a:schemeClr>
+          </a:lnRef>
+          <a:fillRef idx="1">
+            <a:schemeClr val="accent1"/>
+          </a:fillRef>
+          <a:effectRef idx="0">
+            <a:schemeClr val="accent1"/>
+          </a:effectRef>
+          <a:fontRef idx="minor">
+            <a:schemeClr val="lt1"/>
+          </a:fontRef>
+        </p:style>
+        <p:txBody>
+          <a:bodyPr rtlCol="0" anchor="ctr"/>
+          <a:lstStyle/>
+          <a:p>
+            <a:pPr algn="ctr"/>
+            <a:endParaRPr lang="en-US"/>
+          </a:p>
+        </p:txBody>
+      </p:sp>
+      <p:sp>
+        <p:nvSpPr>
+          <p:cNvPr id="18" name="Rectangle 17"/>
+          <p:cNvSpPr/>
+          <p:nvPr/>
+        </p:nvSpPr>
+        <p:spPr>
+          <a:xfrm>
+            <a:off x="5104589" y="2954953"/>
+            <a:ext cx="609600" cy="137579"/>
+          </a:xfrm>
+          <a:prstGeom prst="rect">
+            <a:avLst/>
+          </a:prstGeom>
+          <a:noFill/>
+          <a:ln w="19050">
+            <a:solidFill>
+              <a:srgbClr val="2DA5DB"/>
+            </a:solidFill>
+          </a:ln>
+        </p:spPr>
+        <p:style>
+          <a:lnRef idx="2">
+            <a:schemeClr val="accent1">
+              <a:shade val="50000"/>
+            </a:schemeClr>
+          </a:lnRef>
+          <a:fillRef idx="1">
+            <a:schemeClr val="accent1"/>
+          </a:fillRef>
+          <a:effectRef idx="0">
+            <a:schemeClr val="accent1"/>
+          </a:effectRef>
+          <a:fontRef idx="minor">
+            <a:schemeClr val="lt1"/>
+          </a:fontRef>
+        </p:style>
+        <p:txBody>
+          <a:bodyPr rtlCol="0" anchor="ctr"/>
+          <a:lstStyle/>
+          <a:p>
+            <a:pPr algn="ctr"/>
+            <a:endParaRPr lang="en-US"/>
+          </a:p>
+        </p:txBody>
+      </p:sp>
+      <p:sp>
+        <p:nvSpPr>
+          <p:cNvPr id="19" name="Rectangle 18"/>
+          <p:cNvSpPr/>
+          <p:nvPr/>
+        </p:nvSpPr>
+        <p:spPr>
+          <a:xfrm>
+            <a:off x="9495845" y="1978090"/>
+            <a:ext cx="609600" cy="137579"/>
+          </a:xfrm>
+          <a:prstGeom prst="rect">
+            <a:avLst/>
+          </a:prstGeom>
+          <a:noFill/>
+          <a:ln w="19050">
+            <a:solidFill>
+              <a:srgbClr val="2DA5DB"/>
+            </a:solidFill>
+          </a:ln>
+        </p:spPr>
+        <p:style>
+          <a:lnRef idx="2">
+            <a:schemeClr val="accent1">
+              <a:shade val="50000"/>
+            </a:schemeClr>
+          </a:lnRef>
+          <a:fillRef idx="1">
+            <a:schemeClr val="accent1"/>
+          </a:fillRef>
+          <a:effectRef idx="0">
+            <a:schemeClr val="accent1"/>
+          </a:effectRef>
+          <a:fontRef idx="minor">
+            <a:schemeClr val="lt1"/>
+          </a:fontRef>
+        </p:style>
+        <p:txBody>
+          <a:bodyPr rtlCol="0" anchor="ctr"/>
+          <a:lstStyle/>
+          <a:p>
+            <a:pPr algn="ctr"/>
+            <a:endParaRPr lang="en-US"/>
+          </a:p>
+        </p:txBody>
+      </p:sp>
+      <p:sp>
+        <p:nvSpPr>
+          <p:cNvPr id="20" name="Rectangle 19"/>
+          <p:cNvSpPr/>
+          <p:nvPr/>
+        </p:nvSpPr>
+        <p:spPr>
+          <a:xfrm>
+            <a:off x="7745897" y="2972882"/>
+            <a:ext cx="609600" cy="137579"/>
+          </a:xfrm>
+          <a:prstGeom prst="rect">
+            <a:avLst/>
+          </a:prstGeom>
+          <a:noFill/>
+          <a:ln w="19050">
+            <a:solidFill>
+              <a:srgbClr val="2DA5DB"/>
+            </a:solidFill>
+          </a:ln>
+        </p:spPr>
+        <p:style>
+          <a:lnRef idx="2">
+            <a:schemeClr val="accent1">
+              <a:shade val="50000"/>
+            </a:schemeClr>
+          </a:lnRef>
+          <a:fillRef idx="1">
+            <a:schemeClr val="accent1"/>
+          </a:fillRef>
+          <a:effectRef idx="0">
+            <a:schemeClr val="accent1"/>
+          </a:effectRef>
+          <a:fontRef idx="minor">
+            <a:schemeClr val="lt1"/>
+          </a:fontRef>
+        </p:style>
+        <p:txBody>
+          <a:bodyPr rtlCol="0" anchor="ctr"/>
+          <a:lstStyle/>
+          <a:p>
+            <a:pPr algn="ctr"/>
+            <a:endParaRPr lang="en-US"/>
+          </a:p>
+        </p:txBody>
+      </p:sp>
+      <p:sp>
+        <p:nvSpPr>
+          <p:cNvPr id="21" name="Rectangle 20"/>
+          <p:cNvSpPr/>
+          <p:nvPr/>
+        </p:nvSpPr>
+        <p:spPr>
+          <a:xfrm>
+            <a:off x="9495845" y="4221649"/>
+            <a:ext cx="609600" cy="137579"/>
+          </a:xfrm>
+          <a:prstGeom prst="rect">
+            <a:avLst/>
+          </a:prstGeom>
+          <a:noFill/>
+          <a:ln w="19050">
+            <a:solidFill>
+              <a:srgbClr val="2DA5DB"/>
+            </a:solidFill>
+          </a:ln>
+        </p:spPr>
+        <p:style>
+          <a:lnRef idx="2">
+            <a:schemeClr val="accent1">
+              <a:shade val="50000"/>
+            </a:schemeClr>
+          </a:lnRef>
+          <a:fillRef idx="1">
+            <a:schemeClr val="accent1"/>
+          </a:fillRef>
+          <a:effectRef idx="0">
+            <a:schemeClr val="accent1"/>
+          </a:effectRef>
+          <a:fontRef idx="minor">
+            <a:schemeClr val="lt1"/>
+          </a:fontRef>
+        </p:style>
+        <p:txBody>
+          <a:bodyPr rtlCol="0" anchor="ctr"/>
+          <a:lstStyle/>
+          <a:p>
+            <a:pPr algn="ctr"/>
+            <a:endParaRPr lang="en-US"/>
+          </a:p>
+        </p:txBody>
+      </p:sp>
+      <p:sp>
+        <p:nvSpPr>
+          <p:cNvPr id="22" name="Rectangle 21"/>
+          <p:cNvSpPr/>
+          <p:nvPr/>
+        </p:nvSpPr>
+        <p:spPr>
+          <a:xfrm>
+            <a:off x="7745897" y="5195081"/>
+            <a:ext cx="609600" cy="137579"/>
+          </a:xfrm>
+          <a:prstGeom prst="rect">
+            <a:avLst/>
+          </a:prstGeom>
+          <a:noFill/>
+          <a:ln w="19050">
+            <a:solidFill>
+              <a:srgbClr val="2DA5DB"/>
+            </a:solidFill>
+          </a:ln>
+        </p:spPr>
+        <p:style>
+          <a:lnRef idx="2">
+            <a:schemeClr val="accent1">
+              <a:shade val="50000"/>
+            </a:schemeClr>
+          </a:lnRef>
+          <a:fillRef idx="1">
+            <a:schemeClr val="accent1"/>
+          </a:fillRef>
+          <a:effectRef idx="0">
+            <a:schemeClr val="accent1"/>
+          </a:effectRef>
+          <a:fontRef idx="minor">
+            <a:schemeClr val="lt1"/>
+          </a:fontRef>
+        </p:style>
+        <p:txBody>
+          <a:bodyPr rtlCol="0" anchor="ctr"/>
+          <a:lstStyle/>
+          <a:p>
+            <a:pPr algn="ctr"/>
+            <a:endParaRPr lang="en-US"/>
+          </a:p>
+        </p:txBody>
+      </p:sp>
+      <p:sp>
+        <p:nvSpPr>
+          <p:cNvPr id="23" name="Rectangle 22"/>
+          <p:cNvSpPr/>
+          <p:nvPr/>
+        </p:nvSpPr>
+        <p:spPr>
+          <a:xfrm>
+            <a:off x="5122519" y="5248866"/>
+            <a:ext cx="609600" cy="137579"/>
+          </a:xfrm>
+          <a:prstGeom prst="rect">
+            <a:avLst/>
+          </a:prstGeom>
+          <a:noFill/>
+          <a:ln w="19050">
+            <a:solidFill>
+              <a:srgbClr val="2DA5DB"/>
+            </a:solidFill>
+          </a:ln>
+        </p:spPr>
+        <p:style>
+          <a:lnRef idx="2">
+            <a:schemeClr val="accent1">
+              <a:shade val="50000"/>
+            </a:schemeClr>
+          </a:lnRef>
+          <a:fillRef idx="1">
+            <a:schemeClr val="accent1"/>
+          </a:fillRef>
+          <a:effectRef idx="0">
+            <a:schemeClr val="accent1"/>
+          </a:effectRef>
+          <a:fontRef idx="minor">
+            <a:schemeClr val="lt1"/>
+          </a:fontRef>
+        </p:style>
+        <p:txBody>
+          <a:bodyPr rtlCol="0" anchor="ctr"/>
+          <a:lstStyle/>
+          <a:p>
+            <a:pPr algn="ctr"/>
+            <a:endParaRPr lang="en-US"/>
+          </a:p>
+        </p:txBody>
+      </p:sp>
+      <p:sp>
+        <p:nvSpPr>
+          <p:cNvPr id="24" name="Rectangle 23"/>
+          <p:cNvSpPr/>
+          <p:nvPr/>
+        </p:nvSpPr>
+        <p:spPr>
+          <a:xfrm>
+            <a:off x="6836568" y="4264155"/>
+            <a:ext cx="609600" cy="137579"/>
+          </a:xfrm>
+          <a:prstGeom prst="rect">
+            <a:avLst/>
+          </a:prstGeom>
+          <a:noFill/>
+          <a:ln w="19050">
+            <a:solidFill>
+              <a:srgbClr val="2DA5DB"/>
+            </a:solidFill>
+          </a:ln>
+        </p:spPr>
+        <p:style>
+          <a:lnRef idx="2">
+            <a:schemeClr val="accent1">
+              <a:shade val="50000"/>
+            </a:schemeClr>
+          </a:lnRef>
+          <a:fillRef idx="1">
+            <a:schemeClr val="accent1"/>
+          </a:fillRef>
+          <a:effectRef idx="0">
+            <a:schemeClr val="accent1"/>
+          </a:effectRef>
+          <a:fontRef idx="minor">
+            <a:schemeClr val="lt1"/>
+          </a:fontRef>
+        </p:style>
+        <p:txBody>
+          <a:bodyPr rtlCol="0" anchor="ctr"/>
+          <a:lstStyle/>
+          <a:p>
+            <a:pPr algn="ctr"/>
+            <a:endParaRPr lang="en-US"/>
+          </a:p>
+        </p:txBody>
+      </p:sp>
     </p:spTree>
     <p:extLst>
       <p:ext uri="{BB962C8B-B14F-4D97-AF65-F5344CB8AC3E}">
@@ -12422,6 +12364,374 @@
           </a:p>
         </p:txBody>
       </p:sp>
+      <p:sp>
+        <p:nvSpPr>
+          <p:cNvPr id="18" name="Rectangle 17"/>
+          <p:cNvSpPr/>
+          <p:nvPr/>
+        </p:nvSpPr>
+        <p:spPr>
+          <a:xfrm>
+            <a:off x="5888000" y="3449454"/>
+            <a:ext cx="609600" cy="137579"/>
+          </a:xfrm>
+          <a:prstGeom prst="rect">
+            <a:avLst/>
+          </a:prstGeom>
+          <a:noFill/>
+          <a:ln w="19050">
+            <a:solidFill>
+              <a:srgbClr val="2DA5DB"/>
+            </a:solidFill>
+          </a:ln>
+        </p:spPr>
+        <p:style>
+          <a:lnRef idx="2">
+            <a:schemeClr val="accent1">
+              <a:shade val="50000"/>
+            </a:schemeClr>
+          </a:lnRef>
+          <a:fillRef idx="1">
+            <a:schemeClr val="accent1"/>
+          </a:fillRef>
+          <a:effectRef idx="0">
+            <a:schemeClr val="accent1"/>
+          </a:effectRef>
+          <a:fontRef idx="minor">
+            <a:schemeClr val="lt1"/>
+          </a:fontRef>
+        </p:style>
+        <p:txBody>
+          <a:bodyPr rtlCol="0" anchor="ctr"/>
+          <a:lstStyle/>
+          <a:p>
+            <a:pPr algn="ctr"/>
+            <a:endParaRPr lang="en-US"/>
+          </a:p>
+        </p:txBody>
+      </p:sp>
+      <p:sp>
+        <p:nvSpPr>
+          <p:cNvPr id="19" name="Rectangle 18"/>
+          <p:cNvSpPr/>
+          <p:nvPr/>
+        </p:nvSpPr>
+        <p:spPr>
+          <a:xfrm>
+            <a:off x="5913755" y="1456666"/>
+            <a:ext cx="609600" cy="137579"/>
+          </a:xfrm>
+          <a:prstGeom prst="rect">
+            <a:avLst/>
+          </a:prstGeom>
+          <a:noFill/>
+          <a:ln w="19050">
+            <a:solidFill>
+              <a:srgbClr val="2DA5DB"/>
+            </a:solidFill>
+          </a:ln>
+        </p:spPr>
+        <p:style>
+          <a:lnRef idx="2">
+            <a:schemeClr val="accent1">
+              <a:shade val="50000"/>
+            </a:schemeClr>
+          </a:lnRef>
+          <a:fillRef idx="1">
+            <a:schemeClr val="accent1"/>
+          </a:fillRef>
+          <a:effectRef idx="0">
+            <a:schemeClr val="accent1"/>
+          </a:effectRef>
+          <a:fontRef idx="minor">
+            <a:schemeClr val="lt1"/>
+          </a:fontRef>
+        </p:style>
+        <p:txBody>
+          <a:bodyPr rtlCol="0" anchor="ctr"/>
+          <a:lstStyle/>
+          <a:p>
+            <a:pPr algn="ctr"/>
+            <a:endParaRPr lang="en-US"/>
+          </a:p>
+        </p:txBody>
+      </p:sp>
+      <p:sp>
+        <p:nvSpPr>
+          <p:cNvPr id="21" name="Rectangle 20"/>
+          <p:cNvSpPr/>
+          <p:nvPr/>
+        </p:nvSpPr>
+        <p:spPr>
+          <a:xfrm>
+            <a:off x="8478802" y="3404631"/>
+            <a:ext cx="609600" cy="137579"/>
+          </a:xfrm>
+          <a:prstGeom prst="rect">
+            <a:avLst/>
+          </a:prstGeom>
+          <a:noFill/>
+          <a:ln w="19050">
+            <a:solidFill>
+              <a:srgbClr val="2DA5DB"/>
+            </a:solidFill>
+          </a:ln>
+        </p:spPr>
+        <p:style>
+          <a:lnRef idx="2">
+            <a:schemeClr val="accent1">
+              <a:shade val="50000"/>
+            </a:schemeClr>
+          </a:lnRef>
+          <a:fillRef idx="1">
+            <a:schemeClr val="accent1"/>
+          </a:fillRef>
+          <a:effectRef idx="0">
+            <a:schemeClr val="accent1"/>
+          </a:effectRef>
+          <a:fontRef idx="minor">
+            <a:schemeClr val="lt1"/>
+          </a:fontRef>
+        </p:style>
+        <p:txBody>
+          <a:bodyPr rtlCol="0" anchor="ctr"/>
+          <a:lstStyle/>
+          <a:p>
+            <a:pPr algn="ctr"/>
+            <a:endParaRPr lang="en-US"/>
+          </a:p>
+        </p:txBody>
+      </p:sp>
+      <p:sp>
+        <p:nvSpPr>
+          <p:cNvPr id="22" name="Rectangle 21"/>
+          <p:cNvSpPr/>
+          <p:nvPr/>
+        </p:nvSpPr>
+        <p:spPr>
+          <a:xfrm>
+            <a:off x="8487698" y="1496391"/>
+            <a:ext cx="609600" cy="137579"/>
+          </a:xfrm>
+          <a:prstGeom prst="rect">
+            <a:avLst/>
+          </a:prstGeom>
+          <a:noFill/>
+          <a:ln w="19050">
+            <a:solidFill>
+              <a:srgbClr val="2DA5DB"/>
+            </a:solidFill>
+          </a:ln>
+        </p:spPr>
+        <p:style>
+          <a:lnRef idx="2">
+            <a:schemeClr val="accent1">
+              <a:shade val="50000"/>
+            </a:schemeClr>
+          </a:lnRef>
+          <a:fillRef idx="1">
+            <a:schemeClr val="accent1"/>
+          </a:fillRef>
+          <a:effectRef idx="0">
+            <a:schemeClr val="accent1"/>
+          </a:effectRef>
+          <a:fontRef idx="minor">
+            <a:schemeClr val="lt1"/>
+          </a:fontRef>
+        </p:style>
+        <p:txBody>
+          <a:bodyPr rtlCol="0" anchor="ctr"/>
+          <a:lstStyle/>
+          <a:p>
+            <a:pPr algn="ctr"/>
+            <a:endParaRPr lang="en-US"/>
+          </a:p>
+        </p:txBody>
+      </p:sp>
+      <p:sp>
+        <p:nvSpPr>
+          <p:cNvPr id="23" name="Rectangle 22"/>
+          <p:cNvSpPr/>
+          <p:nvPr/>
+        </p:nvSpPr>
+        <p:spPr>
+          <a:xfrm>
+            <a:off x="5896968" y="3763217"/>
+            <a:ext cx="609600" cy="137579"/>
+          </a:xfrm>
+          <a:prstGeom prst="rect">
+            <a:avLst/>
+          </a:prstGeom>
+          <a:noFill/>
+          <a:ln w="19050">
+            <a:solidFill>
+              <a:srgbClr val="2DA5DB"/>
+            </a:solidFill>
+          </a:ln>
+        </p:spPr>
+        <p:style>
+          <a:lnRef idx="2">
+            <a:schemeClr val="accent1">
+              <a:shade val="50000"/>
+            </a:schemeClr>
+          </a:lnRef>
+          <a:fillRef idx="1">
+            <a:schemeClr val="accent1"/>
+          </a:fillRef>
+          <a:effectRef idx="0">
+            <a:schemeClr val="accent1"/>
+          </a:effectRef>
+          <a:fontRef idx="minor">
+            <a:schemeClr val="lt1"/>
+          </a:fontRef>
+        </p:style>
+        <p:txBody>
+          <a:bodyPr rtlCol="0" anchor="ctr"/>
+          <a:lstStyle/>
+          <a:p>
+            <a:pPr algn="ctr"/>
+            <a:endParaRPr lang="en-US"/>
+          </a:p>
+        </p:txBody>
+      </p:sp>
+      <p:sp>
+        <p:nvSpPr>
+          <p:cNvPr id="24" name="Rectangle 23"/>
+          <p:cNvSpPr/>
+          <p:nvPr/>
+        </p:nvSpPr>
+        <p:spPr>
+          <a:xfrm>
+            <a:off x="5895826" y="5710423"/>
+            <a:ext cx="609600" cy="137579"/>
+          </a:xfrm>
+          <a:prstGeom prst="rect">
+            <a:avLst/>
+          </a:prstGeom>
+          <a:noFill/>
+          <a:ln w="19050">
+            <a:solidFill>
+              <a:srgbClr val="2DA5DB"/>
+            </a:solidFill>
+          </a:ln>
+        </p:spPr>
+        <p:style>
+          <a:lnRef idx="2">
+            <a:schemeClr val="accent1">
+              <a:shade val="50000"/>
+            </a:schemeClr>
+          </a:lnRef>
+          <a:fillRef idx="1">
+            <a:schemeClr val="accent1"/>
+          </a:fillRef>
+          <a:effectRef idx="0">
+            <a:schemeClr val="accent1"/>
+          </a:effectRef>
+          <a:fontRef idx="minor">
+            <a:schemeClr val="lt1"/>
+          </a:fontRef>
+        </p:style>
+        <p:txBody>
+          <a:bodyPr rtlCol="0" anchor="ctr"/>
+          <a:lstStyle/>
+          <a:p>
+            <a:pPr algn="ctr"/>
+            <a:endParaRPr lang="en-US"/>
+          </a:p>
+        </p:txBody>
+      </p:sp>
+      <p:sp>
+        <p:nvSpPr>
+          <p:cNvPr id="25" name="Rectangle 24"/>
+          <p:cNvSpPr/>
+          <p:nvPr/>
+        </p:nvSpPr>
+        <p:spPr>
+          <a:xfrm>
+            <a:off x="8487698" y="3737472"/>
+            <a:ext cx="609600" cy="137579"/>
+          </a:xfrm>
+          <a:prstGeom prst="rect">
+            <a:avLst/>
+          </a:prstGeom>
+          <a:noFill/>
+          <a:ln w="19050">
+            <a:solidFill>
+              <a:srgbClr val="2DA5DB"/>
+            </a:solidFill>
+          </a:ln>
+        </p:spPr>
+        <p:style>
+          <a:lnRef idx="2">
+            <a:schemeClr val="accent1">
+              <a:shade val="50000"/>
+            </a:schemeClr>
+          </a:lnRef>
+          <a:fillRef idx="1">
+            <a:schemeClr val="accent1"/>
+          </a:fillRef>
+          <a:effectRef idx="0">
+            <a:schemeClr val="accent1"/>
+          </a:effectRef>
+          <a:fontRef idx="minor">
+            <a:schemeClr val="lt1"/>
+          </a:fontRef>
+        </p:style>
+        <p:txBody>
+          <a:bodyPr rtlCol="0" anchor="ctr"/>
+          <a:lstStyle/>
+          <a:p>
+            <a:pPr algn="ctr"/>
+            <a:endParaRPr lang="en-US"/>
+          </a:p>
+        </p:txBody>
+      </p:sp>
+      <p:sp>
+        <p:nvSpPr>
+          <p:cNvPr id="26" name="Rectangle 25"/>
+          <p:cNvSpPr/>
+          <p:nvPr/>
+        </p:nvSpPr>
+        <p:spPr>
+          <a:xfrm>
+            <a:off x="8487698" y="5746468"/>
+            <a:ext cx="609600" cy="137579"/>
+          </a:xfrm>
+          <a:prstGeom prst="rect">
+            <a:avLst/>
+          </a:prstGeom>
+          <a:noFill/>
+          <a:ln w="19050">
+            <a:solidFill>
+              <a:srgbClr val="2DA5DB"/>
+            </a:solidFill>
+          </a:ln>
+        </p:spPr>
+        <p:style>
+          <a:lnRef idx="2">
+            <a:schemeClr val="accent1">
+              <a:shade val="50000"/>
+            </a:schemeClr>
+          </a:lnRef>
+          <a:fillRef idx="1">
+            <a:schemeClr val="accent1"/>
+          </a:fillRef>
+          <a:effectRef idx="0">
+            <a:schemeClr val="accent1"/>
+          </a:effectRef>
+          <a:fontRef idx="minor">
+            <a:schemeClr val="lt1"/>
+          </a:fontRef>
+        </p:style>
+        <p:txBody>
+          <a:bodyPr rtlCol="0" anchor="ctr"/>
+          <a:lstStyle/>
+          <a:p>
+            <a:pPr algn="ctr"/>
+            <a:endParaRPr lang="en-US"/>
+          </a:p>
+        </p:txBody>
+      </p:sp>
     </p:spTree>
     <p:extLst>
       <p:ext uri="{BB962C8B-B14F-4D97-AF65-F5344CB8AC3E}">
@@ -12861,6 +13171,374 @@
               <a:t>id42</a:t>
             </a:r>
             <a:endParaRPr lang="en-US" dirty="0"/>
+          </a:p>
+        </p:txBody>
+      </p:sp>
+      <p:sp>
+        <p:nvSpPr>
+          <p:cNvPr id="16" name="Rectangle 15"/>
+          <p:cNvSpPr/>
+          <p:nvPr/>
+        </p:nvSpPr>
+        <p:spPr>
+          <a:xfrm>
+            <a:off x="6599848" y="3051080"/>
+            <a:ext cx="609600" cy="137579"/>
+          </a:xfrm>
+          <a:prstGeom prst="rect">
+            <a:avLst/>
+          </a:prstGeom>
+          <a:noFill/>
+          <a:ln w="19050">
+            <a:solidFill>
+              <a:srgbClr val="2DA5DB"/>
+            </a:solidFill>
+          </a:ln>
+        </p:spPr>
+        <p:style>
+          <a:lnRef idx="2">
+            <a:schemeClr val="accent1">
+              <a:shade val="50000"/>
+            </a:schemeClr>
+          </a:lnRef>
+          <a:fillRef idx="1">
+            <a:schemeClr val="accent1"/>
+          </a:fillRef>
+          <a:effectRef idx="0">
+            <a:schemeClr val="accent1"/>
+          </a:effectRef>
+          <a:fontRef idx="minor">
+            <a:schemeClr val="lt1"/>
+          </a:fontRef>
+        </p:style>
+        <p:txBody>
+          <a:bodyPr rtlCol="0" anchor="ctr"/>
+          <a:lstStyle/>
+          <a:p>
+            <a:pPr algn="ctr"/>
+            <a:endParaRPr lang="en-US"/>
+          </a:p>
+        </p:txBody>
+      </p:sp>
+      <p:sp>
+        <p:nvSpPr>
+          <p:cNvPr id="17" name="Rectangle 16"/>
+          <p:cNvSpPr/>
+          <p:nvPr/>
+        </p:nvSpPr>
+        <p:spPr>
+          <a:xfrm>
+            <a:off x="4880396" y="2077757"/>
+            <a:ext cx="732288" cy="161856"/>
+          </a:xfrm>
+          <a:prstGeom prst="rect">
+            <a:avLst/>
+          </a:prstGeom>
+          <a:noFill/>
+          <a:ln w="19050">
+            <a:solidFill>
+              <a:srgbClr val="2DA5DB"/>
+            </a:solidFill>
+          </a:ln>
+        </p:spPr>
+        <p:style>
+          <a:lnRef idx="2">
+            <a:schemeClr val="accent1">
+              <a:shade val="50000"/>
+            </a:schemeClr>
+          </a:lnRef>
+          <a:fillRef idx="1">
+            <a:schemeClr val="accent1"/>
+          </a:fillRef>
+          <a:effectRef idx="0">
+            <a:schemeClr val="accent1"/>
+          </a:effectRef>
+          <a:fontRef idx="minor">
+            <a:schemeClr val="lt1"/>
+          </a:fontRef>
+        </p:style>
+        <p:txBody>
+          <a:bodyPr rtlCol="0" anchor="ctr"/>
+          <a:lstStyle/>
+          <a:p>
+            <a:pPr algn="ctr"/>
+            <a:endParaRPr lang="en-US"/>
+          </a:p>
+        </p:txBody>
+      </p:sp>
+      <p:sp>
+        <p:nvSpPr>
+          <p:cNvPr id="18" name="Rectangle 17"/>
+          <p:cNvSpPr/>
+          <p:nvPr/>
+        </p:nvSpPr>
+        <p:spPr>
+          <a:xfrm>
+            <a:off x="4903575" y="4230133"/>
+            <a:ext cx="732288" cy="161856"/>
+          </a:xfrm>
+          <a:prstGeom prst="rect">
+            <a:avLst/>
+          </a:prstGeom>
+          <a:noFill/>
+          <a:ln w="19050">
+            <a:solidFill>
+              <a:srgbClr val="2DA5DB"/>
+            </a:solidFill>
+          </a:ln>
+        </p:spPr>
+        <p:style>
+          <a:lnRef idx="2">
+            <a:schemeClr val="accent1">
+              <a:shade val="50000"/>
+            </a:schemeClr>
+          </a:lnRef>
+          <a:fillRef idx="1">
+            <a:schemeClr val="accent1"/>
+          </a:fillRef>
+          <a:effectRef idx="0">
+            <a:schemeClr val="accent1"/>
+          </a:effectRef>
+          <a:fontRef idx="minor">
+            <a:schemeClr val="lt1"/>
+          </a:fontRef>
+        </p:style>
+        <p:txBody>
+          <a:bodyPr rtlCol="0" anchor="ctr"/>
+          <a:lstStyle/>
+          <a:p>
+            <a:pPr algn="ctr"/>
+            <a:endParaRPr lang="en-US"/>
+          </a:p>
+        </p:txBody>
+      </p:sp>
+      <p:sp>
+        <p:nvSpPr>
+          <p:cNvPr id="19" name="Rectangle 18"/>
+          <p:cNvSpPr/>
+          <p:nvPr/>
+        </p:nvSpPr>
+        <p:spPr>
+          <a:xfrm>
+            <a:off x="6599848" y="5179179"/>
+            <a:ext cx="609600" cy="137579"/>
+          </a:xfrm>
+          <a:prstGeom prst="rect">
+            <a:avLst/>
+          </a:prstGeom>
+          <a:noFill/>
+          <a:ln w="19050">
+            <a:solidFill>
+              <a:srgbClr val="2DA5DB"/>
+            </a:solidFill>
+          </a:ln>
+        </p:spPr>
+        <p:style>
+          <a:lnRef idx="2">
+            <a:schemeClr val="accent1">
+              <a:shade val="50000"/>
+            </a:schemeClr>
+          </a:lnRef>
+          <a:fillRef idx="1">
+            <a:schemeClr val="accent1"/>
+          </a:fillRef>
+          <a:effectRef idx="0">
+            <a:schemeClr val="accent1"/>
+          </a:effectRef>
+          <a:fontRef idx="minor">
+            <a:schemeClr val="lt1"/>
+          </a:fontRef>
+        </p:style>
+        <p:txBody>
+          <a:bodyPr rtlCol="0" anchor="ctr"/>
+          <a:lstStyle/>
+          <a:p>
+            <a:pPr algn="ctr"/>
+            <a:endParaRPr lang="en-US"/>
+          </a:p>
+        </p:txBody>
+      </p:sp>
+      <p:sp>
+        <p:nvSpPr>
+          <p:cNvPr id="20" name="Rectangle 19"/>
+          <p:cNvSpPr/>
+          <p:nvPr/>
+        </p:nvSpPr>
+        <p:spPr>
+          <a:xfrm>
+            <a:off x="9273774" y="5265897"/>
+            <a:ext cx="609600" cy="137579"/>
+          </a:xfrm>
+          <a:prstGeom prst="rect">
+            <a:avLst/>
+          </a:prstGeom>
+          <a:noFill/>
+          <a:ln w="19050">
+            <a:solidFill>
+              <a:srgbClr val="2DA5DB"/>
+            </a:solidFill>
+          </a:ln>
+        </p:spPr>
+        <p:style>
+          <a:lnRef idx="2">
+            <a:schemeClr val="accent1">
+              <a:shade val="50000"/>
+            </a:schemeClr>
+          </a:lnRef>
+          <a:fillRef idx="1">
+            <a:schemeClr val="accent1"/>
+          </a:fillRef>
+          <a:effectRef idx="0">
+            <a:schemeClr val="accent1"/>
+          </a:effectRef>
+          <a:fontRef idx="minor">
+            <a:schemeClr val="lt1"/>
+          </a:fontRef>
+        </p:style>
+        <p:txBody>
+          <a:bodyPr rtlCol="0" anchor="ctr"/>
+          <a:lstStyle/>
+          <a:p>
+            <a:pPr algn="ctr"/>
+            <a:endParaRPr lang="en-US"/>
+          </a:p>
+        </p:txBody>
+      </p:sp>
+      <p:sp>
+        <p:nvSpPr>
+          <p:cNvPr id="22" name="Rectangle 21"/>
+          <p:cNvSpPr/>
+          <p:nvPr/>
+        </p:nvSpPr>
+        <p:spPr>
+          <a:xfrm>
+            <a:off x="7637695" y="4311061"/>
+            <a:ext cx="732288" cy="161856"/>
+          </a:xfrm>
+          <a:prstGeom prst="rect">
+            <a:avLst/>
+          </a:prstGeom>
+          <a:noFill/>
+          <a:ln w="19050">
+            <a:solidFill>
+              <a:srgbClr val="2DA5DB"/>
+            </a:solidFill>
+          </a:ln>
+        </p:spPr>
+        <p:style>
+          <a:lnRef idx="2">
+            <a:schemeClr val="accent1">
+              <a:shade val="50000"/>
+            </a:schemeClr>
+          </a:lnRef>
+          <a:fillRef idx="1">
+            <a:schemeClr val="accent1"/>
+          </a:fillRef>
+          <a:effectRef idx="0">
+            <a:schemeClr val="accent1"/>
+          </a:effectRef>
+          <a:fontRef idx="minor">
+            <a:schemeClr val="lt1"/>
+          </a:fontRef>
+        </p:style>
+        <p:txBody>
+          <a:bodyPr rtlCol="0" anchor="ctr"/>
+          <a:lstStyle/>
+          <a:p>
+            <a:pPr algn="ctr"/>
+            <a:endParaRPr lang="en-US"/>
+          </a:p>
+        </p:txBody>
+      </p:sp>
+      <p:sp>
+        <p:nvSpPr>
+          <p:cNvPr id="23" name="Rectangle 22"/>
+          <p:cNvSpPr/>
+          <p:nvPr/>
+        </p:nvSpPr>
+        <p:spPr>
+          <a:xfrm>
+            <a:off x="7593034" y="2102180"/>
+            <a:ext cx="732288" cy="161856"/>
+          </a:xfrm>
+          <a:prstGeom prst="rect">
+            <a:avLst/>
+          </a:prstGeom>
+          <a:noFill/>
+          <a:ln w="19050">
+            <a:solidFill>
+              <a:srgbClr val="2DA5DB"/>
+            </a:solidFill>
+          </a:ln>
+        </p:spPr>
+        <p:style>
+          <a:lnRef idx="2">
+            <a:schemeClr val="accent1">
+              <a:shade val="50000"/>
+            </a:schemeClr>
+          </a:lnRef>
+          <a:fillRef idx="1">
+            <a:schemeClr val="accent1"/>
+          </a:fillRef>
+          <a:effectRef idx="0">
+            <a:schemeClr val="accent1"/>
+          </a:effectRef>
+          <a:fontRef idx="minor">
+            <a:schemeClr val="lt1"/>
+          </a:fontRef>
+        </p:style>
+        <p:txBody>
+          <a:bodyPr rtlCol="0" anchor="ctr"/>
+          <a:lstStyle/>
+          <a:p>
+            <a:pPr algn="ctr"/>
+            <a:endParaRPr lang="en-US"/>
+          </a:p>
+        </p:txBody>
+      </p:sp>
+      <p:sp>
+        <p:nvSpPr>
+          <p:cNvPr id="24" name="Rectangle 23"/>
+          <p:cNvSpPr/>
+          <p:nvPr/>
+        </p:nvSpPr>
+        <p:spPr>
+          <a:xfrm>
+            <a:off x="9358011" y="3085974"/>
+            <a:ext cx="609600" cy="137579"/>
+          </a:xfrm>
+          <a:prstGeom prst="rect">
+            <a:avLst/>
+          </a:prstGeom>
+          <a:noFill/>
+          <a:ln w="19050">
+            <a:solidFill>
+              <a:srgbClr val="2DA5DB"/>
+            </a:solidFill>
+          </a:ln>
+        </p:spPr>
+        <p:style>
+          <a:lnRef idx="2">
+            <a:schemeClr val="accent1">
+              <a:shade val="50000"/>
+            </a:schemeClr>
+          </a:lnRef>
+          <a:fillRef idx="1">
+            <a:schemeClr val="accent1"/>
+          </a:fillRef>
+          <a:effectRef idx="0">
+            <a:schemeClr val="accent1"/>
+          </a:effectRef>
+          <a:fontRef idx="minor">
+            <a:schemeClr val="lt1"/>
+          </a:fontRef>
+        </p:style>
+        <p:txBody>
+          <a:bodyPr rtlCol="0" anchor="ctr"/>
+          <a:lstStyle/>
+          <a:p>
+            <a:pPr algn="ctr"/>
+            <a:endParaRPr lang="en-US"/>
           </a:p>
         </p:txBody>
       </p:sp>

</xml_diff>

<commit_message>
Added boxes for leader and team aggregation
</commit_message>
<xml_diff>
--- a/Presentation.pptx
+++ b/Presentation.pptx
@@ -119,7 +119,7 @@
   </p:defaultTextStyle>
   <p:extLst>
     <p:ext uri="{EFAFB233-063F-42B5-8137-9DF3F51BA10A}">
-      <p15:sldGuideLst xmlns:p15="http://schemas.microsoft.com/office/powerpoint/2012/main"/>
+      <p15:sldGuideLst xmlns:p15="http://schemas.microsoft.com/office/powerpoint/2012/main" xmlns=""/>
     </p:ext>
   </p:extLst>
 </p:presentation>
@@ -207,7 +207,7 @@
           <a:p>
             <a:fld id="{2C16F43F-A232-7540-B88F-9CA4DAB800EC}" type="datetimeFigureOut">
               <a:rPr lang="en-US" smtClean="0"/>
-              <a:t>12/14/16</a:t>
+              <a:t>12/14/2016</a:t>
             </a:fld>
             <a:endParaRPr lang="en-US"/>
           </a:p>
@@ -1838,7 +1838,7 @@
           <a:p>
             <a:fld id="{2F3CF11A-FE28-0C42-AC11-F7529E06F69C}" type="datetime1">
               <a:rPr lang="en-US" smtClean="0"/>
-              <a:t>12/14/16</a:t>
+              <a:t>12/14/2016</a:t>
             </a:fld>
             <a:endParaRPr lang="en-US"/>
           </a:p>
@@ -2008,7 +2008,7 @@
           <a:p>
             <a:fld id="{920AC30F-B8A3-D443-9F88-68E39F28DBA9}" type="datetime1">
               <a:rPr lang="en-US" smtClean="0"/>
-              <a:t>12/14/16</a:t>
+              <a:t>12/14/2016</a:t>
             </a:fld>
             <a:endParaRPr lang="en-US"/>
           </a:p>
@@ -2188,7 +2188,7 @@
           <a:p>
             <a:fld id="{6B15ECE9-C01D-4F44-B80B-97B159B6322F}" type="datetime1">
               <a:rPr lang="en-US" smtClean="0"/>
-              <a:t>12/14/16</a:t>
+              <a:t>12/14/2016</a:t>
             </a:fld>
             <a:endParaRPr lang="en-US"/>
           </a:p>
@@ -2358,7 +2358,7 @@
           <a:p>
             <a:fld id="{9260ED66-CB6E-764E-B99F-286F24E58047}" type="datetime1">
               <a:rPr lang="en-US" smtClean="0"/>
-              <a:t>12/14/16</a:t>
+              <a:t>12/14/2016</a:t>
             </a:fld>
             <a:endParaRPr lang="en-US"/>
           </a:p>
@@ -2604,7 +2604,7 @@
           <a:p>
             <a:fld id="{FA97A8ED-728D-3C46-843C-871788054D9F}" type="datetime1">
               <a:rPr lang="en-US" smtClean="0"/>
-              <a:t>12/14/16</a:t>
+              <a:t>12/14/2016</a:t>
             </a:fld>
             <a:endParaRPr lang="en-US"/>
           </a:p>
@@ -2836,7 +2836,7 @@
           <a:p>
             <a:fld id="{4AB6FFF2-B645-0047-9D5E-8FE97DC12A3B}" type="datetime1">
               <a:rPr lang="en-US" smtClean="0"/>
-              <a:t>12/14/16</a:t>
+              <a:t>12/14/2016</a:t>
             </a:fld>
             <a:endParaRPr lang="en-US"/>
           </a:p>
@@ -3203,7 +3203,7 @@
           <a:p>
             <a:fld id="{A0F96C2D-3AA6-0E48-A18F-1E5B36E7CD98}" type="datetime1">
               <a:rPr lang="en-US" smtClean="0"/>
-              <a:t>12/14/16</a:t>
+              <a:t>12/14/2016</a:t>
             </a:fld>
             <a:endParaRPr lang="en-US"/>
           </a:p>
@@ -3321,7 +3321,7 @@
           <a:p>
             <a:fld id="{E9C4F00E-3322-9B4A-BCEE-370ED3483BEE}" type="datetime1">
               <a:rPr lang="en-US" smtClean="0"/>
-              <a:t>12/14/16</a:t>
+              <a:t>12/14/2016</a:t>
             </a:fld>
             <a:endParaRPr lang="en-US"/>
           </a:p>
@@ -3416,7 +3416,7 @@
           <a:p>
             <a:fld id="{4BFAB9DE-DD3A-5C41-9E1E-AEFA73512B80}" type="datetime1">
               <a:rPr lang="en-US" smtClean="0"/>
-              <a:t>12/14/16</a:t>
+              <a:t>12/14/2016</a:t>
             </a:fld>
             <a:endParaRPr lang="en-US"/>
           </a:p>
@@ -3693,7 +3693,7 @@
           <a:p>
             <a:fld id="{C7871526-BE77-A44F-802D-D8AC625E7977}" type="datetime1">
               <a:rPr lang="en-US" smtClean="0"/>
-              <a:t>12/14/16</a:t>
+              <a:t>12/14/2016</a:t>
             </a:fld>
             <a:endParaRPr lang="en-US"/>
           </a:p>
@@ -3946,7 +3946,7 @@
           <a:p>
             <a:fld id="{954A7052-351E-A74C-B714-0114291906FF}" type="datetime1">
               <a:rPr lang="en-US" smtClean="0"/>
-              <a:t>12/14/16</a:t>
+              <a:t>12/14/2016</a:t>
             </a:fld>
             <a:endParaRPr lang="en-US"/>
           </a:p>
@@ -4159,7 +4159,7 @@
           <a:p>
             <a:fld id="{B5E5682C-B4C2-6440-A12C-AE13AC8BCA64}" type="datetime1">
               <a:rPr lang="en-US" smtClean="0"/>
-              <a:t>12/14/16</a:t>
+              <a:t>12/14/2016</a:t>
             </a:fld>
             <a:endParaRPr lang="en-US"/>
           </a:p>
@@ -5113,6 +5113,282 @@
           </a:p>
         </p:txBody>
       </p:sp>
+      <p:sp>
+        <p:nvSpPr>
+          <p:cNvPr id="15" name="Rectangle 14"/>
+          <p:cNvSpPr/>
+          <p:nvPr/>
+        </p:nvSpPr>
+        <p:spPr>
+          <a:xfrm>
+            <a:off x="3261994" y="2656816"/>
+            <a:ext cx="727075" cy="257834"/>
+          </a:xfrm>
+          <a:prstGeom prst="rect">
+            <a:avLst/>
+          </a:prstGeom>
+          <a:noFill/>
+          <a:ln w="19050">
+            <a:solidFill>
+              <a:srgbClr val="2DA5DB"/>
+            </a:solidFill>
+          </a:ln>
+        </p:spPr>
+        <p:style>
+          <a:lnRef idx="2">
+            <a:schemeClr val="accent1">
+              <a:shade val="50000"/>
+            </a:schemeClr>
+          </a:lnRef>
+          <a:fillRef idx="1">
+            <a:schemeClr val="accent1"/>
+          </a:fillRef>
+          <a:effectRef idx="0">
+            <a:schemeClr val="accent1"/>
+          </a:effectRef>
+          <a:fontRef idx="minor">
+            <a:schemeClr val="lt1"/>
+          </a:fontRef>
+        </p:style>
+        <p:txBody>
+          <a:bodyPr rtlCol="0" anchor="ctr"/>
+          <a:lstStyle/>
+          <a:p>
+            <a:pPr algn="ctr"/>
+            <a:endParaRPr lang="en-US"/>
+          </a:p>
+        </p:txBody>
+      </p:sp>
+      <p:sp>
+        <p:nvSpPr>
+          <p:cNvPr id="16" name="Rectangle 15"/>
+          <p:cNvSpPr/>
+          <p:nvPr/>
+        </p:nvSpPr>
+        <p:spPr>
+          <a:xfrm>
+            <a:off x="614044" y="4180816"/>
+            <a:ext cx="727075" cy="257834"/>
+          </a:xfrm>
+          <a:prstGeom prst="rect">
+            <a:avLst/>
+          </a:prstGeom>
+          <a:noFill/>
+          <a:ln w="19050">
+            <a:solidFill>
+              <a:srgbClr val="2DA5DB"/>
+            </a:solidFill>
+          </a:ln>
+        </p:spPr>
+        <p:style>
+          <a:lnRef idx="2">
+            <a:schemeClr val="accent1">
+              <a:shade val="50000"/>
+            </a:schemeClr>
+          </a:lnRef>
+          <a:fillRef idx="1">
+            <a:schemeClr val="accent1"/>
+          </a:fillRef>
+          <a:effectRef idx="0">
+            <a:schemeClr val="accent1"/>
+          </a:effectRef>
+          <a:fontRef idx="minor">
+            <a:schemeClr val="lt1"/>
+          </a:fontRef>
+        </p:style>
+        <p:txBody>
+          <a:bodyPr rtlCol="0" anchor="ctr"/>
+          <a:lstStyle/>
+          <a:p>
+            <a:pPr algn="ctr"/>
+            <a:endParaRPr lang="en-US"/>
+          </a:p>
+        </p:txBody>
+      </p:sp>
+      <p:sp>
+        <p:nvSpPr>
+          <p:cNvPr id="17" name="Rectangle 16"/>
+          <p:cNvSpPr/>
+          <p:nvPr/>
+        </p:nvSpPr>
+        <p:spPr>
+          <a:xfrm>
+            <a:off x="5826124" y="1917676"/>
+            <a:ext cx="727075" cy="257834"/>
+          </a:xfrm>
+          <a:prstGeom prst="rect">
+            <a:avLst/>
+          </a:prstGeom>
+          <a:noFill/>
+          <a:ln w="19050">
+            <a:solidFill>
+              <a:srgbClr val="2DA5DB"/>
+            </a:solidFill>
+          </a:ln>
+        </p:spPr>
+        <p:style>
+          <a:lnRef idx="2">
+            <a:schemeClr val="accent1">
+              <a:shade val="50000"/>
+            </a:schemeClr>
+          </a:lnRef>
+          <a:fillRef idx="1">
+            <a:schemeClr val="accent1"/>
+          </a:fillRef>
+          <a:effectRef idx="0">
+            <a:schemeClr val="accent1"/>
+          </a:effectRef>
+          <a:fontRef idx="minor">
+            <a:schemeClr val="lt1"/>
+          </a:fontRef>
+        </p:style>
+        <p:txBody>
+          <a:bodyPr rtlCol="0" anchor="ctr"/>
+          <a:lstStyle/>
+          <a:p>
+            <a:pPr algn="ctr"/>
+            <a:endParaRPr lang="en-US"/>
+          </a:p>
+        </p:txBody>
+      </p:sp>
+      <p:sp>
+        <p:nvSpPr>
+          <p:cNvPr id="18" name="Rectangle 17"/>
+          <p:cNvSpPr/>
+          <p:nvPr/>
+        </p:nvSpPr>
+        <p:spPr>
+          <a:xfrm>
+            <a:off x="5760720" y="4973296"/>
+            <a:ext cx="864869" cy="257834"/>
+          </a:xfrm>
+          <a:prstGeom prst="rect">
+            <a:avLst/>
+          </a:prstGeom>
+          <a:noFill/>
+          <a:ln w="19050">
+            <a:solidFill>
+              <a:srgbClr val="2DA5DB"/>
+            </a:solidFill>
+          </a:ln>
+        </p:spPr>
+        <p:style>
+          <a:lnRef idx="2">
+            <a:schemeClr val="accent1">
+              <a:shade val="50000"/>
+            </a:schemeClr>
+          </a:lnRef>
+          <a:fillRef idx="1">
+            <a:schemeClr val="accent1"/>
+          </a:fillRef>
+          <a:effectRef idx="0">
+            <a:schemeClr val="accent1"/>
+          </a:effectRef>
+          <a:fontRef idx="minor">
+            <a:schemeClr val="lt1"/>
+          </a:fontRef>
+        </p:style>
+        <p:txBody>
+          <a:bodyPr rtlCol="0" anchor="ctr"/>
+          <a:lstStyle/>
+          <a:p>
+            <a:pPr algn="ctr"/>
+            <a:endParaRPr lang="en-US"/>
+          </a:p>
+        </p:txBody>
+      </p:sp>
+      <p:sp>
+        <p:nvSpPr>
+          <p:cNvPr id="19" name="Rectangle 18"/>
+          <p:cNvSpPr/>
+          <p:nvPr/>
+        </p:nvSpPr>
+        <p:spPr>
+          <a:xfrm>
+            <a:off x="11144884" y="4211296"/>
+            <a:ext cx="727075" cy="257834"/>
+          </a:xfrm>
+          <a:prstGeom prst="rect">
+            <a:avLst/>
+          </a:prstGeom>
+          <a:noFill/>
+          <a:ln w="19050">
+            <a:solidFill>
+              <a:srgbClr val="2DA5DB"/>
+            </a:solidFill>
+          </a:ln>
+        </p:spPr>
+        <p:style>
+          <a:lnRef idx="2">
+            <a:schemeClr val="accent1">
+              <a:shade val="50000"/>
+            </a:schemeClr>
+          </a:lnRef>
+          <a:fillRef idx="1">
+            <a:schemeClr val="accent1"/>
+          </a:fillRef>
+          <a:effectRef idx="0">
+            <a:schemeClr val="accent1"/>
+          </a:effectRef>
+          <a:fontRef idx="minor">
+            <a:schemeClr val="lt1"/>
+          </a:fontRef>
+        </p:style>
+        <p:txBody>
+          <a:bodyPr rtlCol="0" anchor="ctr"/>
+          <a:lstStyle/>
+          <a:p>
+            <a:pPr algn="ctr"/>
+            <a:endParaRPr lang="en-US"/>
+          </a:p>
+        </p:txBody>
+      </p:sp>
+      <p:sp>
+        <p:nvSpPr>
+          <p:cNvPr id="20" name="Rectangle 19"/>
+          <p:cNvSpPr/>
+          <p:nvPr/>
+        </p:nvSpPr>
+        <p:spPr>
+          <a:xfrm>
+            <a:off x="8247062" y="2653006"/>
+            <a:ext cx="1182688" cy="261644"/>
+          </a:xfrm>
+          <a:prstGeom prst="rect">
+            <a:avLst/>
+          </a:prstGeom>
+          <a:noFill/>
+          <a:ln w="19050">
+            <a:solidFill>
+              <a:srgbClr val="2DA5DB"/>
+            </a:solidFill>
+          </a:ln>
+        </p:spPr>
+        <p:style>
+          <a:lnRef idx="2">
+            <a:schemeClr val="accent1">
+              <a:shade val="50000"/>
+            </a:schemeClr>
+          </a:lnRef>
+          <a:fillRef idx="1">
+            <a:schemeClr val="accent1"/>
+          </a:fillRef>
+          <a:effectRef idx="0">
+            <a:schemeClr val="accent1"/>
+          </a:effectRef>
+          <a:fontRef idx="minor">
+            <a:schemeClr val="lt1"/>
+          </a:fontRef>
+        </p:style>
+        <p:txBody>
+          <a:bodyPr rtlCol="0" anchor="ctr"/>
+          <a:lstStyle/>
+          <a:p>
+            <a:pPr algn="ctr"/>
+            <a:endParaRPr lang="en-US"/>
+          </a:p>
+        </p:txBody>
+      </p:sp>
     </p:spTree>
     <p:extLst>
       <p:ext uri="{BB962C8B-B14F-4D97-AF65-F5344CB8AC3E}">
@@ -11922,6 +12198,144 @@
           </a:p>
         </p:txBody>
       </p:sp>
+      <p:sp>
+        <p:nvSpPr>
+          <p:cNvPr id="25" name="Rectangle 24"/>
+          <p:cNvSpPr/>
+          <p:nvPr/>
+        </p:nvSpPr>
+        <p:spPr>
+          <a:xfrm>
+            <a:off x="2555344" y="5205454"/>
+            <a:ext cx="742660" cy="201539"/>
+          </a:xfrm>
+          <a:prstGeom prst="rect">
+            <a:avLst/>
+          </a:prstGeom>
+          <a:noFill/>
+          <a:ln w="19050">
+            <a:solidFill>
+              <a:srgbClr val="2DA5DB"/>
+            </a:solidFill>
+          </a:ln>
+        </p:spPr>
+        <p:style>
+          <a:lnRef idx="2">
+            <a:schemeClr val="accent1">
+              <a:shade val="50000"/>
+            </a:schemeClr>
+          </a:lnRef>
+          <a:fillRef idx="1">
+            <a:schemeClr val="accent1"/>
+          </a:fillRef>
+          <a:effectRef idx="0">
+            <a:schemeClr val="accent1"/>
+          </a:effectRef>
+          <a:fontRef idx="minor">
+            <a:schemeClr val="lt1"/>
+          </a:fontRef>
+        </p:style>
+        <p:txBody>
+          <a:bodyPr rtlCol="0" anchor="ctr"/>
+          <a:lstStyle/>
+          <a:p>
+            <a:pPr algn="ctr"/>
+            <a:endParaRPr lang="en-US"/>
+          </a:p>
+        </p:txBody>
+      </p:sp>
+      <p:sp>
+        <p:nvSpPr>
+          <p:cNvPr id="26" name="Rectangle 25"/>
+          <p:cNvSpPr/>
+          <p:nvPr/>
+        </p:nvSpPr>
+        <p:spPr>
+          <a:xfrm>
+            <a:off x="4022836" y="4350028"/>
+            <a:ext cx="742660" cy="201539"/>
+          </a:xfrm>
+          <a:prstGeom prst="rect">
+            <a:avLst/>
+          </a:prstGeom>
+          <a:noFill/>
+          <a:ln w="19050">
+            <a:solidFill>
+              <a:srgbClr val="2DA5DB"/>
+            </a:solidFill>
+          </a:ln>
+        </p:spPr>
+        <p:style>
+          <a:lnRef idx="2">
+            <a:schemeClr val="accent1">
+              <a:shade val="50000"/>
+            </a:schemeClr>
+          </a:lnRef>
+          <a:fillRef idx="1">
+            <a:schemeClr val="accent1"/>
+          </a:fillRef>
+          <a:effectRef idx="0">
+            <a:schemeClr val="accent1"/>
+          </a:effectRef>
+          <a:fontRef idx="minor">
+            <a:schemeClr val="lt1"/>
+          </a:fontRef>
+        </p:style>
+        <p:txBody>
+          <a:bodyPr rtlCol="0" anchor="ctr"/>
+          <a:lstStyle/>
+          <a:p>
+            <a:pPr algn="ctr"/>
+            <a:endParaRPr lang="en-US"/>
+          </a:p>
+        </p:txBody>
+      </p:sp>
+      <p:sp>
+        <p:nvSpPr>
+          <p:cNvPr id="27" name="Rectangle 26"/>
+          <p:cNvSpPr/>
+          <p:nvPr/>
+        </p:nvSpPr>
+        <p:spPr>
+          <a:xfrm>
+            <a:off x="1124377" y="4351102"/>
+            <a:ext cx="742660" cy="201539"/>
+          </a:xfrm>
+          <a:prstGeom prst="rect">
+            <a:avLst/>
+          </a:prstGeom>
+          <a:noFill/>
+          <a:ln w="19050">
+            <a:solidFill>
+              <a:srgbClr val="2DA5DB"/>
+            </a:solidFill>
+          </a:ln>
+        </p:spPr>
+        <p:style>
+          <a:lnRef idx="2">
+            <a:schemeClr val="accent1">
+              <a:shade val="50000"/>
+            </a:schemeClr>
+          </a:lnRef>
+          <a:fillRef idx="1">
+            <a:schemeClr val="accent1"/>
+          </a:fillRef>
+          <a:effectRef idx="0">
+            <a:schemeClr val="accent1"/>
+          </a:effectRef>
+          <a:fontRef idx="minor">
+            <a:schemeClr val="lt1"/>
+          </a:fontRef>
+        </p:style>
+        <p:txBody>
+          <a:bodyPr rtlCol="0" anchor="ctr"/>
+          <a:lstStyle/>
+          <a:p>
+            <a:pPr algn="ctr"/>
+            <a:endParaRPr lang="en-US"/>
+          </a:p>
+        </p:txBody>
+      </p:sp>
     </p:spTree>
     <p:extLst>
       <p:ext uri="{BB962C8B-B14F-4D97-AF65-F5344CB8AC3E}">
@@ -12732,6 +13146,144 @@
           </a:p>
         </p:txBody>
       </p:sp>
+      <p:sp>
+        <p:nvSpPr>
+          <p:cNvPr id="27" name="Rectangle 26"/>
+          <p:cNvSpPr/>
+          <p:nvPr/>
+        </p:nvSpPr>
+        <p:spPr>
+          <a:xfrm>
+            <a:off x="2462878" y="5164358"/>
+            <a:ext cx="639917" cy="201539"/>
+          </a:xfrm>
+          <a:prstGeom prst="rect">
+            <a:avLst/>
+          </a:prstGeom>
+          <a:noFill/>
+          <a:ln w="19050">
+            <a:solidFill>
+              <a:srgbClr val="2DA5DB"/>
+            </a:solidFill>
+          </a:ln>
+        </p:spPr>
+        <p:style>
+          <a:lnRef idx="2">
+            <a:schemeClr val="accent1">
+              <a:shade val="50000"/>
+            </a:schemeClr>
+          </a:lnRef>
+          <a:fillRef idx="1">
+            <a:schemeClr val="accent1"/>
+          </a:fillRef>
+          <a:effectRef idx="0">
+            <a:schemeClr val="accent1"/>
+          </a:effectRef>
+          <a:fontRef idx="minor">
+            <a:schemeClr val="lt1"/>
+          </a:fontRef>
+        </p:style>
+        <p:txBody>
+          <a:bodyPr rtlCol="0" anchor="ctr"/>
+          <a:lstStyle/>
+          <a:p>
+            <a:pPr algn="ctr"/>
+            <a:endParaRPr lang="en-US"/>
+          </a:p>
+        </p:txBody>
+      </p:sp>
+      <p:sp>
+        <p:nvSpPr>
+          <p:cNvPr id="28" name="Rectangle 27"/>
+          <p:cNvSpPr/>
+          <p:nvPr/>
+        </p:nvSpPr>
+        <p:spPr>
+          <a:xfrm>
+            <a:off x="3860142" y="4311616"/>
+            <a:ext cx="742660" cy="201539"/>
+          </a:xfrm>
+          <a:prstGeom prst="rect">
+            <a:avLst/>
+          </a:prstGeom>
+          <a:noFill/>
+          <a:ln w="19050">
+            <a:solidFill>
+              <a:srgbClr val="2DA5DB"/>
+            </a:solidFill>
+          </a:ln>
+        </p:spPr>
+        <p:style>
+          <a:lnRef idx="2">
+            <a:schemeClr val="accent1">
+              <a:shade val="50000"/>
+            </a:schemeClr>
+          </a:lnRef>
+          <a:fillRef idx="1">
+            <a:schemeClr val="accent1"/>
+          </a:fillRef>
+          <a:effectRef idx="0">
+            <a:schemeClr val="accent1"/>
+          </a:effectRef>
+          <a:fontRef idx="minor">
+            <a:schemeClr val="lt1"/>
+          </a:fontRef>
+        </p:style>
+        <p:txBody>
+          <a:bodyPr rtlCol="0" anchor="ctr"/>
+          <a:lstStyle/>
+          <a:p>
+            <a:pPr algn="ctr"/>
+            <a:endParaRPr lang="en-US"/>
+          </a:p>
+        </p:txBody>
+      </p:sp>
+      <p:sp>
+        <p:nvSpPr>
+          <p:cNvPr id="29" name="Rectangle 28"/>
+          <p:cNvSpPr/>
+          <p:nvPr/>
+        </p:nvSpPr>
+        <p:spPr>
+          <a:xfrm>
+            <a:off x="2411506" y="1793930"/>
+            <a:ext cx="742660" cy="201539"/>
+          </a:xfrm>
+          <a:prstGeom prst="rect">
+            <a:avLst/>
+          </a:prstGeom>
+          <a:noFill/>
+          <a:ln w="19050">
+            <a:solidFill>
+              <a:srgbClr val="2DA5DB"/>
+            </a:solidFill>
+          </a:ln>
+        </p:spPr>
+        <p:style>
+          <a:lnRef idx="2">
+            <a:schemeClr val="accent1">
+              <a:shade val="50000"/>
+            </a:schemeClr>
+          </a:lnRef>
+          <a:fillRef idx="1">
+            <a:schemeClr val="accent1"/>
+          </a:fillRef>
+          <a:effectRef idx="0">
+            <a:schemeClr val="accent1"/>
+          </a:effectRef>
+          <a:fontRef idx="minor">
+            <a:schemeClr val="lt1"/>
+          </a:fontRef>
+        </p:style>
+        <p:txBody>
+          <a:bodyPr rtlCol="0" anchor="ctr"/>
+          <a:lstStyle/>
+          <a:p>
+            <a:pPr algn="ctr"/>
+            <a:endParaRPr lang="en-US"/>
+          </a:p>
+        </p:txBody>
+      </p:sp>
     </p:spTree>
     <p:extLst>
       <p:ext uri="{BB962C8B-B14F-4D97-AF65-F5344CB8AC3E}">
@@ -13542,6 +14094,144 @@
           </a:p>
         </p:txBody>
       </p:sp>
+      <p:sp>
+        <p:nvSpPr>
+          <p:cNvPr id="25" name="Rectangle 24"/>
+          <p:cNvSpPr/>
+          <p:nvPr/>
+        </p:nvSpPr>
+        <p:spPr>
+          <a:xfrm>
+            <a:off x="2390958" y="5167104"/>
+            <a:ext cx="742660" cy="201539"/>
+          </a:xfrm>
+          <a:prstGeom prst="rect">
+            <a:avLst/>
+          </a:prstGeom>
+          <a:noFill/>
+          <a:ln w="19050">
+            <a:solidFill>
+              <a:srgbClr val="2DA5DB"/>
+            </a:solidFill>
+          </a:ln>
+        </p:spPr>
+        <p:style>
+          <a:lnRef idx="2">
+            <a:schemeClr val="accent1">
+              <a:shade val="50000"/>
+            </a:schemeClr>
+          </a:lnRef>
+          <a:fillRef idx="1">
+            <a:schemeClr val="accent1"/>
+          </a:fillRef>
+          <a:effectRef idx="0">
+            <a:schemeClr val="accent1"/>
+          </a:effectRef>
+          <a:fontRef idx="minor">
+            <a:schemeClr val="lt1"/>
+          </a:fontRef>
+        </p:style>
+        <p:txBody>
+          <a:bodyPr rtlCol="0" anchor="ctr"/>
+          <a:lstStyle/>
+          <a:p>
+            <a:pPr algn="ctr"/>
+            <a:endParaRPr lang="en-US"/>
+          </a:p>
+        </p:txBody>
+      </p:sp>
+      <p:sp>
+        <p:nvSpPr>
+          <p:cNvPr id="26" name="Rectangle 25"/>
+          <p:cNvSpPr/>
+          <p:nvPr/>
+        </p:nvSpPr>
+        <p:spPr>
+          <a:xfrm>
+            <a:off x="3817352" y="4314882"/>
+            <a:ext cx="742660" cy="201539"/>
+          </a:xfrm>
+          <a:prstGeom prst="rect">
+            <a:avLst/>
+          </a:prstGeom>
+          <a:noFill/>
+          <a:ln w="19050">
+            <a:solidFill>
+              <a:srgbClr val="2DA5DB"/>
+            </a:solidFill>
+          </a:ln>
+        </p:spPr>
+        <p:style>
+          <a:lnRef idx="2">
+            <a:schemeClr val="accent1">
+              <a:shade val="50000"/>
+            </a:schemeClr>
+          </a:lnRef>
+          <a:fillRef idx="1">
+            <a:schemeClr val="accent1"/>
+          </a:fillRef>
+          <a:effectRef idx="0">
+            <a:schemeClr val="accent1"/>
+          </a:effectRef>
+          <a:fontRef idx="minor">
+            <a:schemeClr val="lt1"/>
+          </a:fontRef>
+        </p:style>
+        <p:txBody>
+          <a:bodyPr rtlCol="0" anchor="ctr"/>
+          <a:lstStyle/>
+          <a:p>
+            <a:pPr algn="ctr"/>
+            <a:endParaRPr lang="en-US"/>
+          </a:p>
+        </p:txBody>
+      </p:sp>
+      <p:sp>
+        <p:nvSpPr>
+          <p:cNvPr id="27" name="Rectangle 26"/>
+          <p:cNvSpPr/>
+          <p:nvPr/>
+        </p:nvSpPr>
+        <p:spPr>
+          <a:xfrm>
+            <a:off x="753686" y="2663894"/>
+            <a:ext cx="1198403" cy="201539"/>
+          </a:xfrm>
+          <a:prstGeom prst="rect">
+            <a:avLst/>
+          </a:prstGeom>
+          <a:noFill/>
+          <a:ln w="19050">
+            <a:solidFill>
+              <a:srgbClr val="2DA5DB"/>
+            </a:solidFill>
+          </a:ln>
+        </p:spPr>
+        <p:style>
+          <a:lnRef idx="2">
+            <a:schemeClr val="accent1">
+              <a:shade val="50000"/>
+            </a:schemeClr>
+          </a:lnRef>
+          <a:fillRef idx="1">
+            <a:schemeClr val="accent1"/>
+          </a:fillRef>
+          <a:effectRef idx="0">
+            <a:schemeClr val="accent1"/>
+          </a:effectRef>
+          <a:fontRef idx="minor">
+            <a:schemeClr val="lt1"/>
+          </a:fontRef>
+        </p:style>
+        <p:txBody>
+          <a:bodyPr rtlCol="0" anchor="ctr"/>
+          <a:lstStyle/>
+          <a:p>
+            <a:pPr algn="ctr"/>
+            <a:endParaRPr lang="en-US"/>
+          </a:p>
+        </p:txBody>
+      </p:sp>
     </p:spTree>
     <p:extLst>
       <p:ext uri="{BB962C8B-B14F-4D97-AF65-F5344CB8AC3E}">
@@ -13752,7 +14442,7 @@
       </p:pic>
       <p:grpSp>
         <p:nvGrpSpPr>
-          <p:cNvPr id="17" name="Group 16"/>
+          <p:cNvPr id="3" name="Group 2"/>
           <p:cNvGrpSpPr/>
           <p:nvPr/>
         </p:nvGrpSpPr>
@@ -13760,7 +14450,7 @@
           <a:xfrm>
             <a:off x="434621" y="1833531"/>
             <a:ext cx="3837317" cy="3721034"/>
-            <a:chOff x="613911" y="1708028"/>
+            <a:chOff x="434621" y="1833531"/>
             <a:chExt cx="3837317" cy="3721034"/>
           </a:xfrm>
         </p:grpSpPr>
@@ -13780,7 +14470,7 @@
           </p:blipFill>
           <p:spPr>
             <a:xfrm>
-              <a:off x="613911" y="1708028"/>
+              <a:off x="434621" y="1833531"/>
               <a:ext cx="3837317" cy="3721034"/>
             </a:xfrm>
             <a:prstGeom prst="rect">
@@ -13796,14 +14486,14 @@
           </p:nvSpPr>
           <p:spPr>
             <a:xfrm>
-              <a:off x="2587924" y="4767137"/>
+              <a:off x="2420064" y="4892640"/>
               <a:ext cx="293297" cy="252759"/>
             </a:xfrm>
             <a:prstGeom prst="triangle">
               <a:avLst/>
             </a:prstGeom>
             <a:noFill/>
-            <a:ln>
+            <a:ln w="25400">
               <a:solidFill>
                 <a:srgbClr val="2DA5DB"/>
               </a:solidFill>
@@ -13870,76 +14560,91 @@
           </a:p>
         </p:txBody>
       </p:sp>
-      <p:pic>
-        <p:nvPicPr>
-          <p:cNvPr id="18" name="Picture 17"/>
-          <p:cNvPicPr>
-            <a:picLocks noChangeAspect="1"/>
-          </p:cNvPicPr>
+      <p:grpSp>
+        <p:nvGrpSpPr>
+          <p:cNvPr id="10" name="Group 9"/>
+          <p:cNvGrpSpPr/>
           <p:nvPr/>
-        </p:nvPicPr>
-        <p:blipFill>
-          <a:blip r:embed="rId8"/>
-          <a:stretch>
-            <a:fillRect/>
-          </a:stretch>
-        </p:blipFill>
-        <p:spPr>
+        </p:nvGrpSpPr>
+        <p:grpSpPr>
           <a:xfrm>
             <a:off x="4174881" y="1847115"/>
             <a:ext cx="3842238" cy="3692335"/>
-          </a:xfrm>
-          <a:prstGeom prst="rect">
-            <a:avLst/>
-          </a:prstGeom>
-        </p:spPr>
-      </p:pic>
-      <p:sp>
-        <p:nvSpPr>
-          <p:cNvPr id="19" name="Triangle 18"/>
-          <p:cNvSpPr/>
-          <p:nvPr/>
-        </p:nvSpPr>
-        <p:spPr>
-          <a:xfrm>
-            <a:off x="6157754" y="3658190"/>
-            <a:ext cx="602809" cy="503123"/>
-          </a:xfrm>
-          <a:prstGeom prst="triangle">
-            <a:avLst/>
-          </a:prstGeom>
-          <a:noFill/>
-          <a:ln>
-            <a:solidFill>
-              <a:srgbClr val="2DA5DB"/>
-            </a:solidFill>
-          </a:ln>
-        </p:spPr>
-        <p:style>
-          <a:lnRef idx="2">
-            <a:schemeClr val="accent1">
-              <a:shade val="50000"/>
-            </a:schemeClr>
-          </a:lnRef>
-          <a:fillRef idx="1">
-            <a:schemeClr val="accent1"/>
-          </a:fillRef>
-          <a:effectRef idx="0">
-            <a:schemeClr val="accent1"/>
-          </a:effectRef>
-          <a:fontRef idx="minor">
-            <a:schemeClr val="lt1"/>
-          </a:fontRef>
-        </p:style>
-        <p:txBody>
-          <a:bodyPr rtlCol="0" anchor="ctr"/>
-          <a:lstStyle/>
-          <a:p>
-            <a:pPr algn="ctr"/>
-            <a:endParaRPr lang="en-US"/>
-          </a:p>
-        </p:txBody>
-      </p:sp>
+            <a:chOff x="4174881" y="1847115"/>
+            <a:chExt cx="3842238" cy="3692335"/>
+          </a:xfrm>
+        </p:grpSpPr>
+        <p:pic>
+          <p:nvPicPr>
+            <p:cNvPr id="18" name="Picture 17"/>
+            <p:cNvPicPr>
+              <a:picLocks noChangeAspect="1"/>
+            </p:cNvPicPr>
+            <p:nvPr/>
+          </p:nvPicPr>
+          <p:blipFill>
+            <a:blip r:embed="rId8"/>
+            <a:stretch>
+              <a:fillRect/>
+            </a:stretch>
+          </p:blipFill>
+          <p:spPr>
+            <a:xfrm>
+              <a:off x="4174881" y="1847115"/>
+              <a:ext cx="3842238" cy="3692335"/>
+            </a:xfrm>
+            <a:prstGeom prst="rect">
+              <a:avLst/>
+            </a:prstGeom>
+          </p:spPr>
+        </p:pic>
+        <p:sp>
+          <p:nvSpPr>
+            <p:cNvPr id="19" name="Triangle 18"/>
+            <p:cNvSpPr/>
+            <p:nvPr/>
+          </p:nvSpPr>
+          <p:spPr>
+            <a:xfrm>
+              <a:off x="6157754" y="3658190"/>
+              <a:ext cx="602809" cy="503123"/>
+            </a:xfrm>
+            <a:prstGeom prst="triangle">
+              <a:avLst/>
+            </a:prstGeom>
+            <a:noFill/>
+            <a:ln w="25400">
+              <a:solidFill>
+                <a:srgbClr val="2DA5DB"/>
+              </a:solidFill>
+            </a:ln>
+          </p:spPr>
+          <p:style>
+            <a:lnRef idx="2">
+              <a:schemeClr val="accent1">
+                <a:shade val="50000"/>
+              </a:schemeClr>
+            </a:lnRef>
+            <a:fillRef idx="1">
+              <a:schemeClr val="accent1"/>
+            </a:fillRef>
+            <a:effectRef idx="0">
+              <a:schemeClr val="accent1"/>
+            </a:effectRef>
+            <a:fontRef idx="minor">
+              <a:schemeClr val="lt1"/>
+            </a:fontRef>
+          </p:style>
+          <p:txBody>
+            <a:bodyPr rtlCol="0" anchor="ctr"/>
+            <a:lstStyle/>
+            <a:p>
+              <a:pPr algn="ctr"/>
+              <a:endParaRPr lang="en-US"/>
+            </a:p>
+          </p:txBody>
+        </p:sp>
+      </p:grpSp>
       <p:sp>
         <p:nvSpPr>
           <p:cNvPr id="20" name="TextBox 19"/>
@@ -13975,30 +14680,6 @@
           </a:p>
         </p:txBody>
       </p:sp>
-      <p:pic>
-        <p:nvPicPr>
-          <p:cNvPr id="21" name="Picture 20"/>
-          <p:cNvPicPr>
-            <a:picLocks noChangeAspect="1"/>
-          </p:cNvPicPr>
-          <p:nvPr/>
-        </p:nvPicPr>
-        <p:blipFill>
-          <a:blip r:embed="rId9"/>
-          <a:stretch>
-            <a:fillRect/>
-          </a:stretch>
-        </p:blipFill>
-        <p:spPr>
-          <a:xfrm>
-            <a:off x="8055495" y="1663891"/>
-            <a:ext cx="4004094" cy="3951209"/>
-          </a:xfrm>
-          <a:prstGeom prst="rect">
-            <a:avLst/>
-          </a:prstGeom>
-        </p:spPr>
-      </p:pic>
       <p:sp>
         <p:nvSpPr>
           <p:cNvPr id="22" name="TextBox 21"/>
@@ -14034,52 +14715,91 @@
           </a:p>
         </p:txBody>
       </p:sp>
-      <p:sp>
-        <p:nvSpPr>
-          <p:cNvPr id="23" name="Triangle 22"/>
-          <p:cNvSpPr/>
+      <p:grpSp>
+        <p:nvGrpSpPr>
+          <p:cNvPr id="12" name="Group 11"/>
+          <p:cNvGrpSpPr/>
           <p:nvPr/>
-        </p:nvSpPr>
-        <p:spPr>
-          <a:xfrm>
-            <a:off x="10121789" y="3262813"/>
-            <a:ext cx="547047" cy="430470"/>
-          </a:xfrm>
-          <a:prstGeom prst="triangle">
-            <a:avLst/>
-          </a:prstGeom>
-          <a:noFill/>
-          <a:ln>
-            <a:solidFill>
-              <a:srgbClr val="2DA5DB"/>
-            </a:solidFill>
-          </a:ln>
-        </p:spPr>
-        <p:style>
-          <a:lnRef idx="2">
-            <a:schemeClr val="accent1">
-              <a:shade val="50000"/>
-            </a:schemeClr>
-          </a:lnRef>
-          <a:fillRef idx="1">
-            <a:schemeClr val="accent1"/>
-          </a:fillRef>
-          <a:effectRef idx="0">
-            <a:schemeClr val="accent1"/>
-          </a:effectRef>
-          <a:fontRef idx="minor">
-            <a:schemeClr val="lt1"/>
-          </a:fontRef>
-        </p:style>
-        <p:txBody>
-          <a:bodyPr rtlCol="0" anchor="ctr"/>
-          <a:lstStyle/>
-          <a:p>
-            <a:pPr algn="ctr"/>
-            <a:endParaRPr lang="en-US"/>
-          </a:p>
-        </p:txBody>
-      </p:sp>
+        </p:nvGrpSpPr>
+        <p:grpSpPr>
+          <a:xfrm>
+            <a:off x="8055495" y="1663891"/>
+            <a:ext cx="4004094" cy="3951209"/>
+            <a:chOff x="8055495" y="1663891"/>
+            <a:chExt cx="4004094" cy="3951209"/>
+          </a:xfrm>
+        </p:grpSpPr>
+        <p:pic>
+          <p:nvPicPr>
+            <p:cNvPr id="21" name="Picture 20"/>
+            <p:cNvPicPr>
+              <a:picLocks noChangeAspect="1"/>
+            </p:cNvPicPr>
+            <p:nvPr/>
+          </p:nvPicPr>
+          <p:blipFill>
+            <a:blip r:embed="rId9"/>
+            <a:stretch>
+              <a:fillRect/>
+            </a:stretch>
+          </p:blipFill>
+          <p:spPr>
+            <a:xfrm>
+              <a:off x="8055495" y="1663891"/>
+              <a:ext cx="4004094" cy="3951209"/>
+            </a:xfrm>
+            <a:prstGeom prst="rect">
+              <a:avLst/>
+            </a:prstGeom>
+          </p:spPr>
+        </p:pic>
+        <p:sp>
+          <p:nvSpPr>
+            <p:cNvPr id="23" name="Triangle 22"/>
+            <p:cNvSpPr/>
+            <p:nvPr/>
+          </p:nvSpPr>
+          <p:spPr>
+            <a:xfrm>
+              <a:off x="10121789" y="3262813"/>
+              <a:ext cx="547047" cy="430470"/>
+            </a:xfrm>
+            <a:prstGeom prst="triangle">
+              <a:avLst/>
+            </a:prstGeom>
+            <a:noFill/>
+            <a:ln w="25400">
+              <a:solidFill>
+                <a:srgbClr val="2DA5DB"/>
+              </a:solidFill>
+            </a:ln>
+          </p:spPr>
+          <p:style>
+            <a:lnRef idx="2">
+              <a:schemeClr val="accent1">
+                <a:shade val="50000"/>
+              </a:schemeClr>
+            </a:lnRef>
+            <a:fillRef idx="1">
+              <a:schemeClr val="accent1"/>
+            </a:fillRef>
+            <a:effectRef idx="0">
+              <a:schemeClr val="accent1"/>
+            </a:effectRef>
+            <a:fontRef idx="minor">
+              <a:schemeClr val="lt1"/>
+            </a:fontRef>
+          </p:style>
+          <p:txBody>
+            <a:bodyPr rtlCol="0" anchor="ctr"/>
+            <a:lstStyle/>
+            <a:p>
+              <a:pPr algn="ctr"/>
+              <a:endParaRPr lang="en-US"/>
+            </a:p>
+          </p:txBody>
+        </p:sp>
+      </p:grpSp>
     </p:spTree>
     <p:extLst>
       <p:ext uri="{BB962C8B-B14F-4D97-AF65-F5344CB8AC3E}">
@@ -14355,7 +15075,7 @@
   <a:extraClrSchemeLst/>
   <a:extLst>
     <a:ext uri="{05A4C25C-085E-4340-85A3-A5531E510DB2}">
-      <thm15:themeFamily xmlns:thm15="http://schemas.microsoft.com/office/thememl/2012/main" name="Office Theme" id="{62F939B6-93AF-4DB8-9C6B-D6C7DFDC589F}" vid="{4A3C46E8-61CC-4603-A589-7422A47A8E4A}"/>
+      <thm15:themeFamily xmlns:thm15="http://schemas.microsoft.com/office/thememl/2012/main" xmlns="" name="Office Theme" id="{62F939B6-93AF-4DB8-9C6B-D6C7DFDC589F}" vid="{4A3C46E8-61CC-4603-A589-7422A47A8E4A}"/>
     </a:ext>
   </a:extLst>
 </a:theme>
@@ -14616,7 +15336,7 @@
   <a:extraClrSchemeLst/>
   <a:extLst>
     <a:ext uri="{05A4C25C-085E-4340-85A3-A5531E510DB2}">
-      <thm15:themeFamily xmlns:thm15="http://schemas.microsoft.com/office/thememl/2012/main" name="Office Theme" id="{62F939B6-93AF-4DB8-9C6B-D6C7DFDC589F}" vid="{4A3C46E8-61CC-4603-A589-7422A47A8E4A}"/>
+      <thm15:themeFamily xmlns:thm15="http://schemas.microsoft.com/office/thememl/2012/main" xmlns="" name="Office Theme" id="{62F939B6-93AF-4DB8-9C6B-D6C7DFDC589F}" vid="{4A3C46E8-61CC-4603-A589-7422A47A8E4A}"/>
     </a:ext>
   </a:extLst>
 </a:theme>

</xml_diff>